<commit_message>
added mai's time tracking
</commit_message>
<xml_diff>
--- a/presentation1.pptx
+++ b/presentation1.pptx
@@ -8389,14 +8389,14 @@
             <p:ph idx="1"/>
             <p:extLst>
               <p:ext uri="{D42A27DB-BD31-4B8C-83A1-F6EECF244321}">
-                <p14:modId xmlns:p14="http://schemas.microsoft.com/office/powerpoint/2010/main" val="2504385567"/>
+                <p14:modId xmlns:p14="http://schemas.microsoft.com/office/powerpoint/2010/main" val="1155070234"/>
               </p:ext>
             </p:extLst>
           </p:nvPr>
         </p:nvGraphicFramePr>
         <p:xfrm>
           <a:off x="261105" y="1010037"/>
-          <a:ext cx="8681433" cy="5620344"/>
+          <a:ext cx="8681433" cy="5151982"/>
         </p:xfrm>
         <a:graphic>
           <a:graphicData uri="http://schemas.openxmlformats.org/drawingml/2006/table">
@@ -8456,6 +8456,10 @@
                     <a:bodyPr/>
                     <a:lstStyle/>
                     <a:p>
+                      <a:r>
+                        <a:rPr lang="de-DE" sz="900" dirty="0" smtClean="0"/>
+                        <a:t>E-Mail Service</a:t>
+                      </a:r>
                       <a:endParaRPr lang="de-DE" sz="900" dirty="0"/>
                     </a:p>
                   </a:txBody>
@@ -8466,6 +8470,10 @@
                     <a:bodyPr/>
                     <a:lstStyle/>
                     <a:p>
+                      <a:r>
+                        <a:rPr lang="de-DE" sz="900" dirty="0" smtClean="0"/>
+                        <a:t>1.5</a:t>
+                      </a:r>
                       <a:endParaRPr lang="de-DE" sz="900" dirty="0"/>
                     </a:p>
                   </a:txBody>
@@ -8478,17 +8486,25 @@
                     <a:bodyPr/>
                     <a:lstStyle/>
                     <a:p>
-                      <a:endParaRPr lang="de-DE" sz="900"/>
-                    </a:p>
-                  </a:txBody>
-                  <a:tcPr/>
-                </a:tc>
-                <a:tc>
-                  <a:txBody>
-                    <a:bodyPr/>
-                    <a:lstStyle/>
-                    <a:p>
-                      <a:endParaRPr lang="de-DE" sz="900"/>
+                      <a:r>
+                        <a:rPr lang="de-DE" sz="900" dirty="0" smtClean="0"/>
+                        <a:t>Transaction Code Generation</a:t>
+                      </a:r>
+                      <a:endParaRPr lang="de-DE" sz="900" dirty="0"/>
+                    </a:p>
+                  </a:txBody>
+                  <a:tcPr/>
+                </a:tc>
+                <a:tc>
+                  <a:txBody>
+                    <a:bodyPr/>
+                    <a:lstStyle/>
+                    <a:p>
+                      <a:r>
+                        <a:rPr lang="de-DE" sz="900" dirty="0" smtClean="0"/>
+                        <a:t>2</a:t>
+                      </a:r>
+                      <a:endParaRPr lang="de-DE" sz="900" dirty="0"/>
                     </a:p>
                   </a:txBody>
                   <a:tcPr/>
@@ -8500,17 +8516,45 @@
                     <a:bodyPr/>
                     <a:lstStyle/>
                     <a:p>
-                      <a:endParaRPr lang="de-DE" sz="900"/>
-                    </a:p>
-                  </a:txBody>
-                  <a:tcPr/>
-                </a:tc>
-                <a:tc>
-                  <a:txBody>
-                    <a:bodyPr/>
-                    <a:lstStyle/>
-                    <a:p>
-                      <a:endParaRPr lang="de-DE" sz="900"/>
+                      <a:r>
+                        <a:rPr lang="de-DE" sz="900" dirty="0" smtClean="0"/>
+                        <a:t>Login </a:t>
+                      </a:r>
+                      <a:r>
+                        <a:rPr lang="de-DE" sz="900" dirty="0" err="1" smtClean="0"/>
+                        <a:t>and</a:t>
+                      </a:r>
+                      <a:r>
+                        <a:rPr lang="de-DE" sz="900" dirty="0" smtClean="0"/>
+                        <a:t> </a:t>
+                      </a:r>
+                      <a:r>
+                        <a:rPr lang="de-DE" sz="900" dirty="0" err="1" smtClean="0"/>
+                        <a:t>registration</a:t>
+                      </a:r>
+                      <a:r>
+                        <a:rPr lang="de-DE" sz="900" baseline="0" dirty="0" smtClean="0"/>
+                        <a:t> </a:t>
+                      </a:r>
+                      <a:r>
+                        <a:rPr lang="de-DE" sz="900" baseline="0" dirty="0" err="1" smtClean="0"/>
+                        <a:t>forms</a:t>
+                      </a:r>
+                      <a:endParaRPr lang="de-DE" sz="900" dirty="0"/>
+                    </a:p>
+                  </a:txBody>
+                  <a:tcPr/>
+                </a:tc>
+                <a:tc>
+                  <a:txBody>
+                    <a:bodyPr/>
+                    <a:lstStyle/>
+                    <a:p>
+                      <a:r>
+                        <a:rPr lang="de-DE" sz="900" dirty="0" smtClean="0"/>
+                        <a:t>1.6</a:t>
+                      </a:r>
+                      <a:endParaRPr lang="de-DE" sz="900" dirty="0"/>
                     </a:p>
                   </a:txBody>
                   <a:tcPr/>
@@ -8522,17 +8566,49 @@
                     <a:bodyPr/>
                     <a:lstStyle/>
                     <a:p>
-                      <a:endParaRPr lang="de-DE" sz="900"/>
-                    </a:p>
-                  </a:txBody>
-                  <a:tcPr/>
-                </a:tc>
-                <a:tc>
-                  <a:txBody>
-                    <a:bodyPr/>
-                    <a:lstStyle/>
-                    <a:p>
-                      <a:endParaRPr lang="de-DE" sz="900"/>
+                      <a:r>
+                        <a:rPr lang="de-DE" sz="900" dirty="0" smtClean="0"/>
+                        <a:t>Login</a:t>
+                      </a:r>
+                      <a:r>
+                        <a:rPr lang="de-DE" sz="900" baseline="0" dirty="0" smtClean="0"/>
+                        <a:t> </a:t>
+                      </a:r>
+                      <a:r>
+                        <a:rPr lang="de-DE" sz="900" baseline="0" dirty="0" err="1" smtClean="0"/>
+                        <a:t>and</a:t>
+                      </a:r>
+                      <a:r>
+                        <a:rPr lang="de-DE" sz="900" baseline="0" dirty="0" smtClean="0"/>
+                        <a:t> </a:t>
+                      </a:r>
+                      <a:r>
+                        <a:rPr lang="de-DE" sz="900" baseline="0" dirty="0" err="1" smtClean="0"/>
+                        <a:t>registration</a:t>
+                      </a:r>
+                      <a:r>
+                        <a:rPr lang="de-DE" sz="900" baseline="0" dirty="0" smtClean="0"/>
+                        <a:t> </a:t>
+                      </a:r>
+                      <a:r>
+                        <a:rPr lang="de-DE" sz="900" baseline="0" dirty="0" err="1" smtClean="0"/>
+                        <a:t>models</a:t>
+                      </a:r>
+                      <a:endParaRPr lang="de-DE" sz="900" dirty="0"/>
+                    </a:p>
+                  </a:txBody>
+                  <a:tcPr/>
+                </a:tc>
+                <a:tc>
+                  <a:txBody>
+                    <a:bodyPr/>
+                    <a:lstStyle/>
+                    <a:p>
+                      <a:r>
+                        <a:rPr lang="de-DE" sz="900" dirty="0" smtClean="0"/>
+                        <a:t>0.5</a:t>
+                      </a:r>
+                      <a:endParaRPr lang="de-DE" sz="900" dirty="0"/>
                     </a:p>
                   </a:txBody>
                   <a:tcPr/>
@@ -8544,17 +8620,37 @@
                     <a:bodyPr/>
                     <a:lstStyle/>
                     <a:p>
-                      <a:endParaRPr lang="de-DE" sz="900"/>
-                    </a:p>
-                  </a:txBody>
-                  <a:tcPr/>
-                </a:tc>
-                <a:tc>
-                  <a:txBody>
-                    <a:bodyPr/>
-                    <a:lstStyle/>
-                    <a:p>
-                      <a:endParaRPr lang="de-DE" sz="900"/>
+                      <a:r>
+                        <a:rPr lang="de-DE" sz="900" dirty="0" smtClean="0"/>
+                        <a:t>Form </a:t>
+                      </a:r>
+                      <a:r>
+                        <a:rPr lang="de-DE" sz="900" dirty="0" err="1" smtClean="0"/>
+                        <a:t>validation</a:t>
+                      </a:r>
+                      <a:r>
+                        <a:rPr lang="de-DE" sz="900" baseline="0" dirty="0" smtClean="0"/>
+                        <a:t> </a:t>
+                      </a:r>
+                      <a:r>
+                        <a:rPr lang="de-DE" sz="900" baseline="0" dirty="0" err="1" smtClean="0"/>
+                        <a:t>functions</a:t>
+                      </a:r>
+                      <a:endParaRPr lang="de-DE" sz="900" dirty="0"/>
+                    </a:p>
+                  </a:txBody>
+                  <a:tcPr/>
+                </a:tc>
+                <a:tc>
+                  <a:txBody>
+                    <a:bodyPr/>
+                    <a:lstStyle/>
+                    <a:p>
+                      <a:r>
+                        <a:rPr lang="de-DE" sz="900" dirty="0" smtClean="0"/>
+                        <a:t>1</a:t>
+                      </a:r>
+                      <a:endParaRPr lang="de-DE" sz="900" dirty="0"/>
                     </a:p>
                   </a:txBody>
                   <a:tcPr/>
@@ -8566,17 +8662,41 @@
                     <a:bodyPr/>
                     <a:lstStyle/>
                     <a:p>
-                      <a:endParaRPr lang="de-DE" sz="900"/>
-                    </a:p>
-                  </a:txBody>
-                  <a:tcPr/>
-                </a:tc>
-                <a:tc>
-                  <a:txBody>
-                    <a:bodyPr/>
-                    <a:lstStyle/>
-                    <a:p>
-                      <a:endParaRPr lang="de-DE" sz="900"/>
+                      <a:r>
+                        <a:rPr lang="de-DE" sz="900" dirty="0" smtClean="0"/>
+                        <a:t>Find </a:t>
+                      </a:r>
+                      <a:r>
+                        <a:rPr lang="de-DE" sz="900" dirty="0" err="1" smtClean="0"/>
+                        <a:t>function</a:t>
+                      </a:r>
+                      <a:r>
+                        <a:rPr lang="de-DE" sz="900" dirty="0" smtClean="0"/>
+                        <a:t> </a:t>
+                      </a:r>
+                      <a:r>
+                        <a:rPr lang="de-DE" sz="900" dirty="0" err="1" smtClean="0"/>
+                        <a:t>for</a:t>
+                      </a:r>
+                      <a:r>
+                        <a:rPr lang="de-DE" sz="900" dirty="0" smtClean="0"/>
+                        <a:t> DB</a:t>
+                      </a:r>
+                      <a:endParaRPr lang="de-DE" sz="900" dirty="0"/>
+                    </a:p>
+                  </a:txBody>
+                  <a:tcPr/>
+                </a:tc>
+                <a:tc>
+                  <a:txBody>
+                    <a:bodyPr/>
+                    <a:lstStyle/>
+                    <a:p>
+                      <a:r>
+                        <a:rPr lang="de-DE" sz="900" dirty="0" smtClean="0"/>
+                        <a:t>1.5</a:t>
+                      </a:r>
+                      <a:endParaRPr lang="de-DE" sz="900" dirty="0"/>
                     </a:p>
                   </a:txBody>
                   <a:tcPr/>
@@ -8588,17 +8708,41 @@
                     <a:bodyPr/>
                     <a:lstStyle/>
                     <a:p>
-                      <a:endParaRPr lang="de-DE" sz="900"/>
-                    </a:p>
-                  </a:txBody>
-                  <a:tcPr/>
-                </a:tc>
-                <a:tc>
-                  <a:txBody>
-                    <a:bodyPr/>
-                    <a:lstStyle/>
-                    <a:p>
-                      <a:endParaRPr lang="de-DE" sz="900"/>
+                      <a:r>
+                        <a:rPr lang="de-DE" sz="900" dirty="0" smtClean="0"/>
+                        <a:t>Add </a:t>
+                      </a:r>
+                      <a:r>
+                        <a:rPr lang="de-DE" sz="900" dirty="0" err="1" smtClean="0"/>
+                        <a:t>function</a:t>
+                      </a:r>
+                      <a:r>
+                        <a:rPr lang="de-DE" sz="900" dirty="0" smtClean="0"/>
+                        <a:t> </a:t>
+                      </a:r>
+                      <a:r>
+                        <a:rPr lang="de-DE" sz="900" dirty="0" err="1" smtClean="0"/>
+                        <a:t>for</a:t>
+                      </a:r>
+                      <a:r>
+                        <a:rPr lang="de-DE" sz="900" dirty="0" smtClean="0"/>
+                        <a:t> DB</a:t>
+                      </a:r>
+                      <a:endParaRPr lang="de-DE" sz="900" dirty="0"/>
+                    </a:p>
+                  </a:txBody>
+                  <a:tcPr/>
+                </a:tc>
+                <a:tc>
+                  <a:txBody>
+                    <a:bodyPr/>
+                    <a:lstStyle/>
+                    <a:p>
+                      <a:r>
+                        <a:rPr lang="de-DE" sz="900" dirty="0" smtClean="0"/>
+                        <a:t>1.7</a:t>
+                      </a:r>
+                      <a:endParaRPr lang="de-DE" sz="900" dirty="0"/>
                     </a:p>
                   </a:txBody>
                   <a:tcPr/>
@@ -8610,17 +8754,53 @@
                     <a:bodyPr/>
                     <a:lstStyle/>
                     <a:p>
-                      <a:endParaRPr lang="de-DE" sz="900"/>
-                    </a:p>
-                  </a:txBody>
-                  <a:tcPr/>
-                </a:tc>
-                <a:tc>
-                  <a:txBody>
-                    <a:bodyPr/>
-                    <a:lstStyle/>
-                    <a:p>
-                      <a:endParaRPr lang="de-DE" sz="900"/>
+                      <a:r>
+                        <a:rPr lang="de-DE" sz="900" dirty="0" err="1" smtClean="0"/>
+                        <a:t>Fill</a:t>
+                      </a:r>
+                      <a:r>
+                        <a:rPr lang="de-DE" sz="900" dirty="0" smtClean="0"/>
+                        <a:t> </a:t>
+                      </a:r>
+                      <a:r>
+                        <a:rPr lang="de-DE" sz="900" dirty="0" err="1" smtClean="0"/>
+                        <a:t>model</a:t>
+                      </a:r>
+                      <a:r>
+                        <a:rPr lang="de-DE" sz="900" baseline="0" dirty="0" smtClean="0"/>
+                        <a:t> </a:t>
+                      </a:r>
+                      <a:r>
+                        <a:rPr lang="de-DE" sz="900" baseline="0" dirty="0" err="1" smtClean="0"/>
+                        <a:t>function</a:t>
+                      </a:r>
+                      <a:r>
+                        <a:rPr lang="de-DE" sz="900" baseline="0" dirty="0" smtClean="0"/>
+                        <a:t> </a:t>
+                      </a:r>
+                      <a:r>
+                        <a:rPr lang="de-DE" sz="900" baseline="0" dirty="0" err="1" smtClean="0"/>
+                        <a:t>for</a:t>
+                      </a:r>
+                      <a:r>
+                        <a:rPr lang="de-DE" sz="900" baseline="0" dirty="0" smtClean="0"/>
+                        <a:t> DB</a:t>
+                      </a:r>
+                      <a:endParaRPr lang="de-DE" sz="900" dirty="0"/>
+                    </a:p>
+                  </a:txBody>
+                  <a:tcPr/>
+                </a:tc>
+                <a:tc>
+                  <a:txBody>
+                    <a:bodyPr/>
+                    <a:lstStyle/>
+                    <a:p>
+                      <a:r>
+                        <a:rPr lang="de-DE" sz="900" dirty="0" smtClean="0"/>
+                        <a:t>1</a:t>
+                      </a:r>
+                      <a:endParaRPr lang="de-DE" sz="900" dirty="0"/>
                     </a:p>
                   </a:txBody>
                   <a:tcPr/>
@@ -8632,17 +8812,29 @@
                     <a:bodyPr/>
                     <a:lstStyle/>
                     <a:p>
-                      <a:endParaRPr lang="de-DE" sz="900"/>
-                    </a:p>
-                  </a:txBody>
-                  <a:tcPr/>
-                </a:tc>
-                <a:tc>
-                  <a:txBody>
-                    <a:bodyPr/>
-                    <a:lstStyle/>
-                    <a:p>
-                      <a:endParaRPr lang="de-DE" sz="900"/>
+                      <a:r>
+                        <a:rPr lang="de-DE" sz="900" dirty="0" smtClean="0"/>
+                        <a:t>Password </a:t>
+                      </a:r>
+                      <a:r>
+                        <a:rPr lang="de-DE" sz="900" dirty="0" err="1" smtClean="0"/>
+                        <a:t>encryption</a:t>
+                      </a:r>
+                      <a:endParaRPr lang="de-DE" sz="900" dirty="0"/>
+                    </a:p>
+                  </a:txBody>
+                  <a:tcPr/>
+                </a:tc>
+                <a:tc>
+                  <a:txBody>
+                    <a:bodyPr/>
+                    <a:lstStyle/>
+                    <a:p>
+                      <a:r>
+                        <a:rPr lang="de-DE" sz="900" dirty="0" smtClean="0"/>
+                        <a:t>1.5</a:t>
+                      </a:r>
+                      <a:endParaRPr lang="de-DE" sz="900" dirty="0"/>
                     </a:p>
                   </a:txBody>
                   <a:tcPr/>
@@ -8654,17 +8846,53 @@
                     <a:bodyPr/>
                     <a:lstStyle/>
                     <a:p>
-                      <a:endParaRPr lang="de-DE" sz="900"/>
-                    </a:p>
-                  </a:txBody>
-                  <a:tcPr/>
-                </a:tc>
-                <a:tc>
-                  <a:txBody>
-                    <a:bodyPr/>
-                    <a:lstStyle/>
-                    <a:p>
-                      <a:endParaRPr lang="de-DE" sz="900"/>
+                      <a:r>
+                        <a:rPr lang="de-DE" sz="900" dirty="0" smtClean="0"/>
+                        <a:t>Error </a:t>
+                      </a:r>
+                      <a:r>
+                        <a:rPr lang="de-DE" sz="900" dirty="0" err="1" smtClean="0"/>
+                        <a:t>handling</a:t>
+                      </a:r>
+                      <a:r>
+                        <a:rPr lang="de-DE" sz="900" dirty="0" smtClean="0"/>
+                        <a:t> </a:t>
+                      </a:r>
+                      <a:r>
+                        <a:rPr lang="de-DE" sz="900" dirty="0" err="1" smtClean="0"/>
+                        <a:t>for</a:t>
+                      </a:r>
+                      <a:r>
+                        <a:rPr lang="de-DE" sz="900" dirty="0" smtClean="0"/>
+                        <a:t> </a:t>
+                      </a:r>
+                      <a:r>
+                        <a:rPr lang="de-DE" sz="900" dirty="0" err="1" smtClean="0"/>
+                        <a:t>login</a:t>
+                      </a:r>
+                      <a:r>
+                        <a:rPr lang="de-DE" sz="900" dirty="0" smtClean="0"/>
+                        <a:t>/</a:t>
+                      </a:r>
+                      <a:r>
+                        <a:rPr lang="de-DE" sz="900" dirty="0" err="1" smtClean="0"/>
+                        <a:t>registration</a:t>
+                      </a:r>
+                      <a:endParaRPr lang="de-DE" sz="900" dirty="0"/>
+                    </a:p>
+                  </a:txBody>
+                  <a:tcPr/>
+                </a:tc>
+                <a:tc>
+                  <a:txBody>
+                    <a:bodyPr/>
+                    <a:lstStyle/>
+                    <a:p>
+                      <a:r>
+                        <a:rPr lang="de-DE" sz="900" dirty="0" smtClean="0"/>
+                        <a:t>0.5</a:t>
+                      </a:r>
+                      <a:endParaRPr lang="de-DE" sz="900" dirty="0"/>
                     </a:p>
                   </a:txBody>
                   <a:tcPr/>
@@ -8676,17 +8904,29 @@
                     <a:bodyPr/>
                     <a:lstStyle/>
                     <a:p>
-                      <a:endParaRPr lang="de-DE" sz="900"/>
-                    </a:p>
-                  </a:txBody>
-                  <a:tcPr/>
-                </a:tc>
-                <a:tc>
-                  <a:txBody>
-                    <a:bodyPr/>
-                    <a:lstStyle/>
-                    <a:p>
-                      <a:endParaRPr lang="de-DE" sz="900"/>
+                      <a:r>
+                        <a:rPr lang="de-DE" sz="900" dirty="0" smtClean="0"/>
+                        <a:t>Redirect </a:t>
+                      </a:r>
+                      <a:r>
+                        <a:rPr lang="de-DE" sz="900" dirty="0" err="1" smtClean="0"/>
+                        <a:t>function</a:t>
+                      </a:r>
+                      <a:endParaRPr lang="de-DE" sz="900" dirty="0"/>
+                    </a:p>
+                  </a:txBody>
+                  <a:tcPr/>
+                </a:tc>
+                <a:tc>
+                  <a:txBody>
+                    <a:bodyPr/>
+                    <a:lstStyle/>
+                    <a:p>
+                      <a:r>
+                        <a:rPr lang="de-DE" sz="900" dirty="0" smtClean="0"/>
+                        <a:t>1</a:t>
+                      </a:r>
+                      <a:endParaRPr lang="de-DE" sz="900" dirty="0"/>
                     </a:p>
                   </a:txBody>
                   <a:tcPr/>
@@ -8698,17 +8938,53 @@
                     <a:bodyPr/>
                     <a:lstStyle/>
                     <a:p>
-                      <a:endParaRPr lang="de-DE" sz="900"/>
-                    </a:p>
-                  </a:txBody>
-                  <a:tcPr/>
-                </a:tc>
-                <a:tc>
-                  <a:txBody>
-                    <a:bodyPr/>
-                    <a:lstStyle/>
-                    <a:p>
-                      <a:endParaRPr lang="de-DE" sz="900"/>
+                      <a:r>
+                        <a:rPr lang="de-DE" sz="900" dirty="0" smtClean="0"/>
+                        <a:t>Controller </a:t>
+                      </a:r>
+                      <a:r>
+                        <a:rPr lang="de-DE" sz="900" dirty="0" err="1" smtClean="0"/>
+                        <a:t>for</a:t>
+                      </a:r>
+                      <a:r>
+                        <a:rPr lang="de-DE" sz="900" dirty="0" smtClean="0"/>
+                        <a:t> </a:t>
+                      </a:r>
+                      <a:r>
+                        <a:rPr lang="de-DE" sz="900" dirty="0" err="1" smtClean="0"/>
+                        <a:t>login</a:t>
+                      </a:r>
+                      <a:r>
+                        <a:rPr lang="de-DE" sz="900" baseline="0" dirty="0" smtClean="0"/>
+                        <a:t> </a:t>
+                      </a:r>
+                      <a:r>
+                        <a:rPr lang="de-DE" sz="900" baseline="0" dirty="0" err="1" smtClean="0"/>
+                        <a:t>and</a:t>
+                      </a:r>
+                      <a:r>
+                        <a:rPr lang="de-DE" sz="900" baseline="0" dirty="0" smtClean="0"/>
+                        <a:t> </a:t>
+                      </a:r>
+                      <a:r>
+                        <a:rPr lang="de-DE" sz="900" baseline="0" dirty="0" err="1" smtClean="0"/>
+                        <a:t>registration</a:t>
+                      </a:r>
+                      <a:endParaRPr lang="de-DE" sz="900" dirty="0"/>
+                    </a:p>
+                  </a:txBody>
+                  <a:tcPr/>
+                </a:tc>
+                <a:tc>
+                  <a:txBody>
+                    <a:bodyPr/>
+                    <a:lstStyle/>
+                    <a:p>
+                      <a:r>
+                        <a:rPr lang="de-DE" sz="900" dirty="0" smtClean="0"/>
+                        <a:t>2</a:t>
+                      </a:r>
+                      <a:endParaRPr lang="de-DE" sz="900" dirty="0"/>
                     </a:p>
                   </a:txBody>
                   <a:tcPr/>
@@ -8720,6 +8996,38 @@
                     <a:bodyPr/>
                     <a:lstStyle/>
                     <a:p>
+                      <a:r>
+                        <a:rPr lang="de-DE" sz="900" dirty="0" err="1" smtClean="0"/>
+                        <a:t>Parsing</a:t>
+                      </a:r>
+                      <a:r>
+                        <a:rPr lang="de-DE" sz="900" dirty="0" smtClean="0"/>
+                        <a:t> </a:t>
+                      </a:r>
+                      <a:r>
+                        <a:rPr lang="de-DE" sz="900" dirty="0" err="1" smtClean="0"/>
+                        <a:t>text</a:t>
+                      </a:r>
+                      <a:r>
+                        <a:rPr lang="de-DE" sz="900" dirty="0" smtClean="0"/>
+                        <a:t> </a:t>
+                      </a:r>
+                      <a:r>
+                        <a:rPr lang="de-DE" sz="900" dirty="0" err="1" smtClean="0"/>
+                        <a:t>file</a:t>
+                      </a:r>
+                      <a:r>
+                        <a:rPr lang="de-DE" sz="900" dirty="0" smtClean="0"/>
+                        <a:t> </a:t>
+                      </a:r>
+                      <a:r>
+                        <a:rPr lang="de-DE" sz="900" dirty="0" err="1" smtClean="0"/>
+                        <a:t>with</a:t>
+                      </a:r>
+                      <a:r>
+                        <a:rPr lang="de-DE" sz="900" dirty="0" smtClean="0"/>
+                        <a:t> C</a:t>
+                      </a:r>
                       <a:endParaRPr lang="de-DE" sz="900" dirty="0"/>
                     </a:p>
                   </a:txBody>
@@ -8730,7 +9038,11 @@
                     <a:bodyPr/>
                     <a:lstStyle/>
                     <a:p>
-                      <a:endParaRPr lang="de-DE" sz="900"/>
+                      <a:r>
+                        <a:rPr lang="de-DE" sz="900" dirty="0" smtClean="0"/>
+                        <a:t>2</a:t>
+                      </a:r>
+                      <a:endParaRPr lang="de-DE" sz="900" dirty="0"/>
                     </a:p>
                   </a:txBody>
                   <a:tcPr/>
@@ -8742,6 +9054,30 @@
                     <a:bodyPr/>
                     <a:lstStyle/>
                     <a:p>
+                      <a:r>
+                        <a:rPr lang="de-DE" sz="900" dirty="0" smtClean="0"/>
+                        <a:t>PHP </a:t>
+                      </a:r>
+                      <a:r>
+                        <a:rPr lang="de-DE" sz="900" dirty="0" err="1" smtClean="0"/>
+                        <a:t>execution</a:t>
+                      </a:r>
+                      <a:r>
+                        <a:rPr lang="de-DE" sz="900" dirty="0" smtClean="0"/>
+                        <a:t> </a:t>
+                      </a:r>
+                      <a:r>
+                        <a:rPr lang="de-DE" sz="900" dirty="0" err="1" smtClean="0"/>
+                        <a:t>of</a:t>
+                      </a:r>
+                      <a:r>
+                        <a:rPr lang="de-DE" sz="900" dirty="0" smtClean="0"/>
+                        <a:t> C </a:t>
+                      </a:r>
+                      <a:r>
+                        <a:rPr lang="de-DE" sz="900" dirty="0" err="1" smtClean="0"/>
+                        <a:t>program</a:t>
+                      </a:r>
                       <a:endParaRPr lang="de-DE" sz="900" dirty="0"/>
                     </a:p>
                   </a:txBody>
@@ -8752,7 +9088,11 @@
                     <a:bodyPr/>
                     <a:lstStyle/>
                     <a:p>
-                      <a:endParaRPr lang="de-DE" sz="900"/>
+                      <a:r>
+                        <a:rPr lang="de-DE" sz="900" dirty="0" smtClean="0"/>
+                        <a:t>1.3</a:t>
+                      </a:r>
+                      <a:endParaRPr lang="de-DE" sz="900" dirty="0"/>
                     </a:p>
                   </a:txBody>
                   <a:tcPr/>
@@ -8764,6 +9104,14 @@
                     <a:bodyPr/>
                     <a:lstStyle/>
                     <a:p>
+                      <a:r>
+                        <a:rPr lang="de-DE" sz="900" dirty="0" smtClean="0"/>
+                        <a:t>File </a:t>
+                      </a:r>
+                      <a:r>
+                        <a:rPr lang="de-DE" sz="900" dirty="0" err="1" smtClean="0"/>
+                        <a:t>upload</a:t>
+                      </a:r>
                       <a:endParaRPr lang="de-DE" sz="900" dirty="0"/>
                     </a:p>
                   </a:txBody>
@@ -8774,7 +9122,11 @@
                     <a:bodyPr/>
                     <a:lstStyle/>
                     <a:p>
-                      <a:endParaRPr lang="de-DE" sz="900"/>
+                      <a:r>
+                        <a:rPr lang="de-DE" sz="900" dirty="0" smtClean="0"/>
+                        <a:t>1</a:t>
+                      </a:r>
+                      <a:endParaRPr lang="de-DE" sz="900" dirty="0"/>
                     </a:p>
                   </a:txBody>
                   <a:tcPr/>
@@ -8786,6 +9138,46 @@
                     <a:bodyPr/>
                     <a:lstStyle/>
                     <a:p>
+                      <a:r>
+                        <a:rPr lang="de-DE" sz="900" dirty="0" err="1" smtClean="0"/>
+                        <a:t>Combining</a:t>
+                      </a:r>
+                      <a:r>
+                        <a:rPr lang="de-DE" sz="900" dirty="0" smtClean="0"/>
+                        <a:t> </a:t>
+                      </a:r>
+                      <a:r>
+                        <a:rPr lang="de-DE" sz="900" dirty="0" err="1" smtClean="0"/>
+                        <a:t>text</a:t>
+                      </a:r>
+                      <a:r>
+                        <a:rPr lang="de-DE" sz="900" dirty="0" smtClean="0"/>
+                        <a:t> </a:t>
+                      </a:r>
+                      <a:r>
+                        <a:rPr lang="de-DE" sz="900" dirty="0" err="1" smtClean="0"/>
+                        <a:t>parser</a:t>
+                      </a:r>
+                      <a:r>
+                        <a:rPr lang="de-DE" sz="900" dirty="0" smtClean="0"/>
+                        <a:t> </a:t>
+                      </a:r>
+                      <a:r>
+                        <a:rPr lang="de-DE" sz="900" dirty="0" err="1" smtClean="0"/>
+                        <a:t>with</a:t>
+                      </a:r>
+                      <a:r>
+                        <a:rPr lang="de-DE" sz="900" dirty="0" smtClean="0"/>
+                        <a:t> MySQL</a:t>
+                      </a:r>
+                      <a:r>
+                        <a:rPr lang="de-DE" sz="900" baseline="0" dirty="0" smtClean="0"/>
+                        <a:t> </a:t>
+                      </a:r>
+                      <a:r>
+                        <a:rPr lang="de-DE" sz="900" baseline="0" dirty="0" err="1" smtClean="0"/>
+                        <a:t>part</a:t>
+                      </a:r>
                       <a:endParaRPr lang="de-DE" sz="900" dirty="0"/>
                     </a:p>
                   </a:txBody>
@@ -8796,7 +9188,11 @@
                     <a:bodyPr/>
                     <a:lstStyle/>
                     <a:p>
-                      <a:endParaRPr lang="de-DE" sz="900"/>
+                      <a:r>
+                        <a:rPr lang="de-DE" sz="900" dirty="0" smtClean="0"/>
+                        <a:t>2</a:t>
+                      </a:r>
+                      <a:endParaRPr lang="de-DE" sz="900" dirty="0"/>
                     </a:p>
                   </a:txBody>
                   <a:tcPr/>
@@ -8808,6 +9204,10 @@
                     <a:bodyPr/>
                     <a:lstStyle/>
                     <a:p>
+                      <a:r>
+                        <a:rPr lang="de-DE" sz="900" dirty="0" smtClean="0"/>
+                        <a:t>C Bugfixing</a:t>
+                      </a:r>
                       <a:endParaRPr lang="de-DE" sz="900" dirty="0"/>
                     </a:p>
                   </a:txBody>
@@ -8818,7 +9218,11 @@
                     <a:bodyPr/>
                     <a:lstStyle/>
                     <a:p>
-                      <a:endParaRPr lang="de-DE" sz="900"/>
+                      <a:r>
+                        <a:rPr lang="de-DE" sz="900" dirty="0" smtClean="0"/>
+                        <a:t>2</a:t>
+                      </a:r>
+                      <a:endParaRPr lang="de-DE" sz="900" dirty="0"/>
                     </a:p>
                   </a:txBody>
                   <a:tcPr/>
@@ -8830,6 +9234,34 @@
                     <a:bodyPr/>
                     <a:lstStyle/>
                     <a:p>
+                      <a:r>
+                        <a:rPr lang="de-DE" sz="900" dirty="0" smtClean="0"/>
+                        <a:t>Error </a:t>
+                      </a:r>
+                      <a:r>
+                        <a:rPr lang="de-DE" sz="900" dirty="0" err="1" smtClean="0"/>
+                        <a:t>handling</a:t>
+                      </a:r>
+                      <a:r>
+                        <a:rPr lang="de-DE" sz="900" dirty="0" smtClean="0"/>
+                        <a:t> </a:t>
+                      </a:r>
+                      <a:r>
+                        <a:rPr lang="de-DE" sz="900" dirty="0" err="1" smtClean="0"/>
+                        <a:t>of</a:t>
+                      </a:r>
+                      <a:r>
+                        <a:rPr lang="de-DE" sz="900" dirty="0" smtClean="0"/>
+                        <a:t> C </a:t>
+                      </a:r>
+                      <a:r>
+                        <a:rPr lang="de-DE" sz="900" dirty="0" err="1" smtClean="0"/>
+                        <a:t>program</a:t>
+                      </a:r>
+                      <a:r>
+                        <a:rPr lang="de-DE" sz="900" baseline="0" dirty="0" smtClean="0"/>
+                        <a:t> in PHP</a:t>
+                      </a:r>
                       <a:endParaRPr lang="de-DE" sz="900" dirty="0"/>
                     </a:p>
                   </a:txBody>
@@ -8840,7 +9272,11 @@
                     <a:bodyPr/>
                     <a:lstStyle/>
                     <a:p>
-                      <a:endParaRPr lang="de-DE" sz="900"/>
+                      <a:r>
+                        <a:rPr lang="de-DE" sz="900" dirty="0" smtClean="0"/>
+                        <a:t>0.5</a:t>
+                      </a:r>
+                      <a:endParaRPr lang="de-DE" sz="900" dirty="0"/>
                     </a:p>
                   </a:txBody>
                   <a:tcPr/>
@@ -8852,6 +9288,38 @@
                     <a:bodyPr/>
                     <a:lstStyle/>
                     <a:p>
+                      <a:r>
+                        <a:rPr lang="de-DE" sz="900" dirty="0" smtClean="0"/>
+                        <a:t>Fixed </a:t>
+                      </a:r>
+                      <a:r>
+                        <a:rPr lang="de-DE" sz="900" dirty="0" err="1" smtClean="0"/>
+                        <a:t>text</a:t>
+                      </a:r>
+                      <a:r>
+                        <a:rPr lang="de-DE" sz="900" dirty="0" smtClean="0"/>
+                        <a:t> </a:t>
+                      </a:r>
+                      <a:r>
+                        <a:rPr lang="de-DE" sz="900" dirty="0" err="1" smtClean="0"/>
+                        <a:t>parser</a:t>
+                      </a:r>
+                      <a:r>
+                        <a:rPr lang="de-DE" sz="900" dirty="0" smtClean="0"/>
+                        <a:t> </a:t>
+                      </a:r>
+                      <a:r>
+                        <a:rPr lang="de-DE" sz="900" dirty="0" err="1" smtClean="0"/>
+                        <a:t>for</a:t>
+                      </a:r>
+                      <a:r>
+                        <a:rPr lang="de-DE" sz="900" dirty="0" smtClean="0"/>
+                        <a:t> CSV </a:t>
+                      </a:r>
+                      <a:r>
+                        <a:rPr lang="de-DE" sz="900" dirty="0" err="1" smtClean="0"/>
+                        <a:t>use</a:t>
+                      </a:r>
                       <a:endParaRPr lang="de-DE" sz="900" dirty="0"/>
                     </a:p>
                   </a:txBody>
@@ -8862,7 +9330,11 @@
                     <a:bodyPr/>
                     <a:lstStyle/>
                     <a:p>
-                      <a:endParaRPr lang="de-DE" sz="900"/>
+                      <a:r>
+                        <a:rPr lang="de-DE" sz="900" dirty="0" smtClean="0"/>
+                        <a:t>0.5</a:t>
+                      </a:r>
+                      <a:endParaRPr lang="de-DE" sz="900" dirty="0"/>
                     </a:p>
                   </a:txBody>
                   <a:tcPr/>
@@ -8874,6 +9346,22 @@
                     <a:bodyPr/>
                     <a:lstStyle/>
                     <a:p>
+                      <a:r>
+                        <a:rPr lang="de-DE" sz="900" dirty="0" smtClean="0"/>
+                        <a:t>General </a:t>
+                      </a:r>
+                      <a:r>
+                        <a:rPr lang="de-DE" sz="900" dirty="0" err="1" smtClean="0"/>
+                        <a:t>bug</a:t>
+                      </a:r>
+                      <a:r>
+                        <a:rPr lang="de-DE" sz="900" baseline="0" dirty="0" smtClean="0"/>
+                        <a:t> </a:t>
+                      </a:r>
+                      <a:r>
+                        <a:rPr lang="de-DE" sz="900" baseline="0" dirty="0" err="1" smtClean="0"/>
+                        <a:t>fixing</a:t>
+                      </a:r>
                       <a:endParaRPr lang="de-DE" sz="900" dirty="0"/>
                     </a:p>
                   </a:txBody>
@@ -8884,7 +9372,11 @@
                     <a:bodyPr/>
                     <a:lstStyle/>
                     <a:p>
-                      <a:endParaRPr lang="de-DE" sz="900"/>
+                      <a:r>
+                        <a:rPr lang="de-DE" sz="900" dirty="0" smtClean="0"/>
+                        <a:t>2</a:t>
+                      </a:r>
+                      <a:endParaRPr lang="de-DE" sz="900" dirty="0"/>
                     </a:p>
                   </a:txBody>
                   <a:tcPr/>
@@ -8913,61 +9405,24 @@
                         <a:tabLst/>
                         <a:defRPr/>
                       </a:pPr>
-                      <a:endParaRPr lang="de-DE" sz="900" dirty="0" smtClean="0"/>
-                    </a:p>
-                  </a:txBody>
-                  <a:tcPr/>
-                </a:tc>
-                <a:tc>
-                  <a:txBody>
-                    <a:bodyPr/>
-                    <a:lstStyle/>
-                    <a:p>
-                      <a:endParaRPr lang="de-DE" sz="900"/>
-                    </a:p>
-                  </a:txBody>
-                  <a:tcPr/>
-                </a:tc>
-              </a:tr>
-              <a:tr h="234181">
-                <a:tc>
-                  <a:txBody>
-                    <a:bodyPr/>
-                    <a:lstStyle/>
-                    <a:p>
-                      <a:endParaRPr lang="de-DE" sz="900" dirty="0"/>
-                    </a:p>
-                  </a:txBody>
-                  <a:tcPr/>
-                </a:tc>
-                <a:tc>
-                  <a:txBody>
-                    <a:bodyPr/>
-                    <a:lstStyle/>
-                    <a:p>
-                      <a:endParaRPr lang="de-DE" sz="900"/>
-                    </a:p>
-                  </a:txBody>
-                  <a:tcPr/>
-                </a:tc>
-              </a:tr>
-              <a:tr h="234181">
-                <a:tc>
-                  <a:txBody>
-                    <a:bodyPr/>
-                    <a:lstStyle/>
-                    <a:p>
+                      <a:r>
+                        <a:rPr lang="de-DE" sz="900" b="1" dirty="0" smtClean="0"/>
+                        <a:t>Total</a:t>
+                      </a:r>
+                    </a:p>
+                  </a:txBody>
+                  <a:tcPr/>
+                </a:tc>
+                <a:tc>
+                  <a:txBody>
+                    <a:bodyPr/>
+                    <a:lstStyle/>
+                    <a:p>
+                      <a:r>
+                        <a:rPr lang="de-DE" sz="900" b="1" dirty="0" smtClean="0"/>
+                        <a:t>27.1</a:t>
+                      </a:r>
                       <a:endParaRPr lang="de-DE" sz="900" b="1" dirty="0"/>
-                    </a:p>
-                  </a:txBody>
-                  <a:tcPr/>
-                </a:tc>
-                <a:tc>
-                  <a:txBody>
-                    <a:bodyPr/>
-                    <a:lstStyle/>
-                    <a:p>
-                      <a:endParaRPr lang="de-DE" sz="900" dirty="0"/>
                     </a:p>
                   </a:txBody>
                   <a:tcPr/>

</xml_diff>

<commit_message>
added use cases for login and registration
</commit_message>
<xml_diff>
--- a/presentation1.pptx
+++ b/presentation1.pptx
@@ -14,6 +14,7 @@
     <p:sldId id="261" r:id="rId8"/>
     <p:sldId id="262" r:id="rId9"/>
     <p:sldId id="263" r:id="rId10"/>
+    <p:sldId id="264" r:id="rId11"/>
   </p:sldIdLst>
   <p:sldSz cx="9144000" cy="6858000" type="screen4x3"/>
   <p:notesSz cx="6858000" cy="9144000"/>
@@ -10840,7 +10841,7 @@
             </a:r>
             <a:r>
               <a:rPr lang="de-DE" dirty="0" smtClean="0"/>
-              <a:t> Case Description</a:t>
+              <a:t> Case Description (1)</a:t>
             </a:r>
             <a:endParaRPr lang="de-DE" dirty="0"/>
           </a:p>
@@ -10856,14 +10857,14 @@
             <p:ph idx="1"/>
             <p:extLst>
               <p:ext uri="{D42A27DB-BD31-4B8C-83A1-F6EECF244321}">
-                <p14:modId xmlns:p14="http://schemas.microsoft.com/office/powerpoint/2010/main" val="756020759"/>
+                <p14:modId xmlns:p14="http://schemas.microsoft.com/office/powerpoint/2010/main" val="565336980"/>
               </p:ext>
             </p:extLst>
           </p:nvPr>
         </p:nvGraphicFramePr>
         <p:xfrm>
-          <a:off x="457200" y="2005503"/>
-          <a:ext cx="8229600" cy="3337560"/>
+          <a:off x="457200" y="1659977"/>
+          <a:ext cx="8229600" cy="4414520"/>
         </p:xfrm>
         <a:graphic>
           <a:graphicData uri="http://schemas.openxmlformats.org/drawingml/2006/table">
@@ -10901,6 +10902,35 @@
                     <a:bodyPr/>
                     <a:lstStyle/>
                     <a:p>
+                      <a:r>
+                        <a:rPr lang="de-DE" b="0" dirty="0" smtClean="0">
+                          <a:latin typeface="Helvetica Neue"/>
+                          <a:cs typeface="Helvetica Neue"/>
+                        </a:rPr>
+                        <a:t>Login Customer/Employee</a:t>
+                      </a:r>
+                      <a:endParaRPr lang="de-DE" b="0" dirty="0">
+                        <a:latin typeface="Helvetica Neue"/>
+                        <a:cs typeface="Helvetica Neue"/>
+                      </a:endParaRPr>
+                    </a:p>
+                  </a:txBody>
+                  <a:tcPr/>
+                </a:tc>
+              </a:tr>
+              <a:tr h="370840">
+                <a:tc>
+                  <a:txBody>
+                    <a:bodyPr/>
+                    <a:lstStyle/>
+                    <a:p>
+                      <a:r>
+                        <a:rPr lang="de-DE" dirty="0" smtClean="0">
+                          <a:latin typeface="Helvetica Neue"/>
+                          <a:cs typeface="Helvetica Neue"/>
+                        </a:rPr>
+                        <a:t>Goal</a:t>
+                      </a:r>
                       <a:endParaRPr lang="de-DE" dirty="0">
                         <a:latin typeface="Helvetica Neue"/>
                         <a:cs typeface="Helvetica Neue"/>
@@ -10909,8 +10939,6 @@
                   </a:txBody>
                   <a:tcPr/>
                 </a:tc>
-              </a:tr>
-              <a:tr h="370840">
                 <a:tc>
                   <a:txBody>
                     <a:bodyPr/>
@@ -10921,7 +10949,98 @@
                           <a:latin typeface="Helvetica Neue"/>
                           <a:cs typeface="Helvetica Neue"/>
                         </a:rPr>
-                        <a:t>Goal</a:t>
+                        <a:t>User </a:t>
+                      </a:r>
+                      <a:r>
+                        <a:rPr lang="de-DE" dirty="0" err="1" smtClean="0">
+                          <a:latin typeface="Helvetica Neue"/>
+                          <a:cs typeface="Helvetica Neue"/>
+                        </a:rPr>
+                        <a:t>can</a:t>
+                      </a:r>
+                      <a:r>
+                        <a:rPr lang="de-DE" dirty="0" smtClean="0">
+                          <a:latin typeface="Helvetica Neue"/>
+                          <a:cs typeface="Helvetica Neue"/>
+                        </a:rPr>
+                        <a:t> </a:t>
+                      </a:r>
+                      <a:r>
+                        <a:rPr lang="de-DE" dirty="0" err="1" smtClean="0">
+                          <a:latin typeface="Helvetica Neue"/>
+                          <a:cs typeface="Helvetica Neue"/>
+                        </a:rPr>
+                        <a:t>login</a:t>
+                      </a:r>
+                      <a:r>
+                        <a:rPr lang="de-DE" dirty="0" smtClean="0">
+                          <a:latin typeface="Helvetica Neue"/>
+                          <a:cs typeface="Helvetica Neue"/>
+                        </a:rPr>
+                        <a:t> </a:t>
+                      </a:r>
+                      <a:r>
+                        <a:rPr lang="de-DE" dirty="0" err="1" smtClean="0">
+                          <a:latin typeface="Helvetica Neue"/>
+                          <a:cs typeface="Helvetica Neue"/>
+                        </a:rPr>
+                        <a:t>with</a:t>
+                      </a:r>
+                      <a:r>
+                        <a:rPr lang="de-DE" dirty="0" smtClean="0">
+                          <a:latin typeface="Helvetica Neue"/>
+                          <a:cs typeface="Helvetica Neue"/>
+                        </a:rPr>
+                        <a:t> </a:t>
+                      </a:r>
+                      <a:r>
+                        <a:rPr lang="de-DE" dirty="0" err="1" smtClean="0">
+                          <a:latin typeface="Helvetica Neue"/>
+                          <a:cs typeface="Helvetica Neue"/>
+                        </a:rPr>
+                        <a:t>his</a:t>
+                      </a:r>
+                      <a:r>
+                        <a:rPr lang="de-DE" dirty="0" smtClean="0">
+                          <a:latin typeface="Helvetica Neue"/>
+                          <a:cs typeface="Helvetica Neue"/>
+                        </a:rPr>
+                        <a:t> </a:t>
+                      </a:r>
+                      <a:r>
+                        <a:rPr lang="de-DE" dirty="0" err="1" smtClean="0">
+                          <a:latin typeface="Helvetica Neue"/>
+                          <a:cs typeface="Helvetica Neue"/>
+                        </a:rPr>
+                        <a:t>e-mail</a:t>
+                      </a:r>
+                      <a:r>
+                        <a:rPr lang="de-DE" baseline="0" dirty="0" smtClean="0">
+                          <a:latin typeface="Helvetica Neue"/>
+                          <a:cs typeface="Helvetica Neue"/>
+                        </a:rPr>
+                        <a:t> </a:t>
+                      </a:r>
+                      <a:r>
+                        <a:rPr lang="de-DE" baseline="0" dirty="0" err="1" smtClean="0">
+                          <a:latin typeface="Helvetica Neue"/>
+                          <a:cs typeface="Helvetica Neue"/>
+                        </a:rPr>
+                        <a:t>and</a:t>
+                      </a:r>
+                      <a:r>
+                        <a:rPr lang="de-DE" baseline="0" dirty="0" smtClean="0">
+                          <a:latin typeface="Helvetica Neue"/>
+                          <a:cs typeface="Helvetica Neue"/>
+                        </a:rPr>
+                        <a:t> </a:t>
+                      </a:r>
+                      <a:r>
+                        <a:rPr lang="de-DE" baseline="0" dirty="0" err="1" smtClean="0">
+                          <a:latin typeface="Helvetica Neue"/>
+                          <a:cs typeface="Helvetica Neue"/>
+                        </a:rPr>
+                        <a:t>password</a:t>
                       </a:r>
                       <a:endParaRPr lang="de-DE" dirty="0">
                         <a:latin typeface="Helvetica Neue"/>
@@ -10931,11 +11050,20 @@
                   </a:txBody>
                   <a:tcPr/>
                 </a:tc>
-                <a:tc>
-                  <a:txBody>
-                    <a:bodyPr/>
-                    <a:lstStyle/>
-                    <a:p>
+              </a:tr>
+              <a:tr h="370840">
+                <a:tc>
+                  <a:txBody>
+                    <a:bodyPr/>
+                    <a:lstStyle/>
+                    <a:p>
+                      <a:r>
+                        <a:rPr lang="de-DE" dirty="0" err="1" smtClean="0">
+                          <a:latin typeface="Helvetica Neue"/>
+                          <a:cs typeface="Helvetica Neue"/>
+                        </a:rPr>
+                        <a:t>Actors</a:t>
+                      </a:r>
                       <a:endParaRPr lang="de-DE" dirty="0">
                         <a:latin typeface="Helvetica Neue"/>
                         <a:cs typeface="Helvetica Neue"/>
@@ -10944,19 +11072,17 @@
                   </a:txBody>
                   <a:tcPr/>
                 </a:tc>
-              </a:tr>
-              <a:tr h="370840">
-                <a:tc>
-                  <a:txBody>
-                    <a:bodyPr/>
-                    <a:lstStyle/>
-                    <a:p>
-                      <a:r>
-                        <a:rPr lang="de-DE" dirty="0" err="1" smtClean="0">
-                          <a:latin typeface="Helvetica Neue"/>
-                          <a:cs typeface="Helvetica Neue"/>
-                        </a:rPr>
-                        <a:t>Actors</a:t>
+                <a:tc>
+                  <a:txBody>
+                    <a:bodyPr/>
+                    <a:lstStyle/>
+                    <a:p>
+                      <a:r>
+                        <a:rPr lang="de-DE" dirty="0" smtClean="0">
+                          <a:latin typeface="Helvetica Neue"/>
+                          <a:cs typeface="Helvetica Neue"/>
+                        </a:rPr>
+                        <a:t>User</a:t>
                       </a:r>
                       <a:endParaRPr lang="de-DE" dirty="0">
                         <a:latin typeface="Helvetica Neue"/>
@@ -10966,11 +11092,20 @@
                   </a:txBody>
                   <a:tcPr/>
                 </a:tc>
-                <a:tc>
-                  <a:txBody>
-                    <a:bodyPr/>
-                    <a:lstStyle/>
-                    <a:p>
+              </a:tr>
+              <a:tr h="370840">
+                <a:tc>
+                  <a:txBody>
+                    <a:bodyPr/>
+                    <a:lstStyle/>
+                    <a:p>
+                      <a:r>
+                        <a:rPr lang="de-DE" dirty="0" err="1" smtClean="0">
+                          <a:latin typeface="Helvetica Neue"/>
+                          <a:cs typeface="Helvetica Neue"/>
+                        </a:rPr>
+                        <a:t>Pre-conditions</a:t>
+                      </a:r>
                       <a:endParaRPr lang="de-DE" dirty="0">
                         <a:latin typeface="Helvetica Neue"/>
                         <a:cs typeface="Helvetica Neue"/>
@@ -10979,19 +11114,80 @@
                   </a:txBody>
                   <a:tcPr/>
                 </a:tc>
-              </a:tr>
-              <a:tr h="370840">
-                <a:tc>
-                  <a:txBody>
-                    <a:bodyPr/>
-                    <a:lstStyle/>
-                    <a:p>
+                <a:tc>
+                  <a:txBody>
+                    <a:bodyPr/>
+                    <a:lstStyle/>
+                    <a:p>
+                      <a:r>
+                        <a:rPr lang="de-DE" dirty="0" smtClean="0">
+                          <a:latin typeface="Helvetica Neue"/>
+                          <a:cs typeface="Helvetica Neue"/>
+                        </a:rPr>
+                        <a:t>User registered </a:t>
+                      </a:r>
                       <a:r>
                         <a:rPr lang="de-DE" dirty="0" err="1" smtClean="0">
                           <a:latin typeface="Helvetica Neue"/>
                           <a:cs typeface="Helvetica Neue"/>
                         </a:rPr>
-                        <a:t>Pre-conditions</a:t>
+                        <a:t>at</a:t>
+                      </a:r>
+                      <a:r>
+                        <a:rPr lang="de-DE" dirty="0" smtClean="0">
+                          <a:latin typeface="Helvetica Neue"/>
+                          <a:cs typeface="Helvetica Neue"/>
+                        </a:rPr>
+                        <a:t> </a:t>
+                      </a:r>
+                      <a:r>
+                        <a:rPr lang="de-DE" dirty="0" err="1" smtClean="0">
+                          <a:latin typeface="Helvetica Neue"/>
+                          <a:cs typeface="Helvetica Neue"/>
+                        </a:rPr>
+                        <a:t>the</a:t>
+                      </a:r>
+                      <a:r>
+                        <a:rPr lang="de-DE" dirty="0" smtClean="0">
+                          <a:latin typeface="Helvetica Neue"/>
+                          <a:cs typeface="Helvetica Neue"/>
+                        </a:rPr>
+                        <a:t> </a:t>
+                      </a:r>
+                      <a:r>
+                        <a:rPr lang="de-DE" dirty="0" err="1" smtClean="0">
+                          <a:latin typeface="Helvetica Neue"/>
+                          <a:cs typeface="Helvetica Neue"/>
+                        </a:rPr>
+                        <a:t>website</a:t>
+                      </a:r>
+                      <a:r>
+                        <a:rPr lang="de-DE" dirty="0" smtClean="0">
+                          <a:latin typeface="Helvetica Neue"/>
+                          <a:cs typeface="Helvetica Neue"/>
+                        </a:rPr>
+                        <a:t> </a:t>
+                      </a:r>
+                      <a:r>
+                        <a:rPr lang="de-DE" dirty="0" err="1" smtClean="0">
+                          <a:latin typeface="Helvetica Neue"/>
+                          <a:cs typeface="Helvetica Neue"/>
+                        </a:rPr>
+                        <a:t>and</a:t>
+                      </a:r>
+                      <a:r>
+                        <a:rPr lang="de-DE" dirty="0" smtClean="0">
+                          <a:latin typeface="Helvetica Neue"/>
+                          <a:cs typeface="Helvetica Neue"/>
+                        </a:rPr>
+                        <a:t> was </a:t>
+                      </a:r>
+                      <a:r>
+                        <a:rPr lang="de-DE" dirty="0" err="1" smtClean="0">
+                          <a:latin typeface="Helvetica Neue"/>
+                          <a:cs typeface="Helvetica Neue"/>
+                        </a:rPr>
+                        <a:t>approved</a:t>
                       </a:r>
                       <a:endParaRPr lang="de-DE" dirty="0">
                         <a:latin typeface="Helvetica Neue"/>
@@ -11001,11 +11197,55 @@
                   </a:txBody>
                   <a:tcPr/>
                 </a:tc>
-                <a:tc>
-                  <a:txBody>
-                    <a:bodyPr/>
-                    <a:lstStyle/>
-                    <a:p>
+              </a:tr>
+              <a:tr h="370840">
+                <a:tc>
+                  <a:txBody>
+                    <a:bodyPr/>
+                    <a:lstStyle/>
+                    <a:p>
+                      <a:r>
+                        <a:rPr lang="de-DE" dirty="0" smtClean="0">
+                          <a:latin typeface="Helvetica Neue"/>
+                          <a:cs typeface="Helvetica Neue"/>
+                        </a:rPr>
+                        <a:t>Main </a:t>
+                      </a:r>
+                      <a:r>
+                        <a:rPr lang="de-DE" dirty="0" err="1" smtClean="0">
+                          <a:latin typeface="Helvetica Neue"/>
+                          <a:cs typeface="Helvetica Neue"/>
+                        </a:rPr>
+                        <a:t>Course</a:t>
+                      </a:r>
+                      <a:r>
+                        <a:rPr lang="de-DE" dirty="0" smtClean="0">
+                          <a:latin typeface="Helvetica Neue"/>
+                          <a:cs typeface="Helvetica Neue"/>
+                        </a:rPr>
+                        <a:t> </a:t>
+                      </a:r>
+                      <a:r>
+                        <a:rPr lang="de-DE" dirty="0" err="1" smtClean="0">
+                          <a:latin typeface="Helvetica Neue"/>
+                          <a:cs typeface="Helvetica Neue"/>
+                        </a:rPr>
+                        <a:t>fo</a:t>
+                      </a:r>
+                      <a:r>
+                        <a:rPr lang="de-DE" dirty="0" smtClean="0">
+                          <a:latin typeface="Helvetica Neue"/>
+                          <a:cs typeface="Helvetica Neue"/>
+                        </a:rPr>
+                        <a:t> </a:t>
+                      </a:r>
+                      <a:r>
+                        <a:rPr lang="de-DE" dirty="0" err="1" smtClean="0">
+                          <a:latin typeface="Helvetica Neue"/>
+                          <a:cs typeface="Helvetica Neue"/>
+                        </a:rPr>
+                        <a:t>Execution</a:t>
+                      </a:r>
                       <a:endParaRPr lang="de-DE" dirty="0">
                         <a:latin typeface="Helvetica Neue"/>
                         <a:cs typeface="Helvetica Neue"/>
@@ -11014,8 +11254,6 @@
                   </a:txBody>
                   <a:tcPr/>
                 </a:tc>
-              </a:tr>
-              <a:tr h="370840">
                 <a:tc>
                   <a:txBody>
                     <a:bodyPr/>
@@ -11026,42 +11264,105 @@
                           <a:latin typeface="Helvetica Neue"/>
                           <a:cs typeface="Helvetica Neue"/>
                         </a:rPr>
-                        <a:t>Main </a:t>
+                        <a:t>User </a:t>
                       </a:r>
                       <a:r>
                         <a:rPr lang="de-DE" dirty="0" err="1" smtClean="0">
                           <a:latin typeface="Helvetica Neue"/>
                           <a:cs typeface="Helvetica Neue"/>
                         </a:rPr>
-                        <a:t>Course</a:t>
+                        <a:t>clicks</a:t>
                       </a:r>
                       <a:r>
                         <a:rPr lang="de-DE" dirty="0" smtClean="0">
                           <a:latin typeface="Helvetica Neue"/>
                           <a:cs typeface="Helvetica Neue"/>
                         </a:rPr>
+                        <a:t> on Login, </a:t>
+                      </a:r>
+                      <a:r>
+                        <a:rPr lang="de-DE" dirty="0" err="1" smtClean="0">
+                          <a:latin typeface="Helvetica Neue"/>
+                          <a:cs typeface="Helvetica Neue"/>
+                        </a:rPr>
+                        <a:t>enters</a:t>
+                      </a:r>
+                      <a:r>
+                        <a:rPr lang="de-DE" baseline="0" dirty="0" smtClean="0">
+                          <a:latin typeface="Helvetica Neue"/>
+                          <a:cs typeface="Helvetica Neue"/>
+                        </a:rPr>
                         <a:t> </a:t>
                       </a:r>
                       <a:r>
-                        <a:rPr lang="de-DE" dirty="0" err="1" smtClean="0">
-                          <a:latin typeface="Helvetica Neue"/>
-                          <a:cs typeface="Helvetica Neue"/>
-                        </a:rPr>
-                        <a:t>fo</a:t>
-                      </a:r>
-                      <a:r>
-                        <a:rPr lang="de-DE" dirty="0" smtClean="0">
+                        <a:rPr lang="de-DE" baseline="0" dirty="0" err="1" smtClean="0">
+                          <a:latin typeface="Helvetica Neue"/>
+                          <a:cs typeface="Helvetica Neue"/>
+                        </a:rPr>
+                        <a:t>his</a:t>
+                      </a:r>
+                      <a:r>
+                        <a:rPr lang="de-DE" baseline="0" dirty="0" smtClean="0">
                           <a:latin typeface="Helvetica Neue"/>
                           <a:cs typeface="Helvetica Neue"/>
                         </a:rPr>
                         <a:t> </a:t>
                       </a:r>
                       <a:r>
-                        <a:rPr lang="de-DE" dirty="0" err="1" smtClean="0">
-                          <a:latin typeface="Helvetica Neue"/>
-                          <a:cs typeface="Helvetica Neue"/>
-                        </a:rPr>
-                        <a:t>Execution</a:t>
+                        <a:rPr lang="de-DE" baseline="0" dirty="0" err="1" smtClean="0">
+                          <a:latin typeface="Helvetica Neue"/>
+                          <a:cs typeface="Helvetica Neue"/>
+                        </a:rPr>
+                        <a:t>credentials</a:t>
+                      </a:r>
+                      <a:r>
+                        <a:rPr lang="de-DE" baseline="0" dirty="0" smtClean="0">
+                          <a:latin typeface="Helvetica Neue"/>
+                          <a:cs typeface="Helvetica Neue"/>
+                        </a:rPr>
+                        <a:t> </a:t>
+                      </a:r>
+                      <a:r>
+                        <a:rPr lang="de-DE" baseline="0" dirty="0" err="1" smtClean="0">
+                          <a:latin typeface="Helvetica Neue"/>
+                          <a:cs typeface="Helvetica Neue"/>
+                        </a:rPr>
+                        <a:t>and</a:t>
+                      </a:r>
+                      <a:r>
+                        <a:rPr lang="de-DE" baseline="0" dirty="0" smtClean="0">
+                          <a:latin typeface="Helvetica Neue"/>
+                          <a:cs typeface="Helvetica Neue"/>
+                        </a:rPr>
+                        <a:t> </a:t>
+                      </a:r>
+                      <a:r>
+                        <a:rPr lang="de-DE" baseline="0" dirty="0" err="1" smtClean="0">
+                          <a:latin typeface="Helvetica Neue"/>
+                          <a:cs typeface="Helvetica Neue"/>
+                        </a:rPr>
+                        <a:t>clicks</a:t>
+                      </a:r>
+                      <a:r>
+                        <a:rPr lang="de-DE" baseline="0" dirty="0" smtClean="0">
+                          <a:latin typeface="Helvetica Neue"/>
+                          <a:cs typeface="Helvetica Neue"/>
+                        </a:rPr>
+                        <a:t> </a:t>
+                      </a:r>
+                      <a:r>
+                        <a:rPr lang="de-DE" baseline="0" dirty="0" err="1" smtClean="0">
+                          <a:latin typeface="Helvetica Neue"/>
+                          <a:cs typeface="Helvetica Neue"/>
+                        </a:rPr>
+                        <a:t>Sign</a:t>
+                      </a:r>
+                      <a:r>
+                        <a:rPr lang="de-DE" baseline="0" dirty="0" smtClean="0">
+                          <a:latin typeface="Helvetica Neue"/>
+                          <a:cs typeface="Helvetica Neue"/>
+                        </a:rPr>
+                        <a:t> In</a:t>
                       </a:r>
                       <a:endParaRPr lang="de-DE" dirty="0">
                         <a:latin typeface="Helvetica Neue"/>
@@ -11071,11 +11372,34 @@
                   </a:txBody>
                   <a:tcPr/>
                 </a:tc>
-                <a:tc>
-                  <a:txBody>
-                    <a:bodyPr/>
-                    <a:lstStyle/>
-                    <a:p>
+              </a:tr>
+              <a:tr h="370840">
+                <a:tc>
+                  <a:txBody>
+                    <a:bodyPr/>
+                    <a:lstStyle/>
+                    <a:p>
+                      <a:r>
+                        <a:rPr lang="de-DE" dirty="0" err="1" smtClean="0">
+                          <a:latin typeface="Helvetica Neue"/>
+                          <a:cs typeface="Helvetica Neue"/>
+                        </a:rPr>
+                        <a:t>Alternate</a:t>
+                      </a:r>
+                      <a:r>
+                        <a:rPr lang="de-DE" dirty="0" smtClean="0">
+                          <a:latin typeface="Helvetica Neue"/>
+                          <a:cs typeface="Helvetica Neue"/>
+                        </a:rPr>
+                        <a:t> </a:t>
+                      </a:r>
+                      <a:r>
+                        <a:rPr lang="de-DE" dirty="0" err="1" smtClean="0">
+                          <a:latin typeface="Helvetica Neue"/>
+                          <a:cs typeface="Helvetica Neue"/>
+                        </a:rPr>
+                        <a:t>Courses</a:t>
+                      </a:r>
                       <a:endParaRPr lang="de-DE" dirty="0">
                         <a:latin typeface="Helvetica Neue"/>
                         <a:cs typeface="Helvetica Neue"/>
@@ -11084,33 +11408,17 @@
                   </a:txBody>
                   <a:tcPr/>
                 </a:tc>
-              </a:tr>
-              <a:tr h="370840">
-                <a:tc>
-                  <a:txBody>
-                    <a:bodyPr/>
-                    <a:lstStyle/>
-                    <a:p>
-                      <a:r>
-                        <a:rPr lang="de-DE" dirty="0" err="1" smtClean="0">
-                          <a:latin typeface="Helvetica Neue"/>
-                          <a:cs typeface="Helvetica Neue"/>
-                        </a:rPr>
-                        <a:t>Alternate</a:t>
-                      </a:r>
+                <a:tc>
+                  <a:txBody>
+                    <a:bodyPr/>
+                    <a:lstStyle/>
+                    <a:p>
                       <a:r>
                         <a:rPr lang="de-DE" dirty="0" smtClean="0">
                           <a:latin typeface="Helvetica Neue"/>
                           <a:cs typeface="Helvetica Neue"/>
                         </a:rPr>
-                        <a:t> </a:t>
-                      </a:r>
-                      <a:r>
-                        <a:rPr lang="de-DE" dirty="0" err="1" smtClean="0">
-                          <a:latin typeface="Helvetica Neue"/>
-                          <a:cs typeface="Helvetica Neue"/>
-                        </a:rPr>
-                        <a:t>Courses</a:t>
+                        <a:t>-</a:t>
                       </a:r>
                       <a:endParaRPr lang="de-DE" dirty="0">
                         <a:latin typeface="Helvetica Neue"/>
@@ -11120,11 +11428,20 @@
                   </a:txBody>
                   <a:tcPr/>
                 </a:tc>
-                <a:tc>
-                  <a:txBody>
-                    <a:bodyPr/>
-                    <a:lstStyle/>
-                    <a:p>
+              </a:tr>
+              <a:tr h="370840">
+                <a:tc>
+                  <a:txBody>
+                    <a:bodyPr/>
+                    <a:lstStyle/>
+                    <a:p>
+                      <a:r>
+                        <a:rPr lang="de-DE" dirty="0" err="1" smtClean="0">
+                          <a:latin typeface="Helvetica Neue"/>
+                          <a:cs typeface="Helvetica Neue"/>
+                        </a:rPr>
+                        <a:t>Exceptions</a:t>
+                      </a:r>
                       <a:endParaRPr lang="de-DE" dirty="0">
                         <a:latin typeface="Helvetica Neue"/>
                         <a:cs typeface="Helvetica Neue"/>
@@ -11133,8 +11450,6 @@
                   </a:txBody>
                   <a:tcPr/>
                 </a:tc>
-              </a:tr>
-              <a:tr h="370840">
                 <a:tc>
                   <a:txBody>
                     <a:bodyPr/>
@@ -11145,7 +11460,91 @@
                           <a:latin typeface="Helvetica Neue"/>
                           <a:cs typeface="Helvetica Neue"/>
                         </a:rPr>
-                        <a:t>Exceptions</a:t>
+                        <a:t>No</a:t>
+                      </a:r>
+                      <a:r>
+                        <a:rPr lang="de-DE" dirty="0" smtClean="0">
+                          <a:latin typeface="Helvetica Neue"/>
+                          <a:cs typeface="Helvetica Neue"/>
+                        </a:rPr>
+                        <a:t> real</a:t>
+                      </a:r>
+                      <a:r>
+                        <a:rPr lang="de-DE" baseline="0" dirty="0" smtClean="0">
+                          <a:latin typeface="Helvetica Neue"/>
+                          <a:cs typeface="Helvetica Neue"/>
+                        </a:rPr>
+                        <a:t> </a:t>
+                      </a:r>
+                      <a:r>
+                        <a:rPr lang="de-DE" baseline="0" dirty="0" err="1" smtClean="0">
+                          <a:latin typeface="Helvetica Neue"/>
+                          <a:cs typeface="Helvetica Neue"/>
+                        </a:rPr>
+                        <a:t>exceptions</a:t>
+                      </a:r>
+                      <a:r>
+                        <a:rPr lang="de-DE" baseline="0" dirty="0" smtClean="0">
+                          <a:latin typeface="Helvetica Neue"/>
+                          <a:cs typeface="Helvetica Neue"/>
+                        </a:rPr>
+                        <a:t>, </a:t>
+                      </a:r>
+                      <a:r>
+                        <a:rPr lang="de-DE" baseline="0" dirty="0" err="1" smtClean="0">
+                          <a:latin typeface="Helvetica Neue"/>
+                          <a:cs typeface="Helvetica Neue"/>
+                        </a:rPr>
+                        <a:t>only</a:t>
+                      </a:r>
+                      <a:r>
+                        <a:rPr lang="de-DE" baseline="0" dirty="0" smtClean="0">
+                          <a:latin typeface="Helvetica Neue"/>
+                          <a:cs typeface="Helvetica Neue"/>
+                        </a:rPr>
+                        <a:t> </a:t>
+                      </a:r>
+                      <a:r>
+                        <a:rPr lang="de-DE" baseline="0" dirty="0" err="1" smtClean="0">
+                          <a:latin typeface="Helvetica Neue"/>
+                          <a:cs typeface="Helvetica Neue"/>
+                        </a:rPr>
+                        <a:t>error</a:t>
+                      </a:r>
+                      <a:r>
+                        <a:rPr lang="de-DE" baseline="0" dirty="0" smtClean="0">
+                          <a:latin typeface="Helvetica Neue"/>
+                          <a:cs typeface="Helvetica Neue"/>
+                        </a:rPr>
+                        <a:t> </a:t>
+                      </a:r>
+                      <a:r>
+                        <a:rPr lang="de-DE" baseline="0" dirty="0" err="1" smtClean="0">
+                          <a:latin typeface="Helvetica Neue"/>
+                          <a:cs typeface="Helvetica Neue"/>
+                        </a:rPr>
+                        <a:t>messages</a:t>
+                      </a:r>
+                      <a:r>
+                        <a:rPr lang="de-DE" baseline="0" dirty="0" smtClean="0">
+                          <a:latin typeface="Helvetica Neue"/>
+                          <a:cs typeface="Helvetica Neue"/>
+                        </a:rPr>
+                        <a:t> </a:t>
+                      </a:r>
+                      <a:r>
+                        <a:rPr lang="de-DE" baseline="0" dirty="0" err="1" smtClean="0">
+                          <a:latin typeface="Helvetica Neue"/>
+                          <a:cs typeface="Helvetica Neue"/>
+                        </a:rPr>
+                        <a:t>for</a:t>
+                      </a:r>
+                      <a:r>
+                        <a:rPr lang="de-DE" baseline="0" dirty="0" smtClean="0">
+                          <a:latin typeface="Helvetica Neue"/>
+                          <a:cs typeface="Helvetica Neue"/>
+                        </a:rPr>
+                        <a:t> User</a:t>
                       </a:r>
                       <a:endParaRPr lang="de-DE" dirty="0">
                         <a:latin typeface="Helvetica Neue"/>
@@ -11155,11 +11554,27 @@
                   </a:txBody>
                   <a:tcPr/>
                 </a:tc>
-                <a:tc>
-                  <a:txBody>
-                    <a:bodyPr/>
-                    <a:lstStyle/>
-                    <a:p>
+              </a:tr>
+              <a:tr h="370840">
+                <a:tc>
+                  <a:txBody>
+                    <a:bodyPr/>
+                    <a:lstStyle/>
+                    <a:p>
+                      <a:r>
+                        <a:rPr lang="de-DE" dirty="0" smtClean="0">
+                          <a:latin typeface="Helvetica Neue"/>
+                          <a:cs typeface="Helvetica Neue"/>
+                        </a:rPr>
+                        <a:t>Post-</a:t>
+                      </a:r>
+                      <a:r>
+                        <a:rPr lang="de-DE" dirty="0" err="1" smtClean="0">
+                          <a:latin typeface="Helvetica Neue"/>
+                          <a:cs typeface="Helvetica Neue"/>
+                        </a:rPr>
+                        <a:t>conditions</a:t>
+                      </a:r>
                       <a:endParaRPr lang="de-DE" dirty="0">
                         <a:latin typeface="Helvetica Neue"/>
                         <a:cs typeface="Helvetica Neue"/>
@@ -11168,8 +11583,6 @@
                   </a:txBody>
                   <a:tcPr/>
                 </a:tc>
-              </a:tr>
-              <a:tr h="370840">
                 <a:tc>
                   <a:txBody>
                     <a:bodyPr/>
@@ -11180,14 +11593,70 @@
                           <a:latin typeface="Helvetica Neue"/>
                           <a:cs typeface="Helvetica Neue"/>
                         </a:rPr>
-                        <a:t>Post-</a:t>
+                        <a:t>User </a:t>
                       </a:r>
                       <a:r>
                         <a:rPr lang="de-DE" dirty="0" err="1" smtClean="0">
                           <a:latin typeface="Helvetica Neue"/>
                           <a:cs typeface="Helvetica Neue"/>
                         </a:rPr>
-                        <a:t>conditions</a:t>
+                        <a:t>is</a:t>
+                      </a:r>
+                      <a:r>
+                        <a:rPr lang="de-DE" baseline="0" dirty="0" smtClean="0">
+                          <a:latin typeface="Helvetica Neue"/>
+                          <a:cs typeface="Helvetica Neue"/>
+                        </a:rPr>
+                        <a:t> </a:t>
+                      </a:r>
+                      <a:r>
+                        <a:rPr lang="de-DE" baseline="0" dirty="0" err="1" smtClean="0">
+                          <a:latin typeface="Helvetica Neue"/>
+                          <a:cs typeface="Helvetica Neue"/>
+                        </a:rPr>
+                        <a:t>redirected</a:t>
+                      </a:r>
+                      <a:r>
+                        <a:rPr lang="de-DE" baseline="0" dirty="0" smtClean="0">
+                          <a:latin typeface="Helvetica Neue"/>
+                          <a:cs typeface="Helvetica Neue"/>
+                        </a:rPr>
+                        <a:t> </a:t>
+                      </a:r>
+                      <a:r>
+                        <a:rPr lang="de-DE" baseline="0" dirty="0" err="1" smtClean="0">
+                          <a:latin typeface="Helvetica Neue"/>
+                          <a:cs typeface="Helvetica Neue"/>
+                        </a:rPr>
+                        <a:t>to</a:t>
+                      </a:r>
+                      <a:r>
+                        <a:rPr lang="de-DE" baseline="0" dirty="0" smtClean="0">
+                          <a:latin typeface="Helvetica Neue"/>
+                          <a:cs typeface="Helvetica Neue"/>
+                        </a:rPr>
+                        <a:t> </a:t>
+                      </a:r>
+                      <a:r>
+                        <a:rPr lang="de-DE" baseline="0" dirty="0" err="1" smtClean="0">
+                          <a:latin typeface="Helvetica Neue"/>
+                          <a:cs typeface="Helvetica Neue"/>
+                        </a:rPr>
+                        <a:t>Overview</a:t>
+                      </a:r>
+                      <a:r>
+                        <a:rPr lang="de-DE" baseline="0" dirty="0" smtClean="0">
+                          <a:latin typeface="Helvetica Neue"/>
+                          <a:cs typeface="Helvetica Neue"/>
+                        </a:rPr>
+                        <a:t> </a:t>
+                      </a:r>
+                      <a:r>
+                        <a:rPr lang="de-DE" baseline="0" dirty="0" err="1" smtClean="0">
+                          <a:latin typeface="Helvetica Neue"/>
+                          <a:cs typeface="Helvetica Neue"/>
+                        </a:rPr>
+                        <a:t>page</a:t>
                       </a:r>
                       <a:endParaRPr lang="de-DE" dirty="0">
                         <a:latin typeface="Helvetica Neue"/>
@@ -11197,11 +11666,48 @@
                   </a:txBody>
                   <a:tcPr/>
                 </a:tc>
-                <a:tc>
-                  <a:txBody>
-                    <a:bodyPr/>
-                    <a:lstStyle/>
-                    <a:p>
+              </a:tr>
+              <a:tr h="370840">
+                <a:tc>
+                  <a:txBody>
+                    <a:bodyPr/>
+                    <a:lstStyle/>
+                    <a:p>
+                      <a:r>
+                        <a:rPr lang="de-DE" dirty="0" smtClean="0">
+                          <a:latin typeface="Helvetica Neue"/>
+                          <a:cs typeface="Helvetica Neue"/>
+                        </a:rPr>
+                        <a:t>Data</a:t>
+                      </a:r>
+                      <a:r>
+                        <a:rPr lang="de-DE" baseline="0" dirty="0" smtClean="0">
+                          <a:latin typeface="Helvetica Neue"/>
+                          <a:cs typeface="Helvetica Neue"/>
+                        </a:rPr>
+                        <a:t> </a:t>
+                      </a:r>
+                      <a:r>
+                        <a:rPr lang="de-DE" baseline="0" dirty="0" err="1" smtClean="0">
+                          <a:latin typeface="Helvetica Neue"/>
+                          <a:cs typeface="Helvetica Neue"/>
+                        </a:rPr>
+                        <a:t>formats</a:t>
+                      </a:r>
+                      <a:r>
+                        <a:rPr lang="de-DE" baseline="0" dirty="0" smtClean="0">
+                          <a:latin typeface="Helvetica Neue"/>
+                          <a:cs typeface="Helvetica Neue"/>
+                        </a:rPr>
+                        <a:t> </a:t>
+                      </a:r>
+                      <a:r>
+                        <a:rPr lang="de-DE" baseline="0" dirty="0" err="1" smtClean="0">
+                          <a:latin typeface="Helvetica Neue"/>
+                          <a:cs typeface="Helvetica Neue"/>
+                        </a:rPr>
+                        <a:t>used</a:t>
+                      </a:r>
                       <a:endParaRPr lang="de-DE" dirty="0">
                         <a:latin typeface="Helvetica Neue"/>
                         <a:cs typeface="Helvetica Neue"/>
@@ -11210,8 +11716,6 @@
                   </a:txBody>
                   <a:tcPr/>
                 </a:tc>
-              </a:tr>
-              <a:tr h="370840">
                 <a:tc>
                   <a:txBody>
                     <a:bodyPr/>
@@ -11222,49 +11726,8 @@
                           <a:latin typeface="Helvetica Neue"/>
                           <a:cs typeface="Helvetica Neue"/>
                         </a:rPr>
-                        <a:t>Data</a:t>
-                      </a:r>
-                      <a:r>
-                        <a:rPr lang="de-DE" baseline="0" dirty="0" smtClean="0">
-                          <a:latin typeface="Helvetica Neue"/>
-                          <a:cs typeface="Helvetica Neue"/>
-                        </a:rPr>
-                        <a:t> </a:t>
-                      </a:r>
-                      <a:r>
-                        <a:rPr lang="de-DE" baseline="0" dirty="0" err="1" smtClean="0">
-                          <a:latin typeface="Helvetica Neue"/>
-                          <a:cs typeface="Helvetica Neue"/>
-                        </a:rPr>
-                        <a:t>formats</a:t>
-                      </a:r>
-                      <a:r>
-                        <a:rPr lang="de-DE" baseline="0" dirty="0" smtClean="0">
-                          <a:latin typeface="Helvetica Neue"/>
-                          <a:cs typeface="Helvetica Neue"/>
-                        </a:rPr>
-                        <a:t> </a:t>
-                      </a:r>
-                      <a:r>
-                        <a:rPr lang="de-DE" baseline="0" dirty="0" err="1" smtClean="0">
-                          <a:latin typeface="Helvetica Neue"/>
-                          <a:cs typeface="Helvetica Neue"/>
-                        </a:rPr>
-                        <a:t>used</a:t>
-                      </a:r>
-                      <a:endParaRPr lang="de-DE" dirty="0">
-                        <a:latin typeface="Helvetica Neue"/>
-                        <a:cs typeface="Helvetica Neue"/>
-                      </a:endParaRPr>
-                    </a:p>
-                  </a:txBody>
-                  <a:tcPr/>
-                </a:tc>
-                <a:tc>
-                  <a:txBody>
-                    <a:bodyPr/>
-                    <a:lstStyle/>
-                    <a:p>
+                        <a:t>HTML form</a:t>
+                      </a:r>
                       <a:endParaRPr lang="de-DE" dirty="0">
                         <a:latin typeface="Helvetica Neue"/>
                         <a:cs typeface="Helvetica Neue"/>
@@ -11282,6 +11745,1006 @@
     <p:extLst>
       <p:ext uri="{BB962C8B-B14F-4D97-AF65-F5344CB8AC3E}">
         <p14:creationId xmlns:p14="http://schemas.microsoft.com/office/powerpoint/2010/main" val="3059275905"/>
+      </p:ext>
+    </p:extLst>
+  </p:cSld>
+  <p:clrMapOvr>
+    <a:masterClrMapping/>
+  </p:clrMapOvr>
+</p:sld>
+</file>
+
+<file path=ppt/slides/slide9.xml><?xml version="1.0" encoding="utf-8"?>
+<p:sld xmlns:a="http://schemas.openxmlformats.org/drawingml/2006/main" xmlns:r="http://schemas.openxmlformats.org/officeDocument/2006/relationships" xmlns:p="http://schemas.openxmlformats.org/presentationml/2006/main">
+  <p:cSld>
+    <p:spTree>
+      <p:nvGrpSpPr>
+        <p:cNvPr id="1" name=""/>
+        <p:cNvGrpSpPr/>
+        <p:nvPr/>
+      </p:nvGrpSpPr>
+      <p:grpSpPr>
+        <a:xfrm>
+          <a:off x="0" y="0"/>
+          <a:ext cx="0" cy="0"/>
+          <a:chOff x="0" y="0"/>
+          <a:chExt cx="0" cy="0"/>
+        </a:xfrm>
+      </p:grpSpPr>
+      <p:sp>
+        <p:nvSpPr>
+          <p:cNvPr id="2" name="Titel 1"/>
+          <p:cNvSpPr>
+            <a:spLocks noGrp="1"/>
+          </p:cNvSpPr>
+          <p:nvPr>
+            <p:ph type="title"/>
+          </p:nvPr>
+        </p:nvSpPr>
+        <p:spPr/>
+        <p:txBody>
+          <a:bodyPr/>
+          <a:lstStyle/>
+          <a:p>
+            <a:r>
+              <a:rPr lang="de-DE" dirty="0" err="1" smtClean="0"/>
+              <a:t>Use</a:t>
+            </a:r>
+            <a:r>
+              <a:rPr lang="de-DE" dirty="0" smtClean="0"/>
+              <a:t> Case Description (2)</a:t>
+            </a:r>
+            <a:endParaRPr lang="de-DE" dirty="0"/>
+          </a:p>
+        </p:txBody>
+      </p:sp>
+      <p:graphicFrame>
+        <p:nvGraphicFramePr>
+          <p:cNvPr id="4" name="Inhaltsplatzhalter 3"/>
+          <p:cNvGraphicFramePr>
+            <a:graphicFrameLocks noGrp="1"/>
+          </p:cNvGraphicFramePr>
+          <p:nvPr>
+            <p:ph idx="1"/>
+            <p:extLst>
+              <p:ext uri="{D42A27DB-BD31-4B8C-83A1-F6EECF244321}">
+                <p14:modId xmlns:p14="http://schemas.microsoft.com/office/powerpoint/2010/main" val="4134538167"/>
+              </p:ext>
+            </p:extLst>
+          </p:nvPr>
+        </p:nvGraphicFramePr>
+        <p:xfrm>
+          <a:off x="457200" y="1659977"/>
+          <a:ext cx="8229600" cy="4688839"/>
+        </p:xfrm>
+        <a:graphic>
+          <a:graphicData uri="http://schemas.openxmlformats.org/drawingml/2006/table">
+            <a:tbl>
+              <a:tblPr firstRow="1" bandRow="1">
+                <a:tableStyleId>{8EC20E35-A176-4012-BC5E-935CFFF8708E}</a:tableStyleId>
+              </a:tblPr>
+              <a:tblGrid>
+                <a:gridCol w="4114800"/>
+                <a:gridCol w="4114800"/>
+              </a:tblGrid>
+              <a:tr h="370840">
+                <a:tc>
+                  <a:txBody>
+                    <a:bodyPr/>
+                    <a:lstStyle/>
+                    <a:p>
+                      <a:r>
+                        <a:rPr lang="de-DE" b="0" dirty="0" smtClean="0">
+                          <a:latin typeface="Helvetica Neue"/>
+                          <a:cs typeface="Helvetica Neue"/>
+                        </a:rPr>
+                        <a:t>Name</a:t>
+                      </a:r>
+                      <a:endParaRPr lang="de-DE" b="0" dirty="0">
+                        <a:latin typeface="Helvetica Neue"/>
+                        <a:cs typeface="Helvetica Neue"/>
+                      </a:endParaRPr>
+                    </a:p>
+                  </a:txBody>
+                  <a:tcPr/>
+                </a:tc>
+                <a:tc>
+                  <a:txBody>
+                    <a:bodyPr/>
+                    <a:lstStyle/>
+                    <a:p>
+                      <a:r>
+                        <a:rPr lang="de-DE" b="0" dirty="0" smtClean="0">
+                          <a:latin typeface="Helvetica Neue"/>
+                          <a:cs typeface="Helvetica Neue"/>
+                        </a:rPr>
+                        <a:t>Registration Customer/Employee</a:t>
+                      </a:r>
+                      <a:endParaRPr lang="de-DE" b="0" dirty="0">
+                        <a:latin typeface="Helvetica Neue"/>
+                        <a:cs typeface="Helvetica Neue"/>
+                      </a:endParaRPr>
+                    </a:p>
+                  </a:txBody>
+                  <a:tcPr/>
+                </a:tc>
+              </a:tr>
+              <a:tr h="370840">
+                <a:tc>
+                  <a:txBody>
+                    <a:bodyPr/>
+                    <a:lstStyle/>
+                    <a:p>
+                      <a:r>
+                        <a:rPr lang="de-DE" dirty="0" smtClean="0">
+                          <a:latin typeface="Helvetica Neue"/>
+                          <a:cs typeface="Helvetica Neue"/>
+                        </a:rPr>
+                        <a:t>Goal</a:t>
+                      </a:r>
+                      <a:endParaRPr lang="de-DE" dirty="0">
+                        <a:latin typeface="Helvetica Neue"/>
+                        <a:cs typeface="Helvetica Neue"/>
+                      </a:endParaRPr>
+                    </a:p>
+                  </a:txBody>
+                  <a:tcPr/>
+                </a:tc>
+                <a:tc>
+                  <a:txBody>
+                    <a:bodyPr/>
+                    <a:lstStyle/>
+                    <a:p>
+                      <a:r>
+                        <a:rPr lang="de-DE" dirty="0" smtClean="0">
+                          <a:latin typeface="Helvetica Neue"/>
+                          <a:cs typeface="Helvetica Neue"/>
+                        </a:rPr>
+                        <a:t>User </a:t>
+                      </a:r>
+                      <a:r>
+                        <a:rPr lang="de-DE" dirty="0" err="1" smtClean="0">
+                          <a:latin typeface="Helvetica Neue"/>
+                          <a:cs typeface="Helvetica Neue"/>
+                        </a:rPr>
+                        <a:t>can</a:t>
+                      </a:r>
+                      <a:r>
+                        <a:rPr lang="de-DE" dirty="0" smtClean="0">
+                          <a:latin typeface="Helvetica Neue"/>
+                          <a:cs typeface="Helvetica Neue"/>
+                        </a:rPr>
+                        <a:t> </a:t>
+                      </a:r>
+                      <a:r>
+                        <a:rPr lang="de-DE" dirty="0" err="1" smtClean="0">
+                          <a:latin typeface="Helvetica Neue"/>
+                          <a:cs typeface="Helvetica Neue"/>
+                        </a:rPr>
+                        <a:t>register</a:t>
+                      </a:r>
+                      <a:r>
+                        <a:rPr lang="de-DE" dirty="0" smtClean="0">
+                          <a:latin typeface="Helvetica Neue"/>
+                          <a:cs typeface="Helvetica Neue"/>
+                        </a:rPr>
+                        <a:t> a</a:t>
+                      </a:r>
+                      <a:r>
+                        <a:rPr lang="de-DE" baseline="0" dirty="0" smtClean="0">
+                          <a:latin typeface="Helvetica Neue"/>
+                          <a:cs typeface="Helvetica Neue"/>
+                        </a:rPr>
+                        <a:t> </a:t>
+                      </a:r>
+                      <a:r>
+                        <a:rPr lang="de-DE" baseline="0" dirty="0" err="1" smtClean="0">
+                          <a:latin typeface="Helvetica Neue"/>
+                          <a:cs typeface="Helvetica Neue"/>
+                        </a:rPr>
+                        <a:t>customer</a:t>
+                      </a:r>
+                      <a:r>
+                        <a:rPr lang="de-DE" baseline="0" dirty="0" smtClean="0">
+                          <a:latin typeface="Helvetica Neue"/>
+                          <a:cs typeface="Helvetica Neue"/>
+                        </a:rPr>
+                        <a:t>/</a:t>
+                      </a:r>
+                      <a:r>
+                        <a:rPr lang="de-DE" baseline="0" dirty="0" err="1" smtClean="0">
+                          <a:latin typeface="Helvetica Neue"/>
+                          <a:cs typeface="Helvetica Neue"/>
+                        </a:rPr>
+                        <a:t>employee</a:t>
+                      </a:r>
+                      <a:r>
+                        <a:rPr lang="de-DE" baseline="0" dirty="0" smtClean="0">
+                          <a:latin typeface="Helvetica Neue"/>
+                          <a:cs typeface="Helvetica Neue"/>
+                        </a:rPr>
+                        <a:t> </a:t>
+                      </a:r>
+                      <a:r>
+                        <a:rPr lang="de-DE" baseline="0" dirty="0" err="1" smtClean="0">
+                          <a:latin typeface="Helvetica Neue"/>
+                          <a:cs typeface="Helvetica Neue"/>
+                        </a:rPr>
+                        <a:t>account</a:t>
+                      </a:r>
+                      <a:endParaRPr lang="de-DE" dirty="0">
+                        <a:latin typeface="Helvetica Neue"/>
+                        <a:cs typeface="Helvetica Neue"/>
+                      </a:endParaRPr>
+                    </a:p>
+                  </a:txBody>
+                  <a:tcPr/>
+                </a:tc>
+              </a:tr>
+              <a:tr h="370840">
+                <a:tc>
+                  <a:txBody>
+                    <a:bodyPr/>
+                    <a:lstStyle/>
+                    <a:p>
+                      <a:r>
+                        <a:rPr lang="de-DE" dirty="0" err="1" smtClean="0">
+                          <a:latin typeface="Helvetica Neue"/>
+                          <a:cs typeface="Helvetica Neue"/>
+                        </a:rPr>
+                        <a:t>Actors</a:t>
+                      </a:r>
+                      <a:endParaRPr lang="de-DE" dirty="0">
+                        <a:latin typeface="Helvetica Neue"/>
+                        <a:cs typeface="Helvetica Neue"/>
+                      </a:endParaRPr>
+                    </a:p>
+                  </a:txBody>
+                  <a:tcPr/>
+                </a:tc>
+                <a:tc>
+                  <a:txBody>
+                    <a:bodyPr/>
+                    <a:lstStyle/>
+                    <a:p>
+                      <a:r>
+                        <a:rPr lang="de-DE" dirty="0" smtClean="0">
+                          <a:latin typeface="Helvetica Neue"/>
+                          <a:cs typeface="Helvetica Neue"/>
+                        </a:rPr>
+                        <a:t>User, Employee</a:t>
+                      </a:r>
+                      <a:endParaRPr lang="de-DE" dirty="0">
+                        <a:latin typeface="Helvetica Neue"/>
+                        <a:cs typeface="Helvetica Neue"/>
+                      </a:endParaRPr>
+                    </a:p>
+                  </a:txBody>
+                  <a:tcPr/>
+                </a:tc>
+              </a:tr>
+              <a:tr h="370840">
+                <a:tc>
+                  <a:txBody>
+                    <a:bodyPr/>
+                    <a:lstStyle/>
+                    <a:p>
+                      <a:r>
+                        <a:rPr lang="de-DE" dirty="0" err="1" smtClean="0">
+                          <a:latin typeface="Helvetica Neue"/>
+                          <a:cs typeface="Helvetica Neue"/>
+                        </a:rPr>
+                        <a:t>Pre-conditions</a:t>
+                      </a:r>
+                      <a:endParaRPr lang="de-DE" dirty="0">
+                        <a:latin typeface="Helvetica Neue"/>
+                        <a:cs typeface="Helvetica Neue"/>
+                      </a:endParaRPr>
+                    </a:p>
+                  </a:txBody>
+                  <a:tcPr/>
+                </a:tc>
+                <a:tc>
+                  <a:txBody>
+                    <a:bodyPr/>
+                    <a:lstStyle/>
+                    <a:p>
+                      <a:r>
+                        <a:rPr lang="de-DE" dirty="0" smtClean="0">
+                          <a:latin typeface="Helvetica Neue"/>
+                          <a:cs typeface="Helvetica Neue"/>
+                        </a:rPr>
+                        <a:t>User </a:t>
+                      </a:r>
+                      <a:r>
+                        <a:rPr lang="de-DE" dirty="0" err="1" smtClean="0">
+                          <a:latin typeface="Helvetica Neue"/>
+                          <a:cs typeface="Helvetica Neue"/>
+                        </a:rPr>
+                        <a:t>doesn‘t</a:t>
+                      </a:r>
+                      <a:r>
+                        <a:rPr lang="de-DE" dirty="0" smtClean="0">
+                          <a:latin typeface="Helvetica Neue"/>
+                          <a:cs typeface="Helvetica Neue"/>
+                        </a:rPr>
+                        <a:t> </a:t>
+                      </a:r>
+                      <a:r>
+                        <a:rPr lang="de-DE" dirty="0" err="1" smtClean="0">
+                          <a:latin typeface="Helvetica Neue"/>
+                          <a:cs typeface="Helvetica Neue"/>
+                        </a:rPr>
+                        <a:t>exist</a:t>
+                      </a:r>
+                      <a:r>
+                        <a:rPr lang="de-DE" baseline="0" dirty="0" smtClean="0">
+                          <a:latin typeface="Helvetica Neue"/>
+                          <a:cs typeface="Helvetica Neue"/>
+                        </a:rPr>
+                        <a:t> </a:t>
+                      </a:r>
+                      <a:r>
+                        <a:rPr lang="de-DE" baseline="0" dirty="0" err="1" smtClean="0">
+                          <a:latin typeface="Helvetica Neue"/>
+                          <a:cs typeface="Helvetica Neue"/>
+                        </a:rPr>
+                        <a:t>yet</a:t>
+                      </a:r>
+                      <a:endParaRPr lang="de-DE" dirty="0">
+                        <a:latin typeface="Helvetica Neue"/>
+                        <a:cs typeface="Helvetica Neue"/>
+                      </a:endParaRPr>
+                    </a:p>
+                  </a:txBody>
+                  <a:tcPr/>
+                </a:tc>
+              </a:tr>
+              <a:tr h="370840">
+                <a:tc>
+                  <a:txBody>
+                    <a:bodyPr/>
+                    <a:lstStyle/>
+                    <a:p>
+                      <a:r>
+                        <a:rPr lang="de-DE" dirty="0" smtClean="0">
+                          <a:latin typeface="Helvetica Neue"/>
+                          <a:cs typeface="Helvetica Neue"/>
+                        </a:rPr>
+                        <a:t>Main </a:t>
+                      </a:r>
+                      <a:r>
+                        <a:rPr lang="de-DE" dirty="0" err="1" smtClean="0">
+                          <a:latin typeface="Helvetica Neue"/>
+                          <a:cs typeface="Helvetica Neue"/>
+                        </a:rPr>
+                        <a:t>Course</a:t>
+                      </a:r>
+                      <a:r>
+                        <a:rPr lang="de-DE" dirty="0" smtClean="0">
+                          <a:latin typeface="Helvetica Neue"/>
+                          <a:cs typeface="Helvetica Neue"/>
+                        </a:rPr>
+                        <a:t> </a:t>
+                      </a:r>
+                      <a:r>
+                        <a:rPr lang="de-DE" dirty="0" err="1" smtClean="0">
+                          <a:latin typeface="Helvetica Neue"/>
+                          <a:cs typeface="Helvetica Neue"/>
+                        </a:rPr>
+                        <a:t>fo</a:t>
+                      </a:r>
+                      <a:r>
+                        <a:rPr lang="de-DE" dirty="0" smtClean="0">
+                          <a:latin typeface="Helvetica Neue"/>
+                          <a:cs typeface="Helvetica Neue"/>
+                        </a:rPr>
+                        <a:t> </a:t>
+                      </a:r>
+                      <a:r>
+                        <a:rPr lang="de-DE" dirty="0" err="1" smtClean="0">
+                          <a:latin typeface="Helvetica Neue"/>
+                          <a:cs typeface="Helvetica Neue"/>
+                        </a:rPr>
+                        <a:t>Execution</a:t>
+                      </a:r>
+                      <a:endParaRPr lang="de-DE" dirty="0">
+                        <a:latin typeface="Helvetica Neue"/>
+                        <a:cs typeface="Helvetica Neue"/>
+                      </a:endParaRPr>
+                    </a:p>
+                  </a:txBody>
+                  <a:tcPr/>
+                </a:tc>
+                <a:tc>
+                  <a:txBody>
+                    <a:bodyPr/>
+                    <a:lstStyle/>
+                    <a:p>
+                      <a:r>
+                        <a:rPr lang="de-DE" dirty="0" smtClean="0">
+                          <a:latin typeface="Helvetica Neue"/>
+                          <a:cs typeface="Helvetica Neue"/>
+                        </a:rPr>
+                        <a:t>User </a:t>
+                      </a:r>
+                      <a:r>
+                        <a:rPr lang="de-DE" dirty="0" err="1" smtClean="0">
+                          <a:latin typeface="Helvetica Neue"/>
+                          <a:cs typeface="Helvetica Neue"/>
+                        </a:rPr>
+                        <a:t>clicks</a:t>
+                      </a:r>
+                      <a:r>
+                        <a:rPr lang="de-DE" dirty="0" smtClean="0">
+                          <a:latin typeface="Helvetica Neue"/>
+                          <a:cs typeface="Helvetica Neue"/>
+                        </a:rPr>
+                        <a:t> on Register/Jobs, </a:t>
+                      </a:r>
+                      <a:r>
+                        <a:rPr lang="de-DE" dirty="0" err="1" smtClean="0">
+                          <a:latin typeface="Helvetica Neue"/>
+                          <a:cs typeface="Helvetica Neue"/>
+                        </a:rPr>
+                        <a:t>fills</a:t>
+                      </a:r>
+                      <a:r>
+                        <a:rPr lang="de-DE" dirty="0" smtClean="0">
+                          <a:latin typeface="Helvetica Neue"/>
+                          <a:cs typeface="Helvetica Neue"/>
+                        </a:rPr>
+                        <a:t> out </a:t>
+                      </a:r>
+                      <a:r>
+                        <a:rPr lang="de-DE" dirty="0" err="1" smtClean="0">
+                          <a:latin typeface="Helvetica Neue"/>
+                          <a:cs typeface="Helvetica Neue"/>
+                        </a:rPr>
+                        <a:t>the</a:t>
+                      </a:r>
+                      <a:r>
+                        <a:rPr lang="de-DE" dirty="0" smtClean="0">
+                          <a:latin typeface="Helvetica Neue"/>
+                          <a:cs typeface="Helvetica Neue"/>
+                        </a:rPr>
+                        <a:t> HTML</a:t>
+                      </a:r>
+                      <a:r>
+                        <a:rPr lang="de-DE" baseline="0" dirty="0" smtClean="0">
+                          <a:latin typeface="Helvetica Neue"/>
+                          <a:cs typeface="Helvetica Neue"/>
+                        </a:rPr>
+                        <a:t> form </a:t>
+                      </a:r>
+                      <a:r>
+                        <a:rPr lang="de-DE" baseline="0" dirty="0" err="1" smtClean="0">
+                          <a:latin typeface="Helvetica Neue"/>
+                          <a:cs typeface="Helvetica Neue"/>
+                        </a:rPr>
+                        <a:t>and</a:t>
+                      </a:r>
+                      <a:r>
+                        <a:rPr lang="de-DE" baseline="0" dirty="0" smtClean="0">
+                          <a:latin typeface="Helvetica Neue"/>
+                          <a:cs typeface="Helvetica Neue"/>
+                        </a:rPr>
+                        <a:t> </a:t>
+                      </a:r>
+                      <a:r>
+                        <a:rPr lang="de-DE" baseline="0" dirty="0" err="1" smtClean="0">
+                          <a:latin typeface="Helvetica Neue"/>
+                          <a:cs typeface="Helvetica Neue"/>
+                        </a:rPr>
+                        <a:t>clicks</a:t>
+                      </a:r>
+                      <a:r>
+                        <a:rPr lang="de-DE" baseline="0" dirty="0" smtClean="0">
+                          <a:latin typeface="Helvetica Neue"/>
+                          <a:cs typeface="Helvetica Neue"/>
+                        </a:rPr>
+                        <a:t> </a:t>
+                      </a:r>
+                      <a:r>
+                        <a:rPr lang="de-DE" baseline="0" dirty="0" err="1" smtClean="0">
+                          <a:latin typeface="Helvetica Neue"/>
+                          <a:cs typeface="Helvetica Neue"/>
+                        </a:rPr>
+                        <a:t>Sign</a:t>
+                      </a:r>
+                      <a:r>
+                        <a:rPr lang="de-DE" baseline="0" dirty="0" smtClean="0">
+                          <a:latin typeface="Helvetica Neue"/>
+                          <a:cs typeface="Helvetica Neue"/>
+                        </a:rPr>
+                        <a:t> </a:t>
+                      </a:r>
+                      <a:r>
+                        <a:rPr lang="de-DE" baseline="0" dirty="0" err="1" smtClean="0">
+                          <a:latin typeface="Helvetica Neue"/>
+                          <a:cs typeface="Helvetica Neue"/>
+                        </a:rPr>
+                        <a:t>Up</a:t>
+                      </a:r>
+                      <a:endParaRPr lang="de-DE" dirty="0">
+                        <a:latin typeface="Helvetica Neue"/>
+                        <a:cs typeface="Helvetica Neue"/>
+                      </a:endParaRPr>
+                    </a:p>
+                  </a:txBody>
+                  <a:tcPr/>
+                </a:tc>
+              </a:tr>
+              <a:tr h="370840">
+                <a:tc>
+                  <a:txBody>
+                    <a:bodyPr/>
+                    <a:lstStyle/>
+                    <a:p>
+                      <a:r>
+                        <a:rPr lang="de-DE" dirty="0" err="1" smtClean="0">
+                          <a:latin typeface="Helvetica Neue"/>
+                          <a:cs typeface="Helvetica Neue"/>
+                        </a:rPr>
+                        <a:t>Alternate</a:t>
+                      </a:r>
+                      <a:r>
+                        <a:rPr lang="de-DE" dirty="0" smtClean="0">
+                          <a:latin typeface="Helvetica Neue"/>
+                          <a:cs typeface="Helvetica Neue"/>
+                        </a:rPr>
+                        <a:t> </a:t>
+                      </a:r>
+                      <a:r>
+                        <a:rPr lang="de-DE" dirty="0" err="1" smtClean="0">
+                          <a:latin typeface="Helvetica Neue"/>
+                          <a:cs typeface="Helvetica Neue"/>
+                        </a:rPr>
+                        <a:t>Courses</a:t>
+                      </a:r>
+                      <a:endParaRPr lang="de-DE" dirty="0">
+                        <a:latin typeface="Helvetica Neue"/>
+                        <a:cs typeface="Helvetica Neue"/>
+                      </a:endParaRPr>
+                    </a:p>
+                  </a:txBody>
+                  <a:tcPr/>
+                </a:tc>
+                <a:tc>
+                  <a:txBody>
+                    <a:bodyPr/>
+                    <a:lstStyle/>
+                    <a:p>
+                      <a:r>
+                        <a:rPr lang="de-DE" dirty="0" smtClean="0">
+                          <a:latin typeface="Helvetica Neue"/>
+                          <a:cs typeface="Helvetica Neue"/>
+                        </a:rPr>
+                        <a:t>-</a:t>
+                      </a:r>
+                      <a:endParaRPr lang="de-DE" dirty="0">
+                        <a:latin typeface="Helvetica Neue"/>
+                        <a:cs typeface="Helvetica Neue"/>
+                      </a:endParaRPr>
+                    </a:p>
+                  </a:txBody>
+                  <a:tcPr/>
+                </a:tc>
+              </a:tr>
+              <a:tr h="370840">
+                <a:tc>
+                  <a:txBody>
+                    <a:bodyPr/>
+                    <a:lstStyle/>
+                    <a:p>
+                      <a:r>
+                        <a:rPr lang="de-DE" dirty="0" err="1" smtClean="0">
+                          <a:latin typeface="Helvetica Neue"/>
+                          <a:cs typeface="Helvetica Neue"/>
+                        </a:rPr>
+                        <a:t>Exceptions</a:t>
+                      </a:r>
+                      <a:endParaRPr lang="de-DE" dirty="0">
+                        <a:latin typeface="Helvetica Neue"/>
+                        <a:cs typeface="Helvetica Neue"/>
+                      </a:endParaRPr>
+                    </a:p>
+                  </a:txBody>
+                  <a:tcPr/>
+                </a:tc>
+                <a:tc>
+                  <a:txBody>
+                    <a:bodyPr/>
+                    <a:lstStyle/>
+                    <a:p>
+                      <a:r>
+                        <a:rPr lang="de-DE" dirty="0" err="1" smtClean="0">
+                          <a:latin typeface="Helvetica Neue"/>
+                          <a:cs typeface="Helvetica Neue"/>
+                        </a:rPr>
+                        <a:t>No</a:t>
+                      </a:r>
+                      <a:r>
+                        <a:rPr lang="de-DE" dirty="0" smtClean="0">
+                          <a:latin typeface="Helvetica Neue"/>
+                          <a:cs typeface="Helvetica Neue"/>
+                        </a:rPr>
+                        <a:t> real </a:t>
+                      </a:r>
+                      <a:r>
+                        <a:rPr lang="de-DE" dirty="0" err="1" smtClean="0">
+                          <a:latin typeface="Helvetica Neue"/>
+                          <a:cs typeface="Helvetica Neue"/>
+                        </a:rPr>
+                        <a:t>exceptions</a:t>
+                      </a:r>
+                      <a:r>
+                        <a:rPr lang="de-DE" dirty="0" smtClean="0">
+                          <a:latin typeface="Helvetica Neue"/>
+                          <a:cs typeface="Helvetica Neue"/>
+                        </a:rPr>
+                        <a:t>,</a:t>
+                      </a:r>
+                      <a:r>
+                        <a:rPr lang="de-DE" baseline="0" dirty="0" smtClean="0">
+                          <a:latin typeface="Helvetica Neue"/>
+                          <a:cs typeface="Helvetica Neue"/>
+                        </a:rPr>
+                        <a:t> </a:t>
+                      </a:r>
+                      <a:r>
+                        <a:rPr lang="de-DE" baseline="0" dirty="0" err="1" smtClean="0">
+                          <a:latin typeface="Helvetica Neue"/>
+                          <a:cs typeface="Helvetica Neue"/>
+                        </a:rPr>
+                        <a:t>only</a:t>
+                      </a:r>
+                      <a:r>
+                        <a:rPr lang="de-DE" baseline="0" dirty="0" smtClean="0">
+                          <a:latin typeface="Helvetica Neue"/>
+                          <a:cs typeface="Helvetica Neue"/>
+                        </a:rPr>
+                        <a:t> </a:t>
+                      </a:r>
+                      <a:r>
+                        <a:rPr lang="de-DE" baseline="0" dirty="0" err="1" smtClean="0">
+                          <a:latin typeface="Helvetica Neue"/>
+                          <a:cs typeface="Helvetica Neue"/>
+                        </a:rPr>
+                        <a:t>error</a:t>
+                      </a:r>
+                      <a:r>
+                        <a:rPr lang="de-DE" baseline="0" dirty="0" smtClean="0">
+                          <a:latin typeface="Helvetica Neue"/>
+                          <a:cs typeface="Helvetica Neue"/>
+                        </a:rPr>
+                        <a:t> </a:t>
+                      </a:r>
+                      <a:r>
+                        <a:rPr lang="de-DE" baseline="0" dirty="0" err="1" smtClean="0">
+                          <a:latin typeface="Helvetica Neue"/>
+                          <a:cs typeface="Helvetica Neue"/>
+                        </a:rPr>
+                        <a:t>messages</a:t>
+                      </a:r>
+                      <a:r>
+                        <a:rPr lang="de-DE" baseline="0" dirty="0" smtClean="0">
+                          <a:latin typeface="Helvetica Neue"/>
+                          <a:cs typeface="Helvetica Neue"/>
+                        </a:rPr>
+                        <a:t> </a:t>
+                      </a:r>
+                      <a:r>
+                        <a:rPr lang="de-DE" baseline="0" dirty="0" err="1" smtClean="0">
+                          <a:latin typeface="Helvetica Neue"/>
+                          <a:cs typeface="Helvetica Neue"/>
+                        </a:rPr>
+                        <a:t>for</a:t>
+                      </a:r>
+                      <a:r>
+                        <a:rPr lang="de-DE" baseline="0" smtClean="0">
+                          <a:latin typeface="Helvetica Neue"/>
+                          <a:cs typeface="Helvetica Neue"/>
+                        </a:rPr>
+                        <a:t> User</a:t>
+                      </a:r>
+                      <a:endParaRPr lang="de-DE" dirty="0">
+                        <a:latin typeface="Helvetica Neue"/>
+                        <a:cs typeface="Helvetica Neue"/>
+                      </a:endParaRPr>
+                    </a:p>
+                  </a:txBody>
+                  <a:tcPr/>
+                </a:tc>
+              </a:tr>
+              <a:tr h="370840">
+                <a:tc>
+                  <a:txBody>
+                    <a:bodyPr/>
+                    <a:lstStyle/>
+                    <a:p>
+                      <a:r>
+                        <a:rPr lang="de-DE" dirty="0" smtClean="0">
+                          <a:latin typeface="Helvetica Neue"/>
+                          <a:cs typeface="Helvetica Neue"/>
+                        </a:rPr>
+                        <a:t>Post-</a:t>
+                      </a:r>
+                      <a:r>
+                        <a:rPr lang="de-DE" dirty="0" err="1" smtClean="0">
+                          <a:latin typeface="Helvetica Neue"/>
+                          <a:cs typeface="Helvetica Neue"/>
+                        </a:rPr>
+                        <a:t>conditions</a:t>
+                      </a:r>
+                      <a:endParaRPr lang="de-DE" dirty="0">
+                        <a:latin typeface="Helvetica Neue"/>
+                        <a:cs typeface="Helvetica Neue"/>
+                      </a:endParaRPr>
+                    </a:p>
+                  </a:txBody>
+                  <a:tcPr/>
+                </a:tc>
+                <a:tc>
+                  <a:txBody>
+                    <a:bodyPr/>
+                    <a:lstStyle/>
+                    <a:p>
+                      <a:r>
+                        <a:rPr lang="de-DE" dirty="0" smtClean="0">
+                          <a:latin typeface="Helvetica Neue"/>
+                          <a:cs typeface="Helvetica Neue"/>
+                        </a:rPr>
+                        <a:t>User </a:t>
+                      </a:r>
+                      <a:r>
+                        <a:rPr lang="de-DE" dirty="0" err="1" smtClean="0">
+                          <a:latin typeface="Helvetica Neue"/>
+                          <a:cs typeface="Helvetica Neue"/>
+                        </a:rPr>
+                        <a:t>gets</a:t>
+                      </a:r>
+                      <a:r>
+                        <a:rPr lang="de-DE" dirty="0" smtClean="0">
+                          <a:latin typeface="Helvetica Neue"/>
+                          <a:cs typeface="Helvetica Neue"/>
+                        </a:rPr>
+                        <a:t> an </a:t>
+                      </a:r>
+                      <a:r>
+                        <a:rPr lang="de-DE" dirty="0" err="1" smtClean="0">
+                          <a:latin typeface="Helvetica Neue"/>
+                          <a:cs typeface="Helvetica Neue"/>
+                        </a:rPr>
+                        <a:t>e-mail</a:t>
+                      </a:r>
+                      <a:r>
+                        <a:rPr lang="de-DE" dirty="0" smtClean="0">
+                          <a:latin typeface="Helvetica Neue"/>
+                          <a:cs typeface="Helvetica Neue"/>
+                        </a:rPr>
+                        <a:t> </a:t>
+                      </a:r>
+                      <a:r>
+                        <a:rPr lang="de-DE" dirty="0" err="1" smtClean="0">
+                          <a:latin typeface="Helvetica Neue"/>
+                          <a:cs typeface="Helvetica Neue"/>
+                        </a:rPr>
+                        <a:t>confirming</a:t>
+                      </a:r>
+                      <a:r>
+                        <a:rPr lang="de-DE" dirty="0" smtClean="0">
+                          <a:latin typeface="Helvetica Neue"/>
+                          <a:cs typeface="Helvetica Neue"/>
+                        </a:rPr>
+                        <a:t> </a:t>
+                      </a:r>
+                      <a:r>
+                        <a:rPr lang="de-DE" dirty="0" err="1" smtClean="0">
+                          <a:latin typeface="Helvetica Neue"/>
+                          <a:cs typeface="Helvetica Neue"/>
+                        </a:rPr>
+                        <a:t>his</a:t>
+                      </a:r>
+                      <a:r>
+                        <a:rPr lang="de-DE" dirty="0" smtClean="0">
+                          <a:latin typeface="Helvetica Neue"/>
+                          <a:cs typeface="Helvetica Neue"/>
+                        </a:rPr>
+                        <a:t> </a:t>
+                      </a:r>
+                      <a:r>
+                        <a:rPr lang="de-DE" dirty="0" err="1" smtClean="0">
+                          <a:latin typeface="Helvetica Neue"/>
+                          <a:cs typeface="Helvetica Neue"/>
+                        </a:rPr>
+                        <a:t>registration</a:t>
+                      </a:r>
+                      <a:r>
+                        <a:rPr lang="de-DE" dirty="0" smtClean="0">
+                          <a:latin typeface="Helvetica Neue"/>
+                          <a:cs typeface="Helvetica Neue"/>
+                        </a:rPr>
+                        <a:t> </a:t>
+                      </a:r>
+                      <a:r>
+                        <a:rPr lang="de-DE" dirty="0" err="1" smtClean="0">
+                          <a:latin typeface="Helvetica Neue"/>
+                          <a:cs typeface="Helvetica Neue"/>
+                        </a:rPr>
+                        <a:t>and</a:t>
+                      </a:r>
+                      <a:r>
+                        <a:rPr lang="de-DE" dirty="0" smtClean="0">
+                          <a:latin typeface="Helvetica Neue"/>
+                          <a:cs typeface="Helvetica Neue"/>
+                        </a:rPr>
+                        <a:t> </a:t>
+                      </a:r>
+                      <a:r>
+                        <a:rPr lang="de-DE" dirty="0" err="1" smtClean="0">
+                          <a:latin typeface="Helvetica Neue"/>
+                          <a:cs typeface="Helvetica Neue"/>
+                        </a:rPr>
+                        <a:t>with</a:t>
+                      </a:r>
+                      <a:r>
+                        <a:rPr lang="de-DE" dirty="0" smtClean="0">
+                          <a:latin typeface="Helvetica Neue"/>
+                          <a:cs typeface="Helvetica Neue"/>
+                        </a:rPr>
+                        <a:t> </a:t>
+                      </a:r>
+                      <a:r>
+                        <a:rPr lang="de-DE" dirty="0" err="1" smtClean="0">
+                          <a:latin typeface="Helvetica Neue"/>
+                          <a:cs typeface="Helvetica Neue"/>
+                        </a:rPr>
+                        <a:t>further</a:t>
+                      </a:r>
+                      <a:r>
+                        <a:rPr lang="de-DE" dirty="0" smtClean="0">
+                          <a:latin typeface="Helvetica Neue"/>
+                          <a:cs typeface="Helvetica Neue"/>
+                        </a:rPr>
+                        <a:t> </a:t>
+                      </a:r>
+                      <a:r>
+                        <a:rPr lang="de-DE" dirty="0" err="1" smtClean="0">
+                          <a:latin typeface="Helvetica Neue"/>
+                          <a:cs typeface="Helvetica Neue"/>
+                        </a:rPr>
+                        <a:t>information</a:t>
+                      </a:r>
+                      <a:r>
+                        <a:rPr lang="de-DE" dirty="0" smtClean="0">
+                          <a:latin typeface="Helvetica Neue"/>
+                          <a:cs typeface="Helvetica Neue"/>
+                        </a:rPr>
+                        <a:t> on </a:t>
+                      </a:r>
+                      <a:r>
+                        <a:rPr lang="de-DE" dirty="0" err="1" smtClean="0">
+                          <a:latin typeface="Helvetica Neue"/>
+                          <a:cs typeface="Helvetica Neue"/>
+                        </a:rPr>
+                        <a:t>how</a:t>
+                      </a:r>
+                      <a:r>
+                        <a:rPr lang="de-DE" dirty="0" smtClean="0">
+                          <a:latin typeface="Helvetica Neue"/>
+                          <a:cs typeface="Helvetica Neue"/>
+                        </a:rPr>
+                        <a:t> </a:t>
+                      </a:r>
+                      <a:r>
+                        <a:rPr lang="de-DE" dirty="0" err="1" smtClean="0">
+                          <a:latin typeface="Helvetica Neue"/>
+                          <a:cs typeface="Helvetica Neue"/>
+                        </a:rPr>
+                        <a:t>to</a:t>
+                      </a:r>
+                      <a:r>
+                        <a:rPr lang="de-DE" dirty="0" smtClean="0">
+                          <a:latin typeface="Helvetica Neue"/>
+                          <a:cs typeface="Helvetica Neue"/>
+                        </a:rPr>
+                        <a:t> </a:t>
+                      </a:r>
+                      <a:r>
+                        <a:rPr lang="de-DE" dirty="0" err="1" smtClean="0">
+                          <a:latin typeface="Helvetica Neue"/>
+                          <a:cs typeface="Helvetica Neue"/>
+                        </a:rPr>
+                        <a:t>proceed</a:t>
+                      </a:r>
+                      <a:endParaRPr lang="de-DE" dirty="0">
+                        <a:latin typeface="Helvetica Neue"/>
+                        <a:cs typeface="Helvetica Neue"/>
+                      </a:endParaRPr>
+                    </a:p>
+                  </a:txBody>
+                  <a:tcPr/>
+                </a:tc>
+              </a:tr>
+              <a:tr h="370840">
+                <a:tc>
+                  <a:txBody>
+                    <a:bodyPr/>
+                    <a:lstStyle/>
+                    <a:p>
+                      <a:r>
+                        <a:rPr lang="de-DE" dirty="0" smtClean="0">
+                          <a:latin typeface="Helvetica Neue"/>
+                          <a:cs typeface="Helvetica Neue"/>
+                        </a:rPr>
+                        <a:t>Data</a:t>
+                      </a:r>
+                      <a:r>
+                        <a:rPr lang="de-DE" baseline="0" dirty="0" smtClean="0">
+                          <a:latin typeface="Helvetica Neue"/>
+                          <a:cs typeface="Helvetica Neue"/>
+                        </a:rPr>
+                        <a:t> </a:t>
+                      </a:r>
+                      <a:r>
+                        <a:rPr lang="de-DE" baseline="0" dirty="0" err="1" smtClean="0">
+                          <a:latin typeface="Helvetica Neue"/>
+                          <a:cs typeface="Helvetica Neue"/>
+                        </a:rPr>
+                        <a:t>formats</a:t>
+                      </a:r>
+                      <a:r>
+                        <a:rPr lang="de-DE" baseline="0" dirty="0" smtClean="0">
+                          <a:latin typeface="Helvetica Neue"/>
+                          <a:cs typeface="Helvetica Neue"/>
+                        </a:rPr>
+                        <a:t> </a:t>
+                      </a:r>
+                      <a:r>
+                        <a:rPr lang="de-DE" baseline="0" dirty="0" err="1" smtClean="0">
+                          <a:latin typeface="Helvetica Neue"/>
+                          <a:cs typeface="Helvetica Neue"/>
+                        </a:rPr>
+                        <a:t>used</a:t>
+                      </a:r>
+                      <a:endParaRPr lang="de-DE" dirty="0">
+                        <a:latin typeface="Helvetica Neue"/>
+                        <a:cs typeface="Helvetica Neue"/>
+                      </a:endParaRPr>
+                    </a:p>
+                  </a:txBody>
+                  <a:tcPr/>
+                </a:tc>
+                <a:tc>
+                  <a:txBody>
+                    <a:bodyPr/>
+                    <a:lstStyle/>
+                    <a:p>
+                      <a:r>
+                        <a:rPr lang="de-DE" dirty="0" smtClean="0">
+                          <a:latin typeface="Helvetica Neue"/>
+                          <a:cs typeface="Helvetica Neue"/>
+                        </a:rPr>
+                        <a:t>HTML form</a:t>
+                      </a:r>
+                      <a:endParaRPr lang="de-DE" dirty="0">
+                        <a:latin typeface="Helvetica Neue"/>
+                        <a:cs typeface="Helvetica Neue"/>
+                      </a:endParaRPr>
+                    </a:p>
+                  </a:txBody>
+                  <a:tcPr/>
+                </a:tc>
+              </a:tr>
+            </a:tbl>
+          </a:graphicData>
+        </a:graphic>
+      </p:graphicFrame>
+    </p:spTree>
+    <p:extLst>
+      <p:ext uri="{BB962C8B-B14F-4D97-AF65-F5344CB8AC3E}">
+        <p14:creationId xmlns:p14="http://schemas.microsoft.com/office/powerpoint/2010/main" val="3195109020"/>
       </p:ext>
     </p:extLst>
   </p:cSld>

</xml_diff>

<commit_message>
use case for logout
</commit_message>
<xml_diff>
--- a/presentation1.pptx
+++ b/presentation1.pptx
@@ -15,6 +15,7 @@
     <p:sldId id="262" r:id="rId9"/>
     <p:sldId id="263" r:id="rId10"/>
     <p:sldId id="264" r:id="rId11"/>
+    <p:sldId id="265" r:id="rId12"/>
   </p:sldIdLst>
   <p:sldSz cx="9144000" cy="6858000" type="screen4x3"/>
   <p:notesSz cx="6858000" cy="9144000"/>
@@ -6622,6 +6623,807 @@
 </p:sld>
 </file>
 
+<file path=ppt/slides/slide10.xml><?xml version="1.0" encoding="utf-8"?>
+<p:sld xmlns:a="http://schemas.openxmlformats.org/drawingml/2006/main" xmlns:r="http://schemas.openxmlformats.org/officeDocument/2006/relationships" xmlns:p="http://schemas.openxmlformats.org/presentationml/2006/main">
+  <p:cSld>
+    <p:spTree>
+      <p:nvGrpSpPr>
+        <p:cNvPr id="1" name=""/>
+        <p:cNvGrpSpPr/>
+        <p:nvPr/>
+      </p:nvGrpSpPr>
+      <p:grpSpPr>
+        <a:xfrm>
+          <a:off x="0" y="0"/>
+          <a:ext cx="0" cy="0"/>
+          <a:chOff x="0" y="0"/>
+          <a:chExt cx="0" cy="0"/>
+        </a:xfrm>
+      </p:grpSpPr>
+      <p:sp>
+        <p:nvSpPr>
+          <p:cNvPr id="2" name="Titel 1"/>
+          <p:cNvSpPr>
+            <a:spLocks noGrp="1"/>
+          </p:cNvSpPr>
+          <p:nvPr>
+            <p:ph type="title"/>
+          </p:nvPr>
+        </p:nvSpPr>
+        <p:spPr/>
+        <p:txBody>
+          <a:bodyPr/>
+          <a:lstStyle/>
+          <a:p>
+            <a:r>
+              <a:rPr lang="de-DE" dirty="0" err="1" smtClean="0"/>
+              <a:t>Use</a:t>
+            </a:r>
+            <a:r>
+              <a:rPr lang="de-DE" dirty="0" smtClean="0"/>
+              <a:t> Case </a:t>
+            </a:r>
+            <a:r>
+              <a:rPr lang="de-DE" smtClean="0"/>
+              <a:t>Description (3)</a:t>
+            </a:r>
+            <a:endParaRPr lang="de-DE" dirty="0"/>
+          </a:p>
+        </p:txBody>
+      </p:sp>
+      <p:graphicFrame>
+        <p:nvGraphicFramePr>
+          <p:cNvPr id="4" name="Inhaltsplatzhalter 3"/>
+          <p:cNvGraphicFramePr>
+            <a:graphicFrameLocks noGrp="1"/>
+          </p:cNvGraphicFramePr>
+          <p:nvPr>
+            <p:ph idx="1"/>
+            <p:extLst>
+              <p:ext uri="{D42A27DB-BD31-4B8C-83A1-F6EECF244321}">
+                <p14:modId xmlns:p14="http://schemas.microsoft.com/office/powerpoint/2010/main" val="3738566507"/>
+              </p:ext>
+            </p:extLst>
+          </p:nvPr>
+        </p:nvGraphicFramePr>
+        <p:xfrm>
+          <a:off x="457200" y="1659977"/>
+          <a:ext cx="8229600" cy="3606800"/>
+        </p:xfrm>
+        <a:graphic>
+          <a:graphicData uri="http://schemas.openxmlformats.org/drawingml/2006/table">
+            <a:tbl>
+              <a:tblPr firstRow="1" bandRow="1">
+                <a:tableStyleId>{8EC20E35-A176-4012-BC5E-935CFFF8708E}</a:tableStyleId>
+              </a:tblPr>
+              <a:tblGrid>
+                <a:gridCol w="4114800"/>
+                <a:gridCol w="4114800"/>
+              </a:tblGrid>
+              <a:tr h="370840">
+                <a:tc>
+                  <a:txBody>
+                    <a:bodyPr/>
+                    <a:lstStyle/>
+                    <a:p>
+                      <a:r>
+                        <a:rPr lang="de-DE" b="0" dirty="0" smtClean="0">
+                          <a:latin typeface="Helvetica Neue"/>
+                          <a:cs typeface="Helvetica Neue"/>
+                        </a:rPr>
+                        <a:t>Name</a:t>
+                      </a:r>
+                      <a:endParaRPr lang="de-DE" b="0" dirty="0">
+                        <a:latin typeface="Helvetica Neue"/>
+                        <a:cs typeface="Helvetica Neue"/>
+                      </a:endParaRPr>
+                    </a:p>
+                  </a:txBody>
+                  <a:tcPr/>
+                </a:tc>
+                <a:tc>
+                  <a:txBody>
+                    <a:bodyPr/>
+                    <a:lstStyle/>
+                    <a:p>
+                      <a:r>
+                        <a:rPr lang="de-DE" b="0" dirty="0" err="1" smtClean="0">
+                          <a:latin typeface="Helvetica Neue"/>
+                          <a:cs typeface="Helvetica Neue"/>
+                        </a:rPr>
+                        <a:t>Logout</a:t>
+                      </a:r>
+                      <a:r>
+                        <a:rPr lang="de-DE" b="0" baseline="0" dirty="0" smtClean="0">
+                          <a:latin typeface="Helvetica Neue"/>
+                          <a:cs typeface="Helvetica Neue"/>
+                        </a:rPr>
+                        <a:t> </a:t>
+                      </a:r>
+                      <a:r>
+                        <a:rPr lang="de-DE" b="0" dirty="0" smtClean="0">
+                          <a:latin typeface="Helvetica Neue"/>
+                          <a:cs typeface="Helvetica Neue"/>
+                        </a:rPr>
+                        <a:t>Customer/Employee</a:t>
+                      </a:r>
+                      <a:endParaRPr lang="de-DE" b="0" dirty="0">
+                        <a:latin typeface="Helvetica Neue"/>
+                        <a:cs typeface="Helvetica Neue"/>
+                      </a:endParaRPr>
+                    </a:p>
+                  </a:txBody>
+                  <a:tcPr/>
+                </a:tc>
+              </a:tr>
+              <a:tr h="370840">
+                <a:tc>
+                  <a:txBody>
+                    <a:bodyPr/>
+                    <a:lstStyle/>
+                    <a:p>
+                      <a:r>
+                        <a:rPr lang="de-DE" dirty="0" smtClean="0">
+                          <a:latin typeface="Helvetica Neue"/>
+                          <a:cs typeface="Helvetica Neue"/>
+                        </a:rPr>
+                        <a:t>Goal</a:t>
+                      </a:r>
+                      <a:endParaRPr lang="de-DE" dirty="0">
+                        <a:latin typeface="Helvetica Neue"/>
+                        <a:cs typeface="Helvetica Neue"/>
+                      </a:endParaRPr>
+                    </a:p>
+                  </a:txBody>
+                  <a:tcPr/>
+                </a:tc>
+                <a:tc>
+                  <a:txBody>
+                    <a:bodyPr/>
+                    <a:lstStyle/>
+                    <a:p>
+                      <a:r>
+                        <a:rPr lang="de-DE" dirty="0" smtClean="0">
+                          <a:latin typeface="Helvetica Neue"/>
+                          <a:cs typeface="Helvetica Neue"/>
+                        </a:rPr>
+                        <a:t>User </a:t>
+                      </a:r>
+                      <a:r>
+                        <a:rPr lang="de-DE" dirty="0" err="1" smtClean="0">
+                          <a:latin typeface="Helvetica Neue"/>
+                          <a:cs typeface="Helvetica Neue"/>
+                        </a:rPr>
+                        <a:t>can</a:t>
+                      </a:r>
+                      <a:r>
+                        <a:rPr lang="de-DE" dirty="0" smtClean="0">
+                          <a:latin typeface="Helvetica Neue"/>
+                          <a:cs typeface="Helvetica Neue"/>
+                        </a:rPr>
+                        <a:t> </a:t>
+                      </a:r>
+                      <a:r>
+                        <a:rPr lang="de-DE" dirty="0" err="1" smtClean="0">
+                          <a:latin typeface="Helvetica Neue"/>
+                          <a:cs typeface="Helvetica Neue"/>
+                        </a:rPr>
+                        <a:t>logout</a:t>
+                      </a:r>
+                      <a:endParaRPr lang="de-DE" dirty="0">
+                        <a:latin typeface="Helvetica Neue"/>
+                        <a:cs typeface="Helvetica Neue"/>
+                      </a:endParaRPr>
+                    </a:p>
+                  </a:txBody>
+                  <a:tcPr/>
+                </a:tc>
+              </a:tr>
+              <a:tr h="370840">
+                <a:tc>
+                  <a:txBody>
+                    <a:bodyPr/>
+                    <a:lstStyle/>
+                    <a:p>
+                      <a:r>
+                        <a:rPr lang="de-DE" dirty="0" err="1" smtClean="0">
+                          <a:latin typeface="Helvetica Neue"/>
+                          <a:cs typeface="Helvetica Neue"/>
+                        </a:rPr>
+                        <a:t>Actors</a:t>
+                      </a:r>
+                      <a:endParaRPr lang="de-DE" dirty="0">
+                        <a:latin typeface="Helvetica Neue"/>
+                        <a:cs typeface="Helvetica Neue"/>
+                      </a:endParaRPr>
+                    </a:p>
+                  </a:txBody>
+                  <a:tcPr/>
+                </a:tc>
+                <a:tc>
+                  <a:txBody>
+                    <a:bodyPr/>
+                    <a:lstStyle/>
+                    <a:p>
+                      <a:r>
+                        <a:rPr lang="de-DE" dirty="0" smtClean="0">
+                          <a:latin typeface="Helvetica Neue"/>
+                          <a:cs typeface="Helvetica Neue"/>
+                        </a:rPr>
+                        <a:t>User</a:t>
+                      </a:r>
+                      <a:endParaRPr lang="de-DE" dirty="0">
+                        <a:latin typeface="Helvetica Neue"/>
+                        <a:cs typeface="Helvetica Neue"/>
+                      </a:endParaRPr>
+                    </a:p>
+                  </a:txBody>
+                  <a:tcPr/>
+                </a:tc>
+              </a:tr>
+              <a:tr h="370840">
+                <a:tc>
+                  <a:txBody>
+                    <a:bodyPr/>
+                    <a:lstStyle/>
+                    <a:p>
+                      <a:r>
+                        <a:rPr lang="de-DE" dirty="0" err="1" smtClean="0">
+                          <a:latin typeface="Helvetica Neue"/>
+                          <a:cs typeface="Helvetica Neue"/>
+                        </a:rPr>
+                        <a:t>Pre-conditions</a:t>
+                      </a:r>
+                      <a:endParaRPr lang="de-DE" dirty="0">
+                        <a:latin typeface="Helvetica Neue"/>
+                        <a:cs typeface="Helvetica Neue"/>
+                      </a:endParaRPr>
+                    </a:p>
+                  </a:txBody>
+                  <a:tcPr/>
+                </a:tc>
+                <a:tc>
+                  <a:txBody>
+                    <a:bodyPr/>
+                    <a:lstStyle/>
+                    <a:p>
+                      <a:r>
+                        <a:rPr lang="de-DE" dirty="0" smtClean="0">
+                          <a:latin typeface="Helvetica Neue"/>
+                          <a:cs typeface="Helvetica Neue"/>
+                        </a:rPr>
+                        <a:t>User </a:t>
+                      </a:r>
+                      <a:r>
+                        <a:rPr lang="de-DE" dirty="0" err="1" smtClean="0">
+                          <a:latin typeface="Helvetica Neue"/>
+                          <a:cs typeface="Helvetica Neue"/>
+                        </a:rPr>
+                        <a:t>is</a:t>
+                      </a:r>
+                      <a:r>
+                        <a:rPr lang="de-DE" dirty="0" smtClean="0">
+                          <a:latin typeface="Helvetica Neue"/>
+                          <a:cs typeface="Helvetica Neue"/>
+                        </a:rPr>
+                        <a:t> </a:t>
+                      </a:r>
+                      <a:r>
+                        <a:rPr lang="de-DE" dirty="0" err="1" smtClean="0">
+                          <a:latin typeface="Helvetica Neue"/>
+                          <a:cs typeface="Helvetica Neue"/>
+                        </a:rPr>
+                        <a:t>logged</a:t>
+                      </a:r>
+                      <a:r>
+                        <a:rPr lang="de-DE" dirty="0" smtClean="0">
+                          <a:latin typeface="Helvetica Neue"/>
+                          <a:cs typeface="Helvetica Neue"/>
+                        </a:rPr>
+                        <a:t> in</a:t>
+                      </a:r>
+                      <a:endParaRPr lang="de-DE" dirty="0">
+                        <a:latin typeface="Helvetica Neue"/>
+                        <a:cs typeface="Helvetica Neue"/>
+                      </a:endParaRPr>
+                    </a:p>
+                  </a:txBody>
+                  <a:tcPr/>
+                </a:tc>
+              </a:tr>
+              <a:tr h="370840">
+                <a:tc>
+                  <a:txBody>
+                    <a:bodyPr/>
+                    <a:lstStyle/>
+                    <a:p>
+                      <a:r>
+                        <a:rPr lang="de-DE" dirty="0" smtClean="0">
+                          <a:latin typeface="Helvetica Neue"/>
+                          <a:cs typeface="Helvetica Neue"/>
+                        </a:rPr>
+                        <a:t>Main </a:t>
+                      </a:r>
+                      <a:r>
+                        <a:rPr lang="de-DE" dirty="0" err="1" smtClean="0">
+                          <a:latin typeface="Helvetica Neue"/>
+                          <a:cs typeface="Helvetica Neue"/>
+                        </a:rPr>
+                        <a:t>Course</a:t>
+                      </a:r>
+                      <a:r>
+                        <a:rPr lang="de-DE" dirty="0" smtClean="0">
+                          <a:latin typeface="Helvetica Neue"/>
+                          <a:cs typeface="Helvetica Neue"/>
+                        </a:rPr>
+                        <a:t> </a:t>
+                      </a:r>
+                      <a:r>
+                        <a:rPr lang="de-DE" dirty="0" err="1" smtClean="0">
+                          <a:latin typeface="Helvetica Neue"/>
+                          <a:cs typeface="Helvetica Neue"/>
+                        </a:rPr>
+                        <a:t>fo</a:t>
+                      </a:r>
+                      <a:r>
+                        <a:rPr lang="de-DE" dirty="0" smtClean="0">
+                          <a:latin typeface="Helvetica Neue"/>
+                          <a:cs typeface="Helvetica Neue"/>
+                        </a:rPr>
+                        <a:t> </a:t>
+                      </a:r>
+                      <a:r>
+                        <a:rPr lang="de-DE" dirty="0" err="1" smtClean="0">
+                          <a:latin typeface="Helvetica Neue"/>
+                          <a:cs typeface="Helvetica Neue"/>
+                        </a:rPr>
+                        <a:t>Execution</a:t>
+                      </a:r>
+                      <a:endParaRPr lang="de-DE" dirty="0">
+                        <a:latin typeface="Helvetica Neue"/>
+                        <a:cs typeface="Helvetica Neue"/>
+                      </a:endParaRPr>
+                    </a:p>
+                  </a:txBody>
+                  <a:tcPr/>
+                </a:tc>
+                <a:tc>
+                  <a:txBody>
+                    <a:bodyPr/>
+                    <a:lstStyle/>
+                    <a:p>
+                      <a:r>
+                        <a:rPr lang="de-DE" dirty="0" smtClean="0">
+                          <a:latin typeface="Helvetica Neue"/>
+                          <a:cs typeface="Helvetica Neue"/>
+                        </a:rPr>
+                        <a:t>User </a:t>
+                      </a:r>
+                      <a:r>
+                        <a:rPr lang="de-DE" dirty="0" err="1" smtClean="0">
+                          <a:latin typeface="Helvetica Neue"/>
+                          <a:cs typeface="Helvetica Neue"/>
+                        </a:rPr>
+                        <a:t>clicks</a:t>
+                      </a:r>
+                      <a:r>
+                        <a:rPr lang="de-DE" dirty="0" smtClean="0">
+                          <a:latin typeface="Helvetica Neue"/>
+                          <a:cs typeface="Helvetica Neue"/>
+                        </a:rPr>
+                        <a:t> on </a:t>
+                      </a:r>
+                      <a:r>
+                        <a:rPr lang="de-DE" dirty="0" err="1" smtClean="0">
+                          <a:latin typeface="Helvetica Neue"/>
+                          <a:cs typeface="Helvetica Neue"/>
+                        </a:rPr>
+                        <a:t>his</a:t>
+                      </a:r>
+                      <a:r>
+                        <a:rPr lang="de-DE" dirty="0" smtClean="0">
+                          <a:latin typeface="Helvetica Neue"/>
+                          <a:cs typeface="Helvetica Neue"/>
+                        </a:rPr>
+                        <a:t> </a:t>
+                      </a:r>
+                      <a:r>
+                        <a:rPr lang="de-DE" dirty="0" err="1" smtClean="0">
+                          <a:latin typeface="Helvetica Neue"/>
+                          <a:cs typeface="Helvetica Neue"/>
+                        </a:rPr>
+                        <a:t>name</a:t>
+                      </a:r>
+                      <a:r>
+                        <a:rPr lang="de-DE" dirty="0" smtClean="0">
+                          <a:latin typeface="Helvetica Neue"/>
+                          <a:cs typeface="Helvetica Neue"/>
+                        </a:rPr>
+                        <a:t> in </a:t>
+                      </a:r>
+                      <a:r>
+                        <a:rPr lang="de-DE" dirty="0" err="1" smtClean="0">
+                          <a:latin typeface="Helvetica Neue"/>
+                          <a:cs typeface="Helvetica Neue"/>
+                        </a:rPr>
+                        <a:t>right</a:t>
+                      </a:r>
+                      <a:r>
+                        <a:rPr lang="de-DE" dirty="0" smtClean="0">
+                          <a:latin typeface="Helvetica Neue"/>
+                          <a:cs typeface="Helvetica Neue"/>
+                        </a:rPr>
+                        <a:t> </a:t>
+                      </a:r>
+                      <a:r>
+                        <a:rPr lang="de-DE" dirty="0" err="1" smtClean="0">
+                          <a:latin typeface="Helvetica Neue"/>
+                          <a:cs typeface="Helvetica Neue"/>
+                        </a:rPr>
+                        <a:t>upper</a:t>
+                      </a:r>
+                      <a:r>
+                        <a:rPr lang="de-DE" dirty="0" smtClean="0">
+                          <a:latin typeface="Helvetica Neue"/>
+                          <a:cs typeface="Helvetica Neue"/>
+                        </a:rPr>
+                        <a:t> </a:t>
+                      </a:r>
+                      <a:r>
+                        <a:rPr lang="de-DE" dirty="0" err="1" smtClean="0">
+                          <a:latin typeface="Helvetica Neue"/>
+                          <a:cs typeface="Helvetica Neue"/>
+                        </a:rPr>
+                        <a:t>corner</a:t>
+                      </a:r>
+                      <a:r>
+                        <a:rPr lang="de-DE" dirty="0" smtClean="0">
+                          <a:latin typeface="Helvetica Neue"/>
+                          <a:cs typeface="Helvetica Neue"/>
+                        </a:rPr>
+                        <a:t> </a:t>
+                      </a:r>
+                      <a:r>
+                        <a:rPr lang="de-DE" dirty="0" err="1" smtClean="0">
+                          <a:latin typeface="Helvetica Neue"/>
+                          <a:cs typeface="Helvetica Neue"/>
+                        </a:rPr>
+                        <a:t>and</a:t>
+                      </a:r>
+                      <a:r>
+                        <a:rPr lang="de-DE" dirty="0" smtClean="0">
+                          <a:latin typeface="Helvetica Neue"/>
+                          <a:cs typeface="Helvetica Neue"/>
+                        </a:rPr>
+                        <a:t> </a:t>
+                      </a:r>
+                      <a:r>
+                        <a:rPr lang="de-DE" dirty="0" err="1" smtClean="0">
+                          <a:latin typeface="Helvetica Neue"/>
+                          <a:cs typeface="Helvetica Neue"/>
+                        </a:rPr>
+                        <a:t>selects</a:t>
+                      </a:r>
+                      <a:r>
+                        <a:rPr lang="de-DE" dirty="0" smtClean="0">
+                          <a:latin typeface="Helvetica Neue"/>
+                          <a:cs typeface="Helvetica Neue"/>
+                        </a:rPr>
+                        <a:t> </a:t>
+                      </a:r>
+                      <a:r>
+                        <a:rPr lang="de-DE" dirty="0" err="1" smtClean="0">
+                          <a:latin typeface="Helvetica Neue"/>
+                          <a:cs typeface="Helvetica Neue"/>
+                        </a:rPr>
+                        <a:t>logout</a:t>
+                      </a:r>
+                      <a:endParaRPr lang="de-DE" dirty="0">
+                        <a:latin typeface="Helvetica Neue"/>
+                        <a:cs typeface="Helvetica Neue"/>
+                      </a:endParaRPr>
+                    </a:p>
+                  </a:txBody>
+                  <a:tcPr/>
+                </a:tc>
+              </a:tr>
+              <a:tr h="370840">
+                <a:tc>
+                  <a:txBody>
+                    <a:bodyPr/>
+                    <a:lstStyle/>
+                    <a:p>
+                      <a:r>
+                        <a:rPr lang="de-DE" dirty="0" err="1" smtClean="0">
+                          <a:latin typeface="Helvetica Neue"/>
+                          <a:cs typeface="Helvetica Neue"/>
+                        </a:rPr>
+                        <a:t>Alternate</a:t>
+                      </a:r>
+                      <a:r>
+                        <a:rPr lang="de-DE" dirty="0" smtClean="0">
+                          <a:latin typeface="Helvetica Neue"/>
+                          <a:cs typeface="Helvetica Neue"/>
+                        </a:rPr>
+                        <a:t> </a:t>
+                      </a:r>
+                      <a:r>
+                        <a:rPr lang="de-DE" dirty="0" err="1" smtClean="0">
+                          <a:latin typeface="Helvetica Neue"/>
+                          <a:cs typeface="Helvetica Neue"/>
+                        </a:rPr>
+                        <a:t>Courses</a:t>
+                      </a:r>
+                      <a:endParaRPr lang="de-DE" dirty="0">
+                        <a:latin typeface="Helvetica Neue"/>
+                        <a:cs typeface="Helvetica Neue"/>
+                      </a:endParaRPr>
+                    </a:p>
+                  </a:txBody>
+                  <a:tcPr/>
+                </a:tc>
+                <a:tc>
+                  <a:txBody>
+                    <a:bodyPr/>
+                    <a:lstStyle/>
+                    <a:p>
+                      <a:r>
+                        <a:rPr lang="de-DE" dirty="0" smtClean="0">
+                          <a:latin typeface="Helvetica Neue"/>
+                          <a:cs typeface="Helvetica Neue"/>
+                        </a:rPr>
+                        <a:t>-</a:t>
+                      </a:r>
+                      <a:endParaRPr lang="de-DE" dirty="0">
+                        <a:latin typeface="Helvetica Neue"/>
+                        <a:cs typeface="Helvetica Neue"/>
+                      </a:endParaRPr>
+                    </a:p>
+                  </a:txBody>
+                  <a:tcPr/>
+                </a:tc>
+              </a:tr>
+              <a:tr h="370840">
+                <a:tc>
+                  <a:txBody>
+                    <a:bodyPr/>
+                    <a:lstStyle/>
+                    <a:p>
+                      <a:r>
+                        <a:rPr lang="de-DE" dirty="0" err="1" smtClean="0">
+                          <a:latin typeface="Helvetica Neue"/>
+                          <a:cs typeface="Helvetica Neue"/>
+                        </a:rPr>
+                        <a:t>Exceptions</a:t>
+                      </a:r>
+                      <a:endParaRPr lang="de-DE" dirty="0">
+                        <a:latin typeface="Helvetica Neue"/>
+                        <a:cs typeface="Helvetica Neue"/>
+                      </a:endParaRPr>
+                    </a:p>
+                  </a:txBody>
+                  <a:tcPr/>
+                </a:tc>
+                <a:tc>
+                  <a:txBody>
+                    <a:bodyPr/>
+                    <a:lstStyle/>
+                    <a:p>
+                      <a:r>
+                        <a:rPr lang="de-DE" dirty="0" smtClean="0">
+                          <a:latin typeface="Helvetica Neue"/>
+                          <a:cs typeface="Helvetica Neue"/>
+                        </a:rPr>
+                        <a:t>-</a:t>
+                      </a:r>
+                      <a:endParaRPr lang="de-DE" dirty="0">
+                        <a:latin typeface="Helvetica Neue"/>
+                        <a:cs typeface="Helvetica Neue"/>
+                      </a:endParaRPr>
+                    </a:p>
+                  </a:txBody>
+                  <a:tcPr/>
+                </a:tc>
+              </a:tr>
+              <a:tr h="370840">
+                <a:tc>
+                  <a:txBody>
+                    <a:bodyPr/>
+                    <a:lstStyle/>
+                    <a:p>
+                      <a:r>
+                        <a:rPr lang="de-DE" dirty="0" smtClean="0">
+                          <a:latin typeface="Helvetica Neue"/>
+                          <a:cs typeface="Helvetica Neue"/>
+                        </a:rPr>
+                        <a:t>Post-</a:t>
+                      </a:r>
+                      <a:r>
+                        <a:rPr lang="de-DE" dirty="0" err="1" smtClean="0">
+                          <a:latin typeface="Helvetica Neue"/>
+                          <a:cs typeface="Helvetica Neue"/>
+                        </a:rPr>
+                        <a:t>conditions</a:t>
+                      </a:r>
+                      <a:endParaRPr lang="de-DE" dirty="0">
+                        <a:latin typeface="Helvetica Neue"/>
+                        <a:cs typeface="Helvetica Neue"/>
+                      </a:endParaRPr>
+                    </a:p>
+                  </a:txBody>
+                  <a:tcPr/>
+                </a:tc>
+                <a:tc>
+                  <a:txBody>
+                    <a:bodyPr/>
+                    <a:lstStyle/>
+                    <a:p>
+                      <a:r>
+                        <a:rPr lang="de-DE" dirty="0" smtClean="0">
+                          <a:latin typeface="Helvetica Neue"/>
+                          <a:cs typeface="Helvetica Neue"/>
+                        </a:rPr>
+                        <a:t>User </a:t>
+                      </a:r>
+                      <a:r>
+                        <a:rPr lang="de-DE" dirty="0" err="1" smtClean="0">
+                          <a:latin typeface="Helvetica Neue"/>
+                          <a:cs typeface="Helvetica Neue"/>
+                        </a:rPr>
+                        <a:t>gets</a:t>
+                      </a:r>
+                      <a:r>
+                        <a:rPr lang="de-DE" dirty="0" smtClean="0">
+                          <a:latin typeface="Helvetica Neue"/>
+                          <a:cs typeface="Helvetica Neue"/>
+                        </a:rPr>
+                        <a:t> </a:t>
+                      </a:r>
+                      <a:r>
+                        <a:rPr lang="de-DE" dirty="0" err="1" smtClean="0">
+                          <a:latin typeface="Helvetica Neue"/>
+                          <a:cs typeface="Helvetica Neue"/>
+                        </a:rPr>
+                        <a:t>redirected</a:t>
+                      </a:r>
+                      <a:r>
+                        <a:rPr lang="de-DE" dirty="0" smtClean="0">
+                          <a:latin typeface="Helvetica Neue"/>
+                          <a:cs typeface="Helvetica Neue"/>
+                        </a:rPr>
+                        <a:t> </a:t>
+                      </a:r>
+                      <a:r>
+                        <a:rPr lang="de-DE" dirty="0" err="1" smtClean="0">
+                          <a:latin typeface="Helvetica Neue"/>
+                          <a:cs typeface="Helvetica Neue"/>
+                        </a:rPr>
+                        <a:t>to</a:t>
+                      </a:r>
+                      <a:r>
+                        <a:rPr lang="de-DE" dirty="0" smtClean="0">
+                          <a:latin typeface="Helvetica Neue"/>
+                          <a:cs typeface="Helvetica Neue"/>
+                        </a:rPr>
+                        <a:t> </a:t>
+                      </a:r>
+                      <a:r>
+                        <a:rPr lang="de-DE" dirty="0" err="1" smtClean="0">
+                          <a:latin typeface="Helvetica Neue"/>
+                          <a:cs typeface="Helvetica Neue"/>
+                        </a:rPr>
+                        <a:t>login</a:t>
+                      </a:r>
+                      <a:r>
+                        <a:rPr lang="de-DE" dirty="0" smtClean="0">
+                          <a:latin typeface="Helvetica Neue"/>
+                          <a:cs typeface="Helvetica Neue"/>
+                        </a:rPr>
+                        <a:t> </a:t>
+                      </a:r>
+                      <a:r>
+                        <a:rPr lang="de-DE" dirty="0" err="1" smtClean="0">
+                          <a:latin typeface="Helvetica Neue"/>
+                          <a:cs typeface="Helvetica Neue"/>
+                        </a:rPr>
+                        <a:t>page</a:t>
+                      </a:r>
+                      <a:endParaRPr lang="de-DE" dirty="0">
+                        <a:latin typeface="Helvetica Neue"/>
+                        <a:cs typeface="Helvetica Neue"/>
+                      </a:endParaRPr>
+                    </a:p>
+                  </a:txBody>
+                  <a:tcPr/>
+                </a:tc>
+              </a:tr>
+              <a:tr h="370840">
+                <a:tc>
+                  <a:txBody>
+                    <a:bodyPr/>
+                    <a:lstStyle/>
+                    <a:p>
+                      <a:r>
+                        <a:rPr lang="de-DE" dirty="0" smtClean="0">
+                          <a:latin typeface="Helvetica Neue"/>
+                          <a:cs typeface="Helvetica Neue"/>
+                        </a:rPr>
+                        <a:t>Data</a:t>
+                      </a:r>
+                      <a:r>
+                        <a:rPr lang="de-DE" baseline="0" dirty="0" smtClean="0">
+                          <a:latin typeface="Helvetica Neue"/>
+                          <a:cs typeface="Helvetica Neue"/>
+                        </a:rPr>
+                        <a:t> </a:t>
+                      </a:r>
+                      <a:r>
+                        <a:rPr lang="de-DE" baseline="0" dirty="0" err="1" smtClean="0">
+                          <a:latin typeface="Helvetica Neue"/>
+                          <a:cs typeface="Helvetica Neue"/>
+                        </a:rPr>
+                        <a:t>formats</a:t>
+                      </a:r>
+                      <a:r>
+                        <a:rPr lang="de-DE" baseline="0" dirty="0" smtClean="0">
+                          <a:latin typeface="Helvetica Neue"/>
+                          <a:cs typeface="Helvetica Neue"/>
+                        </a:rPr>
+                        <a:t> </a:t>
+                      </a:r>
+                      <a:r>
+                        <a:rPr lang="de-DE" baseline="0" dirty="0" err="1" smtClean="0">
+                          <a:latin typeface="Helvetica Neue"/>
+                          <a:cs typeface="Helvetica Neue"/>
+                        </a:rPr>
+                        <a:t>used</a:t>
+                      </a:r>
+                      <a:endParaRPr lang="de-DE" dirty="0">
+                        <a:latin typeface="Helvetica Neue"/>
+                        <a:cs typeface="Helvetica Neue"/>
+                      </a:endParaRPr>
+                    </a:p>
+                  </a:txBody>
+                  <a:tcPr/>
+                </a:tc>
+                <a:tc>
+                  <a:txBody>
+                    <a:bodyPr/>
+                    <a:lstStyle/>
+                    <a:p>
+                      <a:r>
+                        <a:rPr lang="de-DE" dirty="0" smtClean="0">
+                          <a:latin typeface="Helvetica Neue"/>
+                          <a:cs typeface="Helvetica Neue"/>
+                        </a:rPr>
+                        <a:t>-</a:t>
+                      </a:r>
+                      <a:endParaRPr lang="de-DE" dirty="0">
+                        <a:latin typeface="Helvetica Neue"/>
+                        <a:cs typeface="Helvetica Neue"/>
+                      </a:endParaRPr>
+                    </a:p>
+                  </a:txBody>
+                  <a:tcPr/>
+                </a:tc>
+              </a:tr>
+            </a:tbl>
+          </a:graphicData>
+        </a:graphic>
+      </p:graphicFrame>
+    </p:spTree>
+    <p:extLst>
+      <p:ext uri="{BB962C8B-B14F-4D97-AF65-F5344CB8AC3E}">
+        <p14:creationId xmlns:p14="http://schemas.microsoft.com/office/powerpoint/2010/main" val="3284442113"/>
+      </p:ext>
+    </p:extLst>
+  </p:cSld>
+  <p:clrMapOvr>
+    <a:masterClrMapping/>
+  </p:clrMapOvr>
+</p:sld>
+</file>
+
 <file path=ppt/slides/slide2.xml><?xml version="1.0" encoding="utf-8"?>
 <p:sld xmlns:a="http://schemas.openxmlformats.org/drawingml/2006/main" xmlns:r="http://schemas.openxmlformats.org/officeDocument/2006/relationships" xmlns:p="http://schemas.openxmlformats.org/presentationml/2006/main">
   <p:cSld>
@@ -12442,7 +13244,7 @@
                         <a:t>for</a:t>
                       </a:r>
                       <a:r>
-                        <a:rPr lang="de-DE" baseline="0" smtClean="0">
+                        <a:rPr lang="de-DE" baseline="0" dirty="0" smtClean="0">
                           <a:latin typeface="Helvetica Neue"/>
                           <a:cs typeface="Helvetica Neue"/>
                         </a:rPr>

</xml_diff>

<commit_message>
use case for money transfer via file upload
</commit_message>
<xml_diff>
--- a/presentation1.pptx
+++ b/presentation1.pptx
@@ -16,6 +16,7 @@
     <p:sldId id="263" r:id="rId10"/>
     <p:sldId id="264" r:id="rId11"/>
     <p:sldId id="265" r:id="rId12"/>
+    <p:sldId id="266" r:id="rId13"/>
   </p:sldIdLst>
   <p:sldSz cx="9144000" cy="6858000" type="screen4x3"/>
   <p:notesSz cx="6858000" cy="9144000"/>
@@ -6661,11 +6662,7 @@
             </a:r>
             <a:r>
               <a:rPr lang="de-DE" dirty="0" smtClean="0"/>
-              <a:t> Case </a:t>
-            </a:r>
-            <a:r>
-              <a:rPr lang="de-DE" smtClean="0"/>
-              <a:t>Description (3)</a:t>
+              <a:t> Case Description (3)</a:t>
             </a:r>
             <a:endParaRPr lang="de-DE" dirty="0"/>
           </a:p>
@@ -7415,6 +7412,1321 @@
     <p:extLst>
       <p:ext uri="{BB962C8B-B14F-4D97-AF65-F5344CB8AC3E}">
         <p14:creationId xmlns:p14="http://schemas.microsoft.com/office/powerpoint/2010/main" val="3284442113"/>
+      </p:ext>
+    </p:extLst>
+  </p:cSld>
+  <p:clrMapOvr>
+    <a:masterClrMapping/>
+  </p:clrMapOvr>
+</p:sld>
+</file>
+
+<file path=ppt/slides/slide11.xml><?xml version="1.0" encoding="utf-8"?>
+<p:sld xmlns:a="http://schemas.openxmlformats.org/drawingml/2006/main" xmlns:r="http://schemas.openxmlformats.org/officeDocument/2006/relationships" xmlns:p="http://schemas.openxmlformats.org/presentationml/2006/main">
+  <p:cSld>
+    <p:spTree>
+      <p:nvGrpSpPr>
+        <p:cNvPr id="1" name=""/>
+        <p:cNvGrpSpPr/>
+        <p:nvPr/>
+      </p:nvGrpSpPr>
+      <p:grpSpPr>
+        <a:xfrm>
+          <a:off x="0" y="0"/>
+          <a:ext cx="0" cy="0"/>
+          <a:chOff x="0" y="0"/>
+          <a:chExt cx="0" cy="0"/>
+        </a:xfrm>
+      </p:grpSpPr>
+      <p:sp>
+        <p:nvSpPr>
+          <p:cNvPr id="2" name="Titel 1"/>
+          <p:cNvSpPr>
+            <a:spLocks noGrp="1"/>
+          </p:cNvSpPr>
+          <p:nvPr>
+            <p:ph type="title"/>
+          </p:nvPr>
+        </p:nvSpPr>
+        <p:spPr/>
+        <p:txBody>
+          <a:bodyPr/>
+          <a:lstStyle/>
+          <a:p>
+            <a:r>
+              <a:rPr lang="de-DE" dirty="0" err="1" smtClean="0"/>
+              <a:t>Use</a:t>
+            </a:r>
+            <a:r>
+              <a:rPr lang="de-DE" dirty="0" smtClean="0"/>
+              <a:t> Case Description (4)</a:t>
+            </a:r>
+            <a:endParaRPr lang="de-DE" dirty="0"/>
+          </a:p>
+        </p:txBody>
+      </p:sp>
+      <p:graphicFrame>
+        <p:nvGraphicFramePr>
+          <p:cNvPr id="4" name="Inhaltsplatzhalter 3"/>
+          <p:cNvGraphicFramePr>
+            <a:graphicFrameLocks noGrp="1"/>
+          </p:cNvGraphicFramePr>
+          <p:nvPr>
+            <p:ph idx="1"/>
+            <p:extLst>
+              <p:ext uri="{D42A27DB-BD31-4B8C-83A1-F6EECF244321}">
+                <p14:modId xmlns:p14="http://schemas.microsoft.com/office/powerpoint/2010/main" val="2826569160"/>
+              </p:ext>
+            </p:extLst>
+          </p:nvPr>
+        </p:nvGraphicFramePr>
+        <p:xfrm>
+          <a:off x="457200" y="1027243"/>
+          <a:ext cx="8229600" cy="5669464"/>
+        </p:xfrm>
+        <a:graphic>
+          <a:graphicData uri="http://schemas.openxmlformats.org/drawingml/2006/table">
+            <a:tbl>
+              <a:tblPr firstRow="1" bandRow="1">
+                <a:tableStyleId>{8EC20E35-A176-4012-BC5E-935CFFF8708E}</a:tableStyleId>
+              </a:tblPr>
+              <a:tblGrid>
+                <a:gridCol w="4114800"/>
+                <a:gridCol w="4114800"/>
+              </a:tblGrid>
+              <a:tr h="661485">
+                <a:tc>
+                  <a:txBody>
+                    <a:bodyPr/>
+                    <a:lstStyle/>
+                    <a:p>
+                      <a:r>
+                        <a:rPr lang="de-DE" b="0" dirty="0" smtClean="0">
+                          <a:latin typeface="Helvetica Neue"/>
+                          <a:cs typeface="Helvetica Neue"/>
+                        </a:rPr>
+                        <a:t>Name</a:t>
+                      </a:r>
+                      <a:endParaRPr lang="de-DE" b="0" dirty="0">
+                        <a:latin typeface="Helvetica Neue"/>
+                        <a:cs typeface="Helvetica Neue"/>
+                      </a:endParaRPr>
+                    </a:p>
+                  </a:txBody>
+                  <a:tcPr/>
+                </a:tc>
+                <a:tc>
+                  <a:txBody>
+                    <a:bodyPr/>
+                    <a:lstStyle/>
+                    <a:p>
+                      <a:r>
+                        <a:rPr lang="de-DE" b="0" dirty="0" smtClean="0">
+                          <a:latin typeface="Helvetica Neue"/>
+                          <a:cs typeface="Helvetica Neue"/>
+                        </a:rPr>
+                        <a:t>Customer</a:t>
+                      </a:r>
+                      <a:r>
+                        <a:rPr lang="de-DE" b="0" baseline="0" dirty="0" smtClean="0">
+                          <a:latin typeface="Helvetica Neue"/>
+                          <a:cs typeface="Helvetica Neue"/>
+                        </a:rPr>
+                        <a:t> </a:t>
+                      </a:r>
+                      <a:r>
+                        <a:rPr lang="de-DE" b="0" baseline="0" dirty="0" err="1" smtClean="0">
+                          <a:latin typeface="Helvetica Neue"/>
+                          <a:cs typeface="Helvetica Neue"/>
+                        </a:rPr>
+                        <a:t>transfers</a:t>
+                      </a:r>
+                      <a:r>
+                        <a:rPr lang="de-DE" b="0" baseline="0" dirty="0" smtClean="0">
+                          <a:latin typeface="Helvetica Neue"/>
+                          <a:cs typeface="Helvetica Neue"/>
+                        </a:rPr>
+                        <a:t> </a:t>
+                      </a:r>
+                      <a:r>
+                        <a:rPr lang="de-DE" b="0" baseline="0" dirty="0" err="1" smtClean="0">
+                          <a:latin typeface="Helvetica Neue"/>
+                          <a:cs typeface="Helvetica Neue"/>
+                        </a:rPr>
+                        <a:t>money</a:t>
+                      </a:r>
+                      <a:r>
+                        <a:rPr lang="de-DE" b="0" baseline="0" dirty="0" smtClean="0">
+                          <a:latin typeface="Helvetica Neue"/>
+                          <a:cs typeface="Helvetica Neue"/>
+                        </a:rPr>
+                        <a:t> via </a:t>
+                      </a:r>
+                      <a:r>
+                        <a:rPr lang="de-DE" b="0" baseline="0" dirty="0" err="1" smtClean="0">
+                          <a:latin typeface="Helvetica Neue"/>
+                          <a:cs typeface="Helvetica Neue"/>
+                        </a:rPr>
+                        <a:t>file</a:t>
+                      </a:r>
+                      <a:r>
+                        <a:rPr lang="de-DE" b="0" baseline="0" dirty="0" smtClean="0">
+                          <a:latin typeface="Helvetica Neue"/>
+                          <a:cs typeface="Helvetica Neue"/>
+                        </a:rPr>
+                        <a:t> </a:t>
+                      </a:r>
+                      <a:r>
+                        <a:rPr lang="de-DE" b="0" baseline="0" dirty="0" err="1" smtClean="0">
+                          <a:latin typeface="Helvetica Neue"/>
+                          <a:cs typeface="Helvetica Neue"/>
+                        </a:rPr>
+                        <a:t>upload</a:t>
+                      </a:r>
+                      <a:endParaRPr lang="de-DE" b="0" dirty="0">
+                        <a:latin typeface="Helvetica Neue"/>
+                        <a:cs typeface="Helvetica Neue"/>
+                      </a:endParaRPr>
+                    </a:p>
+                  </a:txBody>
+                  <a:tcPr/>
+                </a:tc>
+              </a:tr>
+              <a:tr h="661485">
+                <a:tc>
+                  <a:txBody>
+                    <a:bodyPr/>
+                    <a:lstStyle/>
+                    <a:p>
+                      <a:r>
+                        <a:rPr lang="de-DE" dirty="0" smtClean="0">
+                          <a:latin typeface="Helvetica Neue"/>
+                          <a:cs typeface="Helvetica Neue"/>
+                        </a:rPr>
+                        <a:t>Goal</a:t>
+                      </a:r>
+                      <a:endParaRPr lang="de-DE" dirty="0">
+                        <a:latin typeface="Helvetica Neue"/>
+                        <a:cs typeface="Helvetica Neue"/>
+                      </a:endParaRPr>
+                    </a:p>
+                  </a:txBody>
+                  <a:tcPr/>
+                </a:tc>
+                <a:tc>
+                  <a:txBody>
+                    <a:bodyPr/>
+                    <a:lstStyle/>
+                    <a:p>
+                      <a:r>
+                        <a:rPr lang="de-DE" dirty="0" smtClean="0">
+                          <a:latin typeface="Helvetica Neue"/>
+                          <a:cs typeface="Helvetica Neue"/>
+                        </a:rPr>
+                        <a:t>User </a:t>
+                      </a:r>
+                      <a:r>
+                        <a:rPr lang="de-DE" dirty="0" err="1" smtClean="0">
+                          <a:latin typeface="Helvetica Neue"/>
+                          <a:cs typeface="Helvetica Neue"/>
+                        </a:rPr>
+                        <a:t>can</a:t>
+                      </a:r>
+                      <a:r>
+                        <a:rPr lang="de-DE" dirty="0" smtClean="0">
+                          <a:latin typeface="Helvetica Neue"/>
+                          <a:cs typeface="Helvetica Neue"/>
+                        </a:rPr>
+                        <a:t> </a:t>
+                      </a:r>
+                      <a:r>
+                        <a:rPr lang="de-DE" dirty="0" err="1" smtClean="0">
+                          <a:latin typeface="Helvetica Neue"/>
+                          <a:cs typeface="Helvetica Neue"/>
+                        </a:rPr>
+                        <a:t>upload</a:t>
+                      </a:r>
+                      <a:r>
+                        <a:rPr lang="de-DE" dirty="0" smtClean="0">
+                          <a:latin typeface="Helvetica Neue"/>
+                          <a:cs typeface="Helvetica Neue"/>
+                        </a:rPr>
+                        <a:t> a </a:t>
+                      </a:r>
+                      <a:r>
+                        <a:rPr lang="de-DE" dirty="0" err="1" smtClean="0">
+                          <a:latin typeface="Helvetica Neue"/>
+                          <a:cs typeface="Helvetica Neue"/>
+                        </a:rPr>
+                        <a:t>text</a:t>
+                      </a:r>
+                      <a:r>
+                        <a:rPr lang="de-DE" dirty="0" smtClean="0">
+                          <a:latin typeface="Helvetica Neue"/>
+                          <a:cs typeface="Helvetica Neue"/>
+                        </a:rPr>
+                        <a:t> </a:t>
+                      </a:r>
+                      <a:r>
+                        <a:rPr lang="de-DE" dirty="0" err="1" smtClean="0">
+                          <a:latin typeface="Helvetica Neue"/>
+                          <a:cs typeface="Helvetica Neue"/>
+                        </a:rPr>
+                        <a:t>file</a:t>
+                      </a:r>
+                      <a:r>
+                        <a:rPr lang="de-DE" dirty="0" smtClean="0">
+                          <a:latin typeface="Helvetica Neue"/>
+                          <a:cs typeface="Helvetica Neue"/>
+                        </a:rPr>
+                        <a:t> </a:t>
+                      </a:r>
+                      <a:r>
+                        <a:rPr lang="de-DE" dirty="0" err="1" smtClean="0">
+                          <a:latin typeface="Helvetica Neue"/>
+                          <a:cs typeface="Helvetica Neue"/>
+                        </a:rPr>
+                        <a:t>containing</a:t>
+                      </a:r>
+                      <a:r>
+                        <a:rPr lang="de-DE" dirty="0" smtClean="0">
+                          <a:latin typeface="Helvetica Neue"/>
+                          <a:cs typeface="Helvetica Neue"/>
+                        </a:rPr>
+                        <a:t> </a:t>
+                      </a:r>
+                      <a:r>
+                        <a:rPr lang="de-DE" dirty="0" err="1" smtClean="0">
+                          <a:latin typeface="Helvetica Neue"/>
+                          <a:cs typeface="Helvetica Neue"/>
+                        </a:rPr>
+                        <a:t>several</a:t>
+                      </a:r>
+                      <a:r>
+                        <a:rPr lang="de-DE" dirty="0" smtClean="0">
+                          <a:latin typeface="Helvetica Neue"/>
+                          <a:cs typeface="Helvetica Neue"/>
+                        </a:rPr>
+                        <a:t> </a:t>
+                      </a:r>
+                      <a:r>
+                        <a:rPr lang="de-DE" dirty="0" err="1" smtClean="0">
+                          <a:latin typeface="Helvetica Neue"/>
+                          <a:cs typeface="Helvetica Neue"/>
+                        </a:rPr>
+                        <a:t>transactions</a:t>
+                      </a:r>
+                      <a:r>
+                        <a:rPr lang="de-DE" baseline="0" dirty="0" smtClean="0">
+                          <a:latin typeface="Helvetica Neue"/>
+                          <a:cs typeface="Helvetica Neue"/>
+                        </a:rPr>
+                        <a:t> he </a:t>
+                      </a:r>
+                      <a:r>
+                        <a:rPr lang="de-DE" baseline="0" dirty="0" err="1" smtClean="0">
+                          <a:latin typeface="Helvetica Neue"/>
+                          <a:cs typeface="Helvetica Neue"/>
+                        </a:rPr>
+                        <a:t>wants</a:t>
+                      </a:r>
+                      <a:r>
+                        <a:rPr lang="de-DE" baseline="0" dirty="0" smtClean="0">
+                          <a:latin typeface="Helvetica Neue"/>
+                          <a:cs typeface="Helvetica Neue"/>
+                        </a:rPr>
+                        <a:t> </a:t>
+                      </a:r>
+                      <a:r>
+                        <a:rPr lang="de-DE" baseline="0" dirty="0" err="1" smtClean="0">
+                          <a:latin typeface="Helvetica Neue"/>
+                          <a:cs typeface="Helvetica Neue"/>
+                        </a:rPr>
+                        <a:t>to</a:t>
+                      </a:r>
+                      <a:r>
+                        <a:rPr lang="de-DE" baseline="0" dirty="0" smtClean="0">
+                          <a:latin typeface="Helvetica Neue"/>
+                          <a:cs typeface="Helvetica Neue"/>
+                        </a:rPr>
+                        <a:t> </a:t>
+                      </a:r>
+                      <a:r>
+                        <a:rPr lang="de-DE" baseline="0" dirty="0" err="1" smtClean="0">
+                          <a:latin typeface="Helvetica Neue"/>
+                          <a:cs typeface="Helvetica Neue"/>
+                        </a:rPr>
+                        <a:t>make</a:t>
+                      </a:r>
+                      <a:endParaRPr lang="de-DE" dirty="0">
+                        <a:latin typeface="Helvetica Neue"/>
+                        <a:cs typeface="Helvetica Neue"/>
+                      </a:endParaRPr>
+                    </a:p>
+                  </a:txBody>
+                  <a:tcPr/>
+                </a:tc>
+              </a:tr>
+              <a:tr h="383241">
+                <a:tc>
+                  <a:txBody>
+                    <a:bodyPr/>
+                    <a:lstStyle/>
+                    <a:p>
+                      <a:r>
+                        <a:rPr lang="de-DE" dirty="0" err="1" smtClean="0">
+                          <a:latin typeface="Helvetica Neue"/>
+                          <a:cs typeface="Helvetica Neue"/>
+                        </a:rPr>
+                        <a:t>Actors</a:t>
+                      </a:r>
+                      <a:endParaRPr lang="de-DE" dirty="0">
+                        <a:latin typeface="Helvetica Neue"/>
+                        <a:cs typeface="Helvetica Neue"/>
+                      </a:endParaRPr>
+                    </a:p>
+                  </a:txBody>
+                  <a:tcPr/>
+                </a:tc>
+                <a:tc>
+                  <a:txBody>
+                    <a:bodyPr/>
+                    <a:lstStyle/>
+                    <a:p>
+                      <a:r>
+                        <a:rPr lang="de-DE" dirty="0" smtClean="0">
+                          <a:latin typeface="Helvetica Neue"/>
+                          <a:cs typeface="Helvetica Neue"/>
+                        </a:rPr>
+                        <a:t>User, Employee</a:t>
+                      </a:r>
+                      <a:endParaRPr lang="de-DE" dirty="0">
+                        <a:latin typeface="Helvetica Neue"/>
+                        <a:cs typeface="Helvetica Neue"/>
+                      </a:endParaRPr>
+                    </a:p>
+                  </a:txBody>
+                  <a:tcPr/>
+                </a:tc>
+              </a:tr>
+              <a:tr h="383241">
+                <a:tc>
+                  <a:txBody>
+                    <a:bodyPr/>
+                    <a:lstStyle/>
+                    <a:p>
+                      <a:r>
+                        <a:rPr lang="de-DE" dirty="0" err="1" smtClean="0">
+                          <a:latin typeface="Helvetica Neue"/>
+                          <a:cs typeface="Helvetica Neue"/>
+                        </a:rPr>
+                        <a:t>Pre-conditions</a:t>
+                      </a:r>
+                      <a:endParaRPr lang="de-DE" dirty="0">
+                        <a:latin typeface="Helvetica Neue"/>
+                        <a:cs typeface="Helvetica Neue"/>
+                      </a:endParaRPr>
+                    </a:p>
+                  </a:txBody>
+                  <a:tcPr/>
+                </a:tc>
+                <a:tc>
+                  <a:txBody>
+                    <a:bodyPr/>
+                    <a:lstStyle/>
+                    <a:p>
+                      <a:r>
+                        <a:rPr lang="de-DE" dirty="0" smtClean="0">
+                          <a:latin typeface="Helvetica Neue"/>
+                          <a:cs typeface="Helvetica Neue"/>
+                        </a:rPr>
+                        <a:t>User </a:t>
+                      </a:r>
+                      <a:r>
+                        <a:rPr lang="de-DE" dirty="0" err="1" smtClean="0">
+                          <a:latin typeface="Helvetica Neue"/>
+                          <a:cs typeface="Helvetica Neue"/>
+                        </a:rPr>
+                        <a:t>is</a:t>
+                      </a:r>
+                      <a:r>
+                        <a:rPr lang="de-DE" dirty="0" smtClean="0">
+                          <a:latin typeface="Helvetica Neue"/>
+                          <a:cs typeface="Helvetica Neue"/>
+                        </a:rPr>
+                        <a:t> </a:t>
+                      </a:r>
+                      <a:r>
+                        <a:rPr lang="de-DE" dirty="0" err="1" smtClean="0">
+                          <a:latin typeface="Helvetica Neue"/>
+                          <a:cs typeface="Helvetica Neue"/>
+                        </a:rPr>
+                        <a:t>logged</a:t>
+                      </a:r>
+                      <a:r>
+                        <a:rPr lang="de-DE" dirty="0" smtClean="0">
+                          <a:latin typeface="Helvetica Neue"/>
+                          <a:cs typeface="Helvetica Neue"/>
+                        </a:rPr>
+                        <a:t> in</a:t>
+                      </a:r>
+                      <a:endParaRPr lang="de-DE" dirty="0">
+                        <a:latin typeface="Helvetica Neue"/>
+                        <a:cs typeface="Helvetica Neue"/>
+                      </a:endParaRPr>
+                    </a:p>
+                  </a:txBody>
+                  <a:tcPr/>
+                </a:tc>
+              </a:tr>
+              <a:tr h="1228472">
+                <a:tc>
+                  <a:txBody>
+                    <a:bodyPr/>
+                    <a:lstStyle/>
+                    <a:p>
+                      <a:r>
+                        <a:rPr lang="de-DE" dirty="0" smtClean="0">
+                          <a:latin typeface="Helvetica Neue"/>
+                          <a:cs typeface="Helvetica Neue"/>
+                        </a:rPr>
+                        <a:t>Main </a:t>
+                      </a:r>
+                      <a:r>
+                        <a:rPr lang="de-DE" dirty="0" err="1" smtClean="0">
+                          <a:latin typeface="Helvetica Neue"/>
+                          <a:cs typeface="Helvetica Neue"/>
+                        </a:rPr>
+                        <a:t>Course</a:t>
+                      </a:r>
+                      <a:r>
+                        <a:rPr lang="de-DE" dirty="0" smtClean="0">
+                          <a:latin typeface="Helvetica Neue"/>
+                          <a:cs typeface="Helvetica Neue"/>
+                        </a:rPr>
+                        <a:t> </a:t>
+                      </a:r>
+                      <a:r>
+                        <a:rPr lang="de-DE" dirty="0" err="1" smtClean="0">
+                          <a:latin typeface="Helvetica Neue"/>
+                          <a:cs typeface="Helvetica Neue"/>
+                        </a:rPr>
+                        <a:t>fo</a:t>
+                      </a:r>
+                      <a:r>
+                        <a:rPr lang="de-DE" dirty="0" smtClean="0">
+                          <a:latin typeface="Helvetica Neue"/>
+                          <a:cs typeface="Helvetica Neue"/>
+                        </a:rPr>
+                        <a:t> </a:t>
+                      </a:r>
+                      <a:r>
+                        <a:rPr lang="de-DE" dirty="0" err="1" smtClean="0">
+                          <a:latin typeface="Helvetica Neue"/>
+                          <a:cs typeface="Helvetica Neue"/>
+                        </a:rPr>
+                        <a:t>Execution</a:t>
+                      </a:r>
+                      <a:endParaRPr lang="de-DE" dirty="0">
+                        <a:latin typeface="Helvetica Neue"/>
+                        <a:cs typeface="Helvetica Neue"/>
+                      </a:endParaRPr>
+                    </a:p>
+                  </a:txBody>
+                  <a:tcPr/>
+                </a:tc>
+                <a:tc>
+                  <a:txBody>
+                    <a:bodyPr/>
+                    <a:lstStyle/>
+                    <a:p>
+                      <a:r>
+                        <a:rPr lang="de-DE" dirty="0" smtClean="0">
+                          <a:latin typeface="Helvetica Neue"/>
+                          <a:cs typeface="Helvetica Neue"/>
+                        </a:rPr>
+                        <a:t>User </a:t>
+                      </a:r>
+                      <a:r>
+                        <a:rPr lang="de-DE" dirty="0" err="1" smtClean="0">
+                          <a:latin typeface="Helvetica Neue"/>
+                          <a:cs typeface="Helvetica Neue"/>
+                        </a:rPr>
+                        <a:t>chooses</a:t>
+                      </a:r>
+                      <a:r>
+                        <a:rPr lang="de-DE" dirty="0" smtClean="0">
+                          <a:latin typeface="Helvetica Neue"/>
+                          <a:cs typeface="Helvetica Neue"/>
+                        </a:rPr>
+                        <a:t> </a:t>
+                      </a:r>
+                      <a:r>
+                        <a:rPr lang="de-DE" dirty="0" err="1" smtClean="0">
+                          <a:latin typeface="Helvetica Neue"/>
+                          <a:cs typeface="Helvetica Neue"/>
+                        </a:rPr>
+                        <a:t>Make</a:t>
+                      </a:r>
+                      <a:r>
+                        <a:rPr lang="de-DE" dirty="0" smtClean="0">
+                          <a:latin typeface="Helvetica Neue"/>
+                          <a:cs typeface="Helvetica Neue"/>
+                        </a:rPr>
+                        <a:t> Transfer </a:t>
+                      </a:r>
+                      <a:r>
+                        <a:rPr lang="de-DE" dirty="0" err="1" smtClean="0">
+                          <a:latin typeface="Helvetica Neue"/>
+                          <a:cs typeface="Helvetica Neue"/>
+                        </a:rPr>
+                        <a:t>from</a:t>
+                      </a:r>
+                      <a:r>
+                        <a:rPr lang="de-DE" dirty="0" smtClean="0">
+                          <a:latin typeface="Helvetica Neue"/>
+                          <a:cs typeface="Helvetica Neue"/>
+                        </a:rPr>
+                        <a:t> </a:t>
+                      </a:r>
+                      <a:r>
+                        <a:rPr lang="de-DE" dirty="0" err="1" smtClean="0">
+                          <a:latin typeface="Helvetica Neue"/>
+                          <a:cs typeface="Helvetica Neue"/>
+                        </a:rPr>
+                        <a:t>the</a:t>
+                      </a:r>
+                      <a:r>
+                        <a:rPr lang="de-DE" dirty="0" smtClean="0">
+                          <a:latin typeface="Helvetica Neue"/>
+                          <a:cs typeface="Helvetica Neue"/>
+                        </a:rPr>
+                        <a:t> </a:t>
+                      </a:r>
+                      <a:r>
+                        <a:rPr lang="de-DE" dirty="0" err="1" smtClean="0">
+                          <a:latin typeface="Helvetica Neue"/>
+                          <a:cs typeface="Helvetica Neue"/>
+                        </a:rPr>
+                        <a:t>side</a:t>
+                      </a:r>
+                      <a:r>
+                        <a:rPr lang="de-DE" dirty="0" smtClean="0">
+                          <a:latin typeface="Helvetica Neue"/>
+                          <a:cs typeface="Helvetica Neue"/>
+                        </a:rPr>
+                        <a:t> bar </a:t>
+                      </a:r>
+                      <a:r>
+                        <a:rPr lang="de-DE" dirty="0" err="1" smtClean="0">
+                          <a:latin typeface="Helvetica Neue"/>
+                          <a:cs typeface="Helvetica Neue"/>
+                        </a:rPr>
+                        <a:t>and</a:t>
+                      </a:r>
+                      <a:r>
+                        <a:rPr lang="de-DE" dirty="0" smtClean="0">
+                          <a:latin typeface="Helvetica Neue"/>
+                          <a:cs typeface="Helvetica Neue"/>
+                        </a:rPr>
+                        <a:t> </a:t>
+                      </a:r>
+                      <a:r>
+                        <a:rPr lang="de-DE" dirty="0" err="1" smtClean="0">
+                          <a:latin typeface="Helvetica Neue"/>
+                          <a:cs typeface="Helvetica Neue"/>
+                        </a:rPr>
+                        <a:t>selects</a:t>
+                      </a:r>
+                      <a:r>
+                        <a:rPr lang="de-DE" baseline="0" dirty="0" smtClean="0">
+                          <a:latin typeface="Helvetica Neue"/>
+                          <a:cs typeface="Helvetica Neue"/>
+                        </a:rPr>
+                        <a:t> </a:t>
+                      </a:r>
+                      <a:r>
+                        <a:rPr lang="de-DE" baseline="0" dirty="0" err="1" smtClean="0">
+                          <a:latin typeface="Helvetica Neue"/>
+                          <a:cs typeface="Helvetica Neue"/>
+                        </a:rPr>
+                        <a:t>the</a:t>
+                      </a:r>
+                      <a:r>
+                        <a:rPr lang="de-DE" baseline="0" dirty="0" smtClean="0">
+                          <a:latin typeface="Helvetica Neue"/>
+                          <a:cs typeface="Helvetica Neue"/>
+                        </a:rPr>
+                        <a:t> Tab via </a:t>
+                      </a:r>
+                      <a:r>
+                        <a:rPr lang="de-DE" baseline="0" dirty="0" err="1" smtClean="0">
+                          <a:latin typeface="Helvetica Neue"/>
+                          <a:cs typeface="Helvetica Neue"/>
+                        </a:rPr>
+                        <a:t>file</a:t>
+                      </a:r>
+                      <a:r>
+                        <a:rPr lang="de-DE" baseline="0" dirty="0" smtClean="0">
+                          <a:latin typeface="Helvetica Neue"/>
+                          <a:cs typeface="Helvetica Neue"/>
+                        </a:rPr>
+                        <a:t> </a:t>
+                      </a:r>
+                      <a:r>
+                        <a:rPr lang="de-DE" baseline="0" dirty="0" err="1" smtClean="0">
+                          <a:latin typeface="Helvetica Neue"/>
+                          <a:cs typeface="Helvetica Neue"/>
+                        </a:rPr>
+                        <a:t>upload</a:t>
+                      </a:r>
+                      <a:r>
+                        <a:rPr lang="de-DE" baseline="0" dirty="0" smtClean="0">
+                          <a:latin typeface="Helvetica Neue"/>
+                          <a:cs typeface="Helvetica Neue"/>
+                        </a:rPr>
+                        <a:t>. </a:t>
+                      </a:r>
+                      <a:r>
+                        <a:rPr lang="de-DE" baseline="0" dirty="0" err="1" smtClean="0">
+                          <a:latin typeface="Helvetica Neue"/>
+                          <a:cs typeface="Helvetica Neue"/>
+                        </a:rPr>
+                        <a:t>Then</a:t>
+                      </a:r>
+                      <a:r>
+                        <a:rPr lang="de-DE" baseline="0" dirty="0" smtClean="0">
+                          <a:latin typeface="Helvetica Neue"/>
+                          <a:cs typeface="Helvetica Neue"/>
+                        </a:rPr>
+                        <a:t> he </a:t>
+                      </a:r>
+                      <a:r>
+                        <a:rPr lang="de-DE" baseline="0" dirty="0" err="1" smtClean="0">
+                          <a:latin typeface="Helvetica Neue"/>
+                          <a:cs typeface="Helvetica Neue"/>
+                        </a:rPr>
+                        <a:t>selects</a:t>
+                      </a:r>
+                      <a:r>
+                        <a:rPr lang="de-DE" baseline="0" dirty="0" smtClean="0">
+                          <a:latin typeface="Helvetica Neue"/>
+                          <a:cs typeface="Helvetica Neue"/>
+                        </a:rPr>
+                        <a:t> a </a:t>
+                      </a:r>
+                      <a:r>
+                        <a:rPr lang="de-DE" baseline="0" dirty="0" err="1" smtClean="0">
+                          <a:latin typeface="Helvetica Neue"/>
+                          <a:cs typeface="Helvetica Neue"/>
+                        </a:rPr>
+                        <a:t>file</a:t>
+                      </a:r>
+                      <a:r>
+                        <a:rPr lang="de-DE" baseline="0" dirty="0" smtClean="0">
+                          <a:latin typeface="Helvetica Neue"/>
+                          <a:cs typeface="Helvetica Neue"/>
+                        </a:rPr>
+                        <a:t> </a:t>
+                      </a:r>
+                      <a:r>
+                        <a:rPr lang="de-DE" baseline="0" dirty="0" err="1" smtClean="0">
+                          <a:latin typeface="Helvetica Neue"/>
+                          <a:cs typeface="Helvetica Neue"/>
+                        </a:rPr>
+                        <a:t>from</a:t>
+                      </a:r>
+                      <a:r>
+                        <a:rPr lang="de-DE" baseline="0" dirty="0" smtClean="0">
+                          <a:latin typeface="Helvetica Neue"/>
+                          <a:cs typeface="Helvetica Neue"/>
+                        </a:rPr>
+                        <a:t> </a:t>
+                      </a:r>
+                      <a:r>
+                        <a:rPr lang="de-DE" baseline="0" dirty="0" err="1" smtClean="0">
+                          <a:latin typeface="Helvetica Neue"/>
+                          <a:cs typeface="Helvetica Neue"/>
+                        </a:rPr>
+                        <a:t>his</a:t>
+                      </a:r>
+                      <a:r>
+                        <a:rPr lang="de-DE" baseline="0" dirty="0" smtClean="0">
+                          <a:latin typeface="Helvetica Neue"/>
+                          <a:cs typeface="Helvetica Neue"/>
+                        </a:rPr>
+                        <a:t> </a:t>
+                      </a:r>
+                      <a:r>
+                        <a:rPr lang="de-DE" baseline="0" dirty="0" err="1" smtClean="0">
+                          <a:latin typeface="Helvetica Neue"/>
+                          <a:cs typeface="Helvetica Neue"/>
+                        </a:rPr>
+                        <a:t>computer</a:t>
+                      </a:r>
+                      <a:r>
+                        <a:rPr lang="de-DE" baseline="0" dirty="0" smtClean="0">
+                          <a:latin typeface="Helvetica Neue"/>
+                          <a:cs typeface="Helvetica Neue"/>
+                        </a:rPr>
+                        <a:t> </a:t>
+                      </a:r>
+                      <a:r>
+                        <a:rPr lang="de-DE" baseline="0" dirty="0" err="1" smtClean="0">
+                          <a:latin typeface="Helvetica Neue"/>
+                          <a:cs typeface="Helvetica Neue"/>
+                        </a:rPr>
+                        <a:t>and</a:t>
+                      </a:r>
+                      <a:r>
+                        <a:rPr lang="de-DE" baseline="0" dirty="0" smtClean="0">
+                          <a:latin typeface="Helvetica Neue"/>
+                          <a:cs typeface="Helvetica Neue"/>
+                        </a:rPr>
+                        <a:t> </a:t>
+                      </a:r>
+                      <a:r>
+                        <a:rPr lang="de-DE" baseline="0" dirty="0" err="1" smtClean="0">
+                          <a:latin typeface="Helvetica Neue"/>
+                          <a:cs typeface="Helvetica Neue"/>
+                        </a:rPr>
+                        <a:t>clicks</a:t>
+                      </a:r>
+                      <a:r>
+                        <a:rPr lang="de-DE" baseline="0" dirty="0" smtClean="0">
+                          <a:latin typeface="Helvetica Neue"/>
+                          <a:cs typeface="Helvetica Neue"/>
+                        </a:rPr>
+                        <a:t> </a:t>
+                      </a:r>
+                      <a:r>
+                        <a:rPr lang="de-DE" baseline="0" dirty="0" err="1" smtClean="0">
+                          <a:latin typeface="Helvetica Neue"/>
+                          <a:cs typeface="Helvetica Neue"/>
+                        </a:rPr>
+                        <a:t>Submit</a:t>
+                      </a:r>
+                      <a:r>
+                        <a:rPr lang="de-DE" baseline="0" dirty="0" smtClean="0">
+                          <a:latin typeface="Helvetica Neue"/>
+                          <a:cs typeface="Helvetica Neue"/>
+                        </a:rPr>
+                        <a:t>.</a:t>
+                      </a:r>
+                      <a:endParaRPr lang="de-DE" dirty="0">
+                        <a:latin typeface="Helvetica Neue"/>
+                        <a:cs typeface="Helvetica Neue"/>
+                      </a:endParaRPr>
+                    </a:p>
+                  </a:txBody>
+                  <a:tcPr/>
+                </a:tc>
+              </a:tr>
+              <a:tr h="383241">
+                <a:tc>
+                  <a:txBody>
+                    <a:bodyPr/>
+                    <a:lstStyle/>
+                    <a:p>
+                      <a:r>
+                        <a:rPr lang="de-DE" dirty="0" err="1" smtClean="0">
+                          <a:latin typeface="Helvetica Neue"/>
+                          <a:cs typeface="Helvetica Neue"/>
+                        </a:rPr>
+                        <a:t>Alternate</a:t>
+                      </a:r>
+                      <a:r>
+                        <a:rPr lang="de-DE" dirty="0" smtClean="0">
+                          <a:latin typeface="Helvetica Neue"/>
+                          <a:cs typeface="Helvetica Neue"/>
+                        </a:rPr>
+                        <a:t> </a:t>
+                      </a:r>
+                      <a:r>
+                        <a:rPr lang="de-DE" dirty="0" err="1" smtClean="0">
+                          <a:latin typeface="Helvetica Neue"/>
+                          <a:cs typeface="Helvetica Neue"/>
+                        </a:rPr>
+                        <a:t>Courses</a:t>
+                      </a:r>
+                      <a:endParaRPr lang="de-DE" dirty="0">
+                        <a:latin typeface="Helvetica Neue"/>
+                        <a:cs typeface="Helvetica Neue"/>
+                      </a:endParaRPr>
+                    </a:p>
+                  </a:txBody>
+                  <a:tcPr/>
+                </a:tc>
+                <a:tc>
+                  <a:txBody>
+                    <a:bodyPr/>
+                    <a:lstStyle/>
+                    <a:p>
+                      <a:r>
+                        <a:rPr lang="de-DE" dirty="0" smtClean="0">
+                          <a:latin typeface="Helvetica Neue"/>
+                          <a:cs typeface="Helvetica Neue"/>
+                        </a:rPr>
+                        <a:t>-</a:t>
+                      </a:r>
+                      <a:endParaRPr lang="de-DE" dirty="0">
+                        <a:latin typeface="Helvetica Neue"/>
+                        <a:cs typeface="Helvetica Neue"/>
+                      </a:endParaRPr>
+                    </a:p>
+                  </a:txBody>
+                  <a:tcPr/>
+                </a:tc>
+              </a:tr>
+              <a:tr h="383241">
+                <a:tc>
+                  <a:txBody>
+                    <a:bodyPr/>
+                    <a:lstStyle/>
+                    <a:p>
+                      <a:r>
+                        <a:rPr lang="de-DE" dirty="0" err="1" smtClean="0">
+                          <a:latin typeface="Helvetica Neue"/>
+                          <a:cs typeface="Helvetica Neue"/>
+                        </a:rPr>
+                        <a:t>Exceptions</a:t>
+                      </a:r>
+                      <a:endParaRPr lang="de-DE" dirty="0">
+                        <a:latin typeface="Helvetica Neue"/>
+                        <a:cs typeface="Helvetica Neue"/>
+                      </a:endParaRPr>
+                    </a:p>
+                  </a:txBody>
+                  <a:tcPr/>
+                </a:tc>
+                <a:tc>
+                  <a:txBody>
+                    <a:bodyPr/>
+                    <a:lstStyle/>
+                    <a:p>
+                      <a:r>
+                        <a:rPr lang="de-DE" dirty="0" err="1" smtClean="0">
+                          <a:latin typeface="Helvetica Neue"/>
+                          <a:cs typeface="Helvetica Neue"/>
+                        </a:rPr>
+                        <a:t>No</a:t>
+                      </a:r>
+                      <a:r>
+                        <a:rPr lang="de-DE" dirty="0" smtClean="0">
+                          <a:latin typeface="Helvetica Neue"/>
+                          <a:cs typeface="Helvetica Neue"/>
+                        </a:rPr>
+                        <a:t> real </a:t>
+                      </a:r>
+                      <a:r>
+                        <a:rPr lang="de-DE" dirty="0" err="1" smtClean="0">
+                          <a:latin typeface="Helvetica Neue"/>
+                          <a:cs typeface="Helvetica Neue"/>
+                        </a:rPr>
+                        <a:t>exceptions</a:t>
+                      </a:r>
+                      <a:r>
+                        <a:rPr lang="de-DE" dirty="0" smtClean="0">
+                          <a:latin typeface="Helvetica Neue"/>
+                          <a:cs typeface="Helvetica Neue"/>
+                        </a:rPr>
+                        <a:t>,</a:t>
+                      </a:r>
+                      <a:r>
+                        <a:rPr lang="de-DE" baseline="0" dirty="0" smtClean="0">
+                          <a:latin typeface="Helvetica Neue"/>
+                          <a:cs typeface="Helvetica Neue"/>
+                        </a:rPr>
+                        <a:t> </a:t>
+                      </a:r>
+                      <a:r>
+                        <a:rPr lang="de-DE" baseline="0" dirty="0" err="1" smtClean="0">
+                          <a:latin typeface="Helvetica Neue"/>
+                          <a:cs typeface="Helvetica Neue"/>
+                        </a:rPr>
+                        <a:t>only</a:t>
+                      </a:r>
+                      <a:r>
+                        <a:rPr lang="de-DE" baseline="0" dirty="0" smtClean="0">
+                          <a:latin typeface="Helvetica Neue"/>
+                          <a:cs typeface="Helvetica Neue"/>
+                        </a:rPr>
+                        <a:t> </a:t>
+                      </a:r>
+                      <a:r>
+                        <a:rPr lang="de-DE" baseline="0" dirty="0" err="1" smtClean="0">
+                          <a:latin typeface="Helvetica Neue"/>
+                          <a:cs typeface="Helvetica Neue"/>
+                        </a:rPr>
+                        <a:t>error</a:t>
+                      </a:r>
+                      <a:r>
+                        <a:rPr lang="de-DE" baseline="0" dirty="0" smtClean="0">
+                          <a:latin typeface="Helvetica Neue"/>
+                          <a:cs typeface="Helvetica Neue"/>
+                        </a:rPr>
+                        <a:t> </a:t>
+                      </a:r>
+                      <a:r>
+                        <a:rPr lang="de-DE" baseline="0" dirty="0" err="1" smtClean="0">
+                          <a:latin typeface="Helvetica Neue"/>
+                          <a:cs typeface="Helvetica Neue"/>
+                        </a:rPr>
+                        <a:t>messages</a:t>
+                      </a:r>
+                      <a:r>
+                        <a:rPr lang="de-DE" baseline="0" dirty="0" smtClean="0">
+                          <a:latin typeface="Helvetica Neue"/>
+                          <a:cs typeface="Helvetica Neue"/>
+                        </a:rPr>
+                        <a:t> </a:t>
+                      </a:r>
+                      <a:r>
+                        <a:rPr lang="de-DE" baseline="0" dirty="0" err="1" smtClean="0">
+                          <a:latin typeface="Helvetica Neue"/>
+                          <a:cs typeface="Helvetica Neue"/>
+                        </a:rPr>
+                        <a:t>for</a:t>
+                      </a:r>
+                      <a:r>
+                        <a:rPr lang="de-DE" baseline="0" dirty="0" smtClean="0">
+                          <a:latin typeface="Helvetica Neue"/>
+                          <a:cs typeface="Helvetica Neue"/>
+                        </a:rPr>
+                        <a:t> </a:t>
+                      </a:r>
+                      <a:r>
+                        <a:rPr lang="de-DE" baseline="0" dirty="0" err="1" smtClean="0">
+                          <a:latin typeface="Helvetica Neue"/>
+                          <a:cs typeface="Helvetica Neue"/>
+                        </a:rPr>
+                        <a:t>the</a:t>
+                      </a:r>
+                      <a:r>
+                        <a:rPr lang="de-DE" baseline="0" dirty="0" smtClean="0">
+                          <a:latin typeface="Helvetica Neue"/>
+                          <a:cs typeface="Helvetica Neue"/>
+                        </a:rPr>
+                        <a:t> Customer</a:t>
+                      </a:r>
+                      <a:endParaRPr lang="de-DE" dirty="0">
+                        <a:latin typeface="Helvetica Neue"/>
+                        <a:cs typeface="Helvetica Neue"/>
+                      </a:endParaRPr>
+                    </a:p>
+                  </a:txBody>
+                  <a:tcPr/>
+                </a:tc>
+              </a:tr>
+              <a:tr h="944978">
+                <a:tc>
+                  <a:txBody>
+                    <a:bodyPr/>
+                    <a:lstStyle/>
+                    <a:p>
+                      <a:r>
+                        <a:rPr lang="de-DE" dirty="0" smtClean="0">
+                          <a:latin typeface="Helvetica Neue"/>
+                          <a:cs typeface="Helvetica Neue"/>
+                        </a:rPr>
+                        <a:t>Post-</a:t>
+                      </a:r>
+                      <a:r>
+                        <a:rPr lang="de-DE" dirty="0" err="1" smtClean="0">
+                          <a:latin typeface="Helvetica Neue"/>
+                          <a:cs typeface="Helvetica Neue"/>
+                        </a:rPr>
+                        <a:t>conditions</a:t>
+                      </a:r>
+                      <a:endParaRPr lang="de-DE" dirty="0">
+                        <a:latin typeface="Helvetica Neue"/>
+                        <a:cs typeface="Helvetica Neue"/>
+                      </a:endParaRPr>
+                    </a:p>
+                  </a:txBody>
+                  <a:tcPr/>
+                </a:tc>
+                <a:tc>
+                  <a:txBody>
+                    <a:bodyPr/>
+                    <a:lstStyle/>
+                    <a:p>
+                      <a:r>
+                        <a:rPr lang="de-DE" dirty="0" smtClean="0">
+                          <a:latin typeface="Helvetica Neue"/>
+                          <a:cs typeface="Helvetica Neue"/>
+                        </a:rPr>
+                        <a:t>User </a:t>
+                      </a:r>
+                      <a:r>
+                        <a:rPr lang="de-DE" dirty="0" err="1" smtClean="0">
+                          <a:latin typeface="Helvetica Neue"/>
+                          <a:cs typeface="Helvetica Neue"/>
+                        </a:rPr>
+                        <a:t>gets</a:t>
+                      </a:r>
+                      <a:r>
+                        <a:rPr lang="de-DE" dirty="0" smtClean="0">
+                          <a:latin typeface="Helvetica Neue"/>
+                          <a:cs typeface="Helvetica Neue"/>
+                        </a:rPr>
+                        <a:t> </a:t>
+                      </a:r>
+                      <a:r>
+                        <a:rPr lang="de-DE" dirty="0" err="1" smtClean="0">
+                          <a:latin typeface="Helvetica Neue"/>
+                          <a:cs typeface="Helvetica Neue"/>
+                        </a:rPr>
+                        <a:t>redirected</a:t>
+                      </a:r>
+                      <a:r>
+                        <a:rPr lang="de-DE" dirty="0" smtClean="0">
+                          <a:latin typeface="Helvetica Neue"/>
+                          <a:cs typeface="Helvetica Neue"/>
+                        </a:rPr>
+                        <a:t> </a:t>
+                      </a:r>
+                      <a:r>
+                        <a:rPr lang="de-DE" dirty="0" err="1" smtClean="0">
+                          <a:latin typeface="Helvetica Neue"/>
+                          <a:cs typeface="Helvetica Neue"/>
+                        </a:rPr>
+                        <a:t>to</a:t>
+                      </a:r>
+                      <a:r>
+                        <a:rPr lang="de-DE" dirty="0" smtClean="0">
+                          <a:latin typeface="Helvetica Neue"/>
+                          <a:cs typeface="Helvetica Neue"/>
+                        </a:rPr>
+                        <a:t> </a:t>
+                      </a:r>
+                      <a:r>
+                        <a:rPr lang="de-DE" dirty="0" err="1" smtClean="0">
+                          <a:latin typeface="Helvetica Neue"/>
+                          <a:cs typeface="Helvetica Neue"/>
+                        </a:rPr>
+                        <a:t>Make</a:t>
+                      </a:r>
+                      <a:r>
+                        <a:rPr lang="de-DE" dirty="0" smtClean="0">
+                          <a:latin typeface="Helvetica Neue"/>
+                          <a:cs typeface="Helvetica Neue"/>
+                        </a:rPr>
+                        <a:t> Transfer </a:t>
+                      </a:r>
+                      <a:r>
+                        <a:rPr lang="de-DE" dirty="0" err="1" smtClean="0">
+                          <a:latin typeface="Helvetica Neue"/>
+                          <a:cs typeface="Helvetica Neue"/>
+                        </a:rPr>
+                        <a:t>page</a:t>
+                      </a:r>
+                      <a:r>
+                        <a:rPr lang="de-DE" dirty="0" smtClean="0">
+                          <a:latin typeface="Helvetica Neue"/>
+                          <a:cs typeface="Helvetica Neue"/>
+                        </a:rPr>
+                        <a:t> </a:t>
+                      </a:r>
+                      <a:r>
+                        <a:rPr lang="de-DE" dirty="0" err="1" smtClean="0">
+                          <a:latin typeface="Helvetica Neue"/>
+                          <a:cs typeface="Helvetica Neue"/>
+                        </a:rPr>
+                        <a:t>with</a:t>
+                      </a:r>
+                      <a:r>
+                        <a:rPr lang="de-DE" dirty="0" smtClean="0">
+                          <a:latin typeface="Helvetica Neue"/>
+                          <a:cs typeface="Helvetica Neue"/>
+                        </a:rPr>
+                        <a:t> a </a:t>
+                      </a:r>
+                      <a:r>
+                        <a:rPr lang="de-DE" dirty="0" err="1" smtClean="0">
+                          <a:latin typeface="Helvetica Neue"/>
+                          <a:cs typeface="Helvetica Neue"/>
+                        </a:rPr>
+                        <a:t>success</a:t>
+                      </a:r>
+                      <a:r>
+                        <a:rPr lang="de-DE" dirty="0" smtClean="0">
+                          <a:latin typeface="Helvetica Neue"/>
+                          <a:cs typeface="Helvetica Neue"/>
+                        </a:rPr>
+                        <a:t> </a:t>
+                      </a:r>
+                      <a:r>
+                        <a:rPr lang="de-DE" dirty="0" err="1" smtClean="0">
+                          <a:latin typeface="Helvetica Neue"/>
+                          <a:cs typeface="Helvetica Neue"/>
+                        </a:rPr>
+                        <a:t>or</a:t>
+                      </a:r>
+                      <a:r>
+                        <a:rPr lang="de-DE" baseline="0" dirty="0" smtClean="0">
+                          <a:latin typeface="Helvetica Neue"/>
+                          <a:cs typeface="Helvetica Neue"/>
+                        </a:rPr>
+                        <a:t> </a:t>
+                      </a:r>
+                      <a:r>
+                        <a:rPr lang="de-DE" baseline="0" dirty="0" err="1" smtClean="0">
+                          <a:latin typeface="Helvetica Neue"/>
+                          <a:cs typeface="Helvetica Neue"/>
+                        </a:rPr>
+                        <a:t>error</a:t>
+                      </a:r>
+                      <a:r>
+                        <a:rPr lang="de-DE" dirty="0" smtClean="0">
+                          <a:latin typeface="Helvetica Neue"/>
+                          <a:cs typeface="Helvetica Neue"/>
+                        </a:rPr>
+                        <a:t> </a:t>
+                      </a:r>
+                      <a:r>
+                        <a:rPr lang="de-DE" dirty="0" err="1" smtClean="0">
+                          <a:latin typeface="Helvetica Neue"/>
+                          <a:cs typeface="Helvetica Neue"/>
+                        </a:rPr>
+                        <a:t>notification</a:t>
+                      </a:r>
+                      <a:endParaRPr lang="de-DE" dirty="0">
+                        <a:latin typeface="Helvetica Neue"/>
+                        <a:cs typeface="Helvetica Neue"/>
+                      </a:endParaRPr>
+                    </a:p>
+                  </a:txBody>
+                  <a:tcPr/>
+                </a:tc>
+              </a:tr>
+              <a:tr h="383241">
+                <a:tc>
+                  <a:txBody>
+                    <a:bodyPr/>
+                    <a:lstStyle/>
+                    <a:p>
+                      <a:r>
+                        <a:rPr lang="de-DE" dirty="0" smtClean="0">
+                          <a:latin typeface="Helvetica Neue"/>
+                          <a:cs typeface="Helvetica Neue"/>
+                        </a:rPr>
+                        <a:t>Data</a:t>
+                      </a:r>
+                      <a:r>
+                        <a:rPr lang="de-DE" baseline="0" dirty="0" smtClean="0">
+                          <a:latin typeface="Helvetica Neue"/>
+                          <a:cs typeface="Helvetica Neue"/>
+                        </a:rPr>
+                        <a:t> </a:t>
+                      </a:r>
+                      <a:r>
+                        <a:rPr lang="de-DE" baseline="0" dirty="0" err="1" smtClean="0">
+                          <a:latin typeface="Helvetica Neue"/>
+                          <a:cs typeface="Helvetica Neue"/>
+                        </a:rPr>
+                        <a:t>formats</a:t>
+                      </a:r>
+                      <a:r>
+                        <a:rPr lang="de-DE" baseline="0" dirty="0" smtClean="0">
+                          <a:latin typeface="Helvetica Neue"/>
+                          <a:cs typeface="Helvetica Neue"/>
+                        </a:rPr>
+                        <a:t> </a:t>
+                      </a:r>
+                      <a:r>
+                        <a:rPr lang="de-DE" baseline="0" dirty="0" err="1" smtClean="0">
+                          <a:latin typeface="Helvetica Neue"/>
+                          <a:cs typeface="Helvetica Neue"/>
+                        </a:rPr>
+                        <a:t>used</a:t>
+                      </a:r>
+                      <a:endParaRPr lang="de-DE" dirty="0">
+                        <a:latin typeface="Helvetica Neue"/>
+                        <a:cs typeface="Helvetica Neue"/>
+                      </a:endParaRPr>
+                    </a:p>
+                  </a:txBody>
+                  <a:tcPr/>
+                </a:tc>
+                <a:tc>
+                  <a:txBody>
+                    <a:bodyPr/>
+                    <a:lstStyle/>
+                    <a:p>
+                      <a:r>
+                        <a:rPr lang="de-DE" dirty="0" err="1" smtClean="0">
+                          <a:latin typeface="Helvetica Neue"/>
+                          <a:cs typeface="Helvetica Neue"/>
+                        </a:rPr>
+                        <a:t>Plain</a:t>
+                      </a:r>
+                      <a:r>
+                        <a:rPr lang="de-DE" baseline="0" dirty="0" smtClean="0">
+                          <a:latin typeface="Helvetica Neue"/>
+                          <a:cs typeface="Helvetica Neue"/>
+                        </a:rPr>
+                        <a:t> </a:t>
+                      </a:r>
+                      <a:r>
+                        <a:rPr lang="de-DE" baseline="0" dirty="0" err="1" smtClean="0">
+                          <a:latin typeface="Helvetica Neue"/>
+                          <a:cs typeface="Helvetica Neue"/>
+                        </a:rPr>
+                        <a:t>text</a:t>
+                      </a:r>
+                      <a:r>
+                        <a:rPr lang="de-DE" baseline="0" dirty="0" smtClean="0">
+                          <a:latin typeface="Helvetica Neue"/>
+                          <a:cs typeface="Helvetica Neue"/>
+                        </a:rPr>
+                        <a:t> </a:t>
+                      </a:r>
+                      <a:r>
+                        <a:rPr lang="de-DE" baseline="0" dirty="0" err="1" smtClean="0">
+                          <a:latin typeface="Helvetica Neue"/>
+                          <a:cs typeface="Helvetica Neue"/>
+                        </a:rPr>
+                        <a:t>file</a:t>
+                      </a:r>
+                      <a:r>
+                        <a:rPr lang="de-DE" baseline="0" dirty="0" smtClean="0">
+                          <a:latin typeface="Helvetica Neue"/>
+                          <a:cs typeface="Helvetica Neue"/>
+                        </a:rPr>
+                        <a:t> </a:t>
+                      </a:r>
+                      <a:r>
+                        <a:rPr lang="de-DE" baseline="0" dirty="0" err="1" smtClean="0">
+                          <a:latin typeface="Helvetica Neue"/>
+                          <a:cs typeface="Helvetica Neue"/>
+                        </a:rPr>
+                        <a:t>with</a:t>
+                      </a:r>
+                      <a:r>
+                        <a:rPr lang="de-DE" baseline="0" dirty="0" smtClean="0">
+                          <a:latin typeface="Helvetica Neue"/>
+                          <a:cs typeface="Helvetica Neue"/>
+                        </a:rPr>
+                        <a:t> CSV</a:t>
+                      </a:r>
+                      <a:endParaRPr lang="de-DE" dirty="0">
+                        <a:latin typeface="Helvetica Neue"/>
+                        <a:cs typeface="Helvetica Neue"/>
+                      </a:endParaRPr>
+                    </a:p>
+                  </a:txBody>
+                  <a:tcPr/>
+                </a:tc>
+              </a:tr>
+            </a:tbl>
+          </a:graphicData>
+        </a:graphic>
+      </p:graphicFrame>
+    </p:spTree>
+    <p:extLst>
+      <p:ext uri="{BB962C8B-B14F-4D97-AF65-F5344CB8AC3E}">
+        <p14:creationId xmlns:p14="http://schemas.microsoft.com/office/powerpoint/2010/main" val="1182931450"/>
       </p:ext>
     </p:extLst>
   </p:cSld>

</xml_diff>

<commit_message>
added use case for money transfer via HTML form
</commit_message>
<xml_diff>
--- a/presentation1.pptx
+++ b/presentation1.pptx
@@ -17,6 +17,7 @@
     <p:sldId id="264" r:id="rId11"/>
     <p:sldId id="265" r:id="rId12"/>
     <p:sldId id="266" r:id="rId13"/>
+    <p:sldId id="267" r:id="rId14"/>
   </p:sldIdLst>
   <p:sldSz cx="9144000" cy="6858000" type="screen4x3"/>
   <p:notesSz cx="6858000" cy="9144000"/>
@@ -7475,14 +7476,14 @@
             <p:ph idx="1"/>
             <p:extLst>
               <p:ext uri="{D42A27DB-BD31-4B8C-83A1-F6EECF244321}">
-                <p14:modId xmlns:p14="http://schemas.microsoft.com/office/powerpoint/2010/main" val="2826569160"/>
+                <p14:modId xmlns:p14="http://schemas.microsoft.com/office/powerpoint/2010/main" val="3358485260"/>
               </p:ext>
             </p:extLst>
           </p:nvPr>
         </p:nvGraphicFramePr>
         <p:xfrm>
-          <a:off x="457200" y="1027243"/>
-          <a:ext cx="8229600" cy="5669464"/>
+          <a:off x="457200" y="910899"/>
+          <a:ext cx="8229600" cy="5926303"/>
         </p:xfrm>
         <a:graphic>
           <a:graphicData uri="http://schemas.openxmlformats.org/drawingml/2006/table">
@@ -7868,7 +7869,84 @@
                           <a:latin typeface="Helvetica Neue"/>
                           <a:cs typeface="Helvetica Neue"/>
                         </a:rPr>
-                        <a:t> in</a:t>
+                        <a:t> in, </a:t>
+                      </a:r>
+                      <a:r>
+                        <a:rPr lang="de-DE" dirty="0" err="1" smtClean="0">
+                          <a:latin typeface="Helvetica Neue"/>
+                          <a:cs typeface="Helvetica Neue"/>
+                        </a:rPr>
+                        <a:t>transaction</a:t>
+                      </a:r>
+                      <a:r>
+                        <a:rPr lang="de-DE" baseline="0" dirty="0" smtClean="0">
+                          <a:latin typeface="Helvetica Neue"/>
+                          <a:cs typeface="Helvetica Neue"/>
+                        </a:rPr>
+                        <a:t> </a:t>
+                      </a:r>
+                      <a:r>
+                        <a:rPr lang="de-DE" baseline="0" dirty="0" err="1" smtClean="0">
+                          <a:latin typeface="Helvetica Neue"/>
+                          <a:cs typeface="Helvetica Neue"/>
+                        </a:rPr>
+                        <a:t>codes</a:t>
+                      </a:r>
+                      <a:r>
+                        <a:rPr lang="de-DE" baseline="0" dirty="0" smtClean="0">
+                          <a:latin typeface="Helvetica Neue"/>
+                          <a:cs typeface="Helvetica Neue"/>
+                        </a:rPr>
+                        <a:t> </a:t>
+                      </a:r>
+                      <a:r>
+                        <a:rPr lang="de-DE" baseline="0" dirty="0" err="1" smtClean="0">
+                          <a:latin typeface="Helvetica Neue"/>
+                          <a:cs typeface="Helvetica Neue"/>
+                        </a:rPr>
+                        <a:t>used</a:t>
+                      </a:r>
+                      <a:r>
+                        <a:rPr lang="de-DE" baseline="0" dirty="0" smtClean="0">
+                          <a:latin typeface="Helvetica Neue"/>
+                          <a:cs typeface="Helvetica Neue"/>
+                        </a:rPr>
+                        <a:t> </a:t>
+                      </a:r>
+                      <a:r>
+                        <a:rPr lang="de-DE" baseline="0" dirty="0" err="1" smtClean="0">
+                          <a:latin typeface="Helvetica Neue"/>
+                          <a:cs typeface="Helvetica Neue"/>
+                        </a:rPr>
+                        <a:t>are</a:t>
+                      </a:r>
+                      <a:r>
+                        <a:rPr lang="de-DE" baseline="0" dirty="0" smtClean="0">
+                          <a:latin typeface="Helvetica Neue"/>
+                          <a:cs typeface="Helvetica Neue"/>
+                        </a:rPr>
+                        <a:t> valid </a:t>
+                      </a:r>
+                      <a:r>
+                        <a:rPr lang="de-DE" baseline="0" dirty="0" err="1" smtClean="0">
+                          <a:latin typeface="Helvetica Neue"/>
+                          <a:cs typeface="Helvetica Neue"/>
+                        </a:rPr>
+                        <a:t>and</a:t>
+                      </a:r>
+                      <a:r>
+                        <a:rPr lang="de-DE" baseline="0" dirty="0" smtClean="0">
+                          <a:latin typeface="Helvetica Neue"/>
+                          <a:cs typeface="Helvetica Neue"/>
+                        </a:rPr>
+                        <a:t> not </a:t>
+                      </a:r>
+                      <a:r>
+                        <a:rPr lang="de-DE" baseline="0" dirty="0" err="1" smtClean="0">
+                          <a:latin typeface="Helvetica Neue"/>
+                          <a:cs typeface="Helvetica Neue"/>
+                        </a:rPr>
+                        <a:t>used</a:t>
                       </a:r>
                       <a:endParaRPr lang="de-DE" dirty="0">
                         <a:latin typeface="Helvetica Neue"/>
@@ -8727,6 +8805,1104 @@
     <p:extLst>
       <p:ext uri="{BB962C8B-B14F-4D97-AF65-F5344CB8AC3E}">
         <p14:creationId xmlns:p14="http://schemas.microsoft.com/office/powerpoint/2010/main" val="1182931450"/>
+      </p:ext>
+    </p:extLst>
+  </p:cSld>
+  <p:clrMapOvr>
+    <a:masterClrMapping/>
+  </p:clrMapOvr>
+</p:sld>
+</file>
+
+<file path=ppt/slides/slide12.xml><?xml version="1.0" encoding="utf-8"?>
+<p:sld xmlns:a="http://schemas.openxmlformats.org/drawingml/2006/main" xmlns:r="http://schemas.openxmlformats.org/officeDocument/2006/relationships" xmlns:p="http://schemas.openxmlformats.org/presentationml/2006/main">
+  <p:cSld>
+    <p:spTree>
+      <p:nvGrpSpPr>
+        <p:cNvPr id="1" name=""/>
+        <p:cNvGrpSpPr/>
+        <p:nvPr/>
+      </p:nvGrpSpPr>
+      <p:grpSpPr>
+        <a:xfrm>
+          <a:off x="0" y="0"/>
+          <a:ext cx="0" cy="0"/>
+          <a:chOff x="0" y="0"/>
+          <a:chExt cx="0" cy="0"/>
+        </a:xfrm>
+      </p:grpSpPr>
+      <p:sp>
+        <p:nvSpPr>
+          <p:cNvPr id="2" name="Titel 1"/>
+          <p:cNvSpPr>
+            <a:spLocks noGrp="1"/>
+          </p:cNvSpPr>
+          <p:nvPr>
+            <p:ph type="title"/>
+          </p:nvPr>
+        </p:nvSpPr>
+        <p:spPr/>
+        <p:txBody>
+          <a:bodyPr/>
+          <a:lstStyle/>
+          <a:p>
+            <a:r>
+              <a:rPr lang="de-DE" dirty="0" err="1" smtClean="0"/>
+              <a:t>Use</a:t>
+            </a:r>
+            <a:r>
+              <a:rPr lang="de-DE" dirty="0" smtClean="0"/>
+              <a:t> Case Description (5)</a:t>
+            </a:r>
+            <a:endParaRPr lang="de-DE" dirty="0"/>
+          </a:p>
+        </p:txBody>
+      </p:sp>
+      <p:graphicFrame>
+        <p:nvGraphicFramePr>
+          <p:cNvPr id="4" name="Inhaltsplatzhalter 3"/>
+          <p:cNvGraphicFramePr>
+            <a:graphicFrameLocks noGrp="1"/>
+          </p:cNvGraphicFramePr>
+          <p:nvPr>
+            <p:ph idx="1"/>
+            <p:extLst>
+              <p:ext uri="{D42A27DB-BD31-4B8C-83A1-F6EECF244321}">
+                <p14:modId xmlns:p14="http://schemas.microsoft.com/office/powerpoint/2010/main" val="990828853"/>
+              </p:ext>
+            </p:extLst>
+          </p:nvPr>
+        </p:nvGraphicFramePr>
+        <p:xfrm>
+          <a:off x="457200" y="1027243"/>
+          <a:ext cx="8229600" cy="5433260"/>
+        </p:xfrm>
+        <a:graphic>
+          <a:graphicData uri="http://schemas.openxmlformats.org/drawingml/2006/table">
+            <a:tbl>
+              <a:tblPr firstRow="1" bandRow="1">
+                <a:tableStyleId>{8EC20E35-A176-4012-BC5E-935CFFF8708E}</a:tableStyleId>
+              </a:tblPr>
+              <a:tblGrid>
+                <a:gridCol w="4114800"/>
+                <a:gridCol w="4114800"/>
+              </a:tblGrid>
+              <a:tr h="661485">
+                <a:tc>
+                  <a:txBody>
+                    <a:bodyPr/>
+                    <a:lstStyle/>
+                    <a:p>
+                      <a:r>
+                        <a:rPr lang="de-DE" b="0" dirty="0" smtClean="0">
+                          <a:latin typeface="Helvetica Neue"/>
+                          <a:cs typeface="Helvetica Neue"/>
+                        </a:rPr>
+                        <a:t>Name</a:t>
+                      </a:r>
+                      <a:endParaRPr lang="de-DE" b="0" dirty="0">
+                        <a:latin typeface="Helvetica Neue"/>
+                        <a:cs typeface="Helvetica Neue"/>
+                      </a:endParaRPr>
+                    </a:p>
+                  </a:txBody>
+                  <a:tcPr/>
+                </a:tc>
+                <a:tc>
+                  <a:txBody>
+                    <a:bodyPr/>
+                    <a:lstStyle/>
+                    <a:p>
+                      <a:r>
+                        <a:rPr lang="de-DE" b="0" dirty="0" smtClean="0">
+                          <a:latin typeface="Helvetica Neue"/>
+                          <a:cs typeface="Helvetica Neue"/>
+                        </a:rPr>
+                        <a:t>Customer</a:t>
+                      </a:r>
+                      <a:r>
+                        <a:rPr lang="de-DE" b="0" baseline="0" dirty="0" smtClean="0">
+                          <a:latin typeface="Helvetica Neue"/>
+                          <a:cs typeface="Helvetica Neue"/>
+                        </a:rPr>
+                        <a:t> </a:t>
+                      </a:r>
+                      <a:r>
+                        <a:rPr lang="de-DE" b="0" baseline="0" dirty="0" err="1" smtClean="0">
+                          <a:latin typeface="Helvetica Neue"/>
+                          <a:cs typeface="Helvetica Neue"/>
+                        </a:rPr>
+                        <a:t>transfers</a:t>
+                      </a:r>
+                      <a:r>
+                        <a:rPr lang="de-DE" b="0" baseline="0" dirty="0" smtClean="0">
+                          <a:latin typeface="Helvetica Neue"/>
+                          <a:cs typeface="Helvetica Neue"/>
+                        </a:rPr>
+                        <a:t> </a:t>
+                      </a:r>
+                      <a:r>
+                        <a:rPr lang="de-DE" b="0" baseline="0" dirty="0" err="1" smtClean="0">
+                          <a:latin typeface="Helvetica Neue"/>
+                          <a:cs typeface="Helvetica Neue"/>
+                        </a:rPr>
+                        <a:t>money</a:t>
+                      </a:r>
+                      <a:r>
+                        <a:rPr lang="de-DE" b="0" baseline="0" dirty="0" smtClean="0">
+                          <a:latin typeface="Helvetica Neue"/>
+                          <a:cs typeface="Helvetica Neue"/>
+                        </a:rPr>
+                        <a:t> via HTML form</a:t>
+                      </a:r>
+                      <a:endParaRPr lang="de-DE" b="0" dirty="0">
+                        <a:latin typeface="Helvetica Neue"/>
+                        <a:cs typeface="Helvetica Neue"/>
+                      </a:endParaRPr>
+                    </a:p>
+                  </a:txBody>
+                  <a:tcPr/>
+                </a:tc>
+              </a:tr>
+              <a:tr h="661485">
+                <a:tc>
+                  <a:txBody>
+                    <a:bodyPr/>
+                    <a:lstStyle/>
+                    <a:p>
+                      <a:r>
+                        <a:rPr lang="de-DE" dirty="0" smtClean="0">
+                          <a:latin typeface="Helvetica Neue"/>
+                          <a:cs typeface="Helvetica Neue"/>
+                        </a:rPr>
+                        <a:t>Goal</a:t>
+                      </a:r>
+                      <a:endParaRPr lang="de-DE" dirty="0">
+                        <a:latin typeface="Helvetica Neue"/>
+                        <a:cs typeface="Helvetica Neue"/>
+                      </a:endParaRPr>
+                    </a:p>
+                  </a:txBody>
+                  <a:tcPr/>
+                </a:tc>
+                <a:tc>
+                  <a:txBody>
+                    <a:bodyPr/>
+                    <a:lstStyle/>
+                    <a:p>
+                      <a:r>
+                        <a:rPr lang="de-DE" dirty="0" smtClean="0">
+                          <a:latin typeface="Helvetica Neue"/>
+                          <a:cs typeface="Helvetica Neue"/>
+                        </a:rPr>
+                        <a:t>User </a:t>
+                      </a:r>
+                      <a:r>
+                        <a:rPr lang="de-DE" dirty="0" err="1" smtClean="0">
+                          <a:latin typeface="Helvetica Neue"/>
+                          <a:cs typeface="Helvetica Neue"/>
+                        </a:rPr>
+                        <a:t>can</a:t>
+                      </a:r>
+                      <a:r>
+                        <a:rPr lang="de-DE" dirty="0" smtClean="0">
+                          <a:latin typeface="Helvetica Neue"/>
+                          <a:cs typeface="Helvetica Neue"/>
+                        </a:rPr>
+                        <a:t> </a:t>
+                      </a:r>
+                      <a:r>
+                        <a:rPr lang="de-DE" dirty="0" err="1" smtClean="0">
+                          <a:latin typeface="Helvetica Neue"/>
+                          <a:cs typeface="Helvetica Neue"/>
+                        </a:rPr>
+                        <a:t>upload</a:t>
+                      </a:r>
+                      <a:r>
+                        <a:rPr lang="de-DE" dirty="0" smtClean="0">
+                          <a:latin typeface="Helvetica Neue"/>
+                          <a:cs typeface="Helvetica Neue"/>
+                        </a:rPr>
+                        <a:t> </a:t>
+                      </a:r>
+                      <a:r>
+                        <a:rPr lang="de-DE" dirty="0" err="1" smtClean="0">
+                          <a:latin typeface="Helvetica Neue"/>
+                          <a:cs typeface="Helvetica Neue"/>
+                        </a:rPr>
+                        <a:t>fill</a:t>
+                      </a:r>
+                      <a:r>
+                        <a:rPr lang="de-DE" dirty="0" smtClean="0">
+                          <a:latin typeface="Helvetica Neue"/>
+                          <a:cs typeface="Helvetica Neue"/>
+                        </a:rPr>
+                        <a:t> out HTML form </a:t>
+                      </a:r>
+                      <a:r>
+                        <a:rPr lang="de-DE" dirty="0" err="1" smtClean="0">
+                          <a:latin typeface="Helvetica Neue"/>
+                          <a:cs typeface="Helvetica Neue"/>
+                        </a:rPr>
+                        <a:t>to</a:t>
+                      </a:r>
+                      <a:r>
+                        <a:rPr lang="de-DE" dirty="0" smtClean="0">
+                          <a:latin typeface="Helvetica Neue"/>
+                          <a:cs typeface="Helvetica Neue"/>
+                        </a:rPr>
+                        <a:t> </a:t>
+                      </a:r>
+                      <a:r>
+                        <a:rPr lang="de-DE" dirty="0" err="1" smtClean="0">
+                          <a:latin typeface="Helvetica Neue"/>
+                          <a:cs typeface="Helvetica Neue"/>
+                        </a:rPr>
+                        <a:t>make</a:t>
+                      </a:r>
+                      <a:r>
+                        <a:rPr lang="de-DE" dirty="0" smtClean="0">
+                          <a:latin typeface="Helvetica Neue"/>
+                          <a:cs typeface="Helvetica Neue"/>
+                        </a:rPr>
+                        <a:t> a </a:t>
+                      </a:r>
+                      <a:r>
+                        <a:rPr lang="de-DE" dirty="0" err="1" smtClean="0">
+                          <a:latin typeface="Helvetica Neue"/>
+                          <a:cs typeface="Helvetica Neue"/>
+                        </a:rPr>
+                        <a:t>transfer</a:t>
+                      </a:r>
+                      <a:endParaRPr lang="de-DE" dirty="0">
+                        <a:latin typeface="Helvetica Neue"/>
+                        <a:cs typeface="Helvetica Neue"/>
+                      </a:endParaRPr>
+                    </a:p>
+                  </a:txBody>
+                  <a:tcPr/>
+                </a:tc>
+              </a:tr>
+              <a:tr h="383241">
+                <a:tc>
+                  <a:txBody>
+                    <a:bodyPr/>
+                    <a:lstStyle/>
+                    <a:p>
+                      <a:r>
+                        <a:rPr lang="de-DE" dirty="0" err="1" smtClean="0">
+                          <a:latin typeface="Helvetica Neue"/>
+                          <a:cs typeface="Helvetica Neue"/>
+                        </a:rPr>
+                        <a:t>Actors</a:t>
+                      </a:r>
+                      <a:endParaRPr lang="de-DE" dirty="0">
+                        <a:latin typeface="Helvetica Neue"/>
+                        <a:cs typeface="Helvetica Neue"/>
+                      </a:endParaRPr>
+                    </a:p>
+                  </a:txBody>
+                  <a:tcPr/>
+                </a:tc>
+                <a:tc>
+                  <a:txBody>
+                    <a:bodyPr/>
+                    <a:lstStyle/>
+                    <a:p>
+                      <a:r>
+                        <a:rPr lang="de-DE" dirty="0" smtClean="0">
+                          <a:latin typeface="Helvetica Neue"/>
+                          <a:cs typeface="Helvetica Neue"/>
+                        </a:rPr>
+                        <a:t>User, Employee</a:t>
+                      </a:r>
+                      <a:endParaRPr lang="de-DE" dirty="0">
+                        <a:latin typeface="Helvetica Neue"/>
+                        <a:cs typeface="Helvetica Neue"/>
+                      </a:endParaRPr>
+                    </a:p>
+                  </a:txBody>
+                  <a:tcPr/>
+                </a:tc>
+              </a:tr>
+              <a:tr h="383241">
+                <a:tc>
+                  <a:txBody>
+                    <a:bodyPr/>
+                    <a:lstStyle/>
+                    <a:p>
+                      <a:r>
+                        <a:rPr lang="de-DE" dirty="0" err="1" smtClean="0">
+                          <a:latin typeface="Helvetica Neue"/>
+                          <a:cs typeface="Helvetica Neue"/>
+                        </a:rPr>
+                        <a:t>Pre-conditions</a:t>
+                      </a:r>
+                      <a:endParaRPr lang="de-DE" dirty="0">
+                        <a:latin typeface="Helvetica Neue"/>
+                        <a:cs typeface="Helvetica Neue"/>
+                      </a:endParaRPr>
+                    </a:p>
+                  </a:txBody>
+                  <a:tcPr/>
+                </a:tc>
+                <a:tc>
+                  <a:txBody>
+                    <a:bodyPr/>
+                    <a:lstStyle/>
+                    <a:p>
+                      <a:r>
+                        <a:rPr lang="de-DE" dirty="0" smtClean="0">
+                          <a:latin typeface="Helvetica Neue"/>
+                          <a:cs typeface="Helvetica Neue"/>
+                        </a:rPr>
+                        <a:t>User </a:t>
+                      </a:r>
+                      <a:r>
+                        <a:rPr lang="de-DE" dirty="0" err="1" smtClean="0">
+                          <a:latin typeface="Helvetica Neue"/>
+                          <a:cs typeface="Helvetica Neue"/>
+                        </a:rPr>
+                        <a:t>is</a:t>
+                      </a:r>
+                      <a:r>
+                        <a:rPr lang="de-DE" dirty="0" smtClean="0">
+                          <a:latin typeface="Helvetica Neue"/>
+                          <a:cs typeface="Helvetica Neue"/>
+                        </a:rPr>
+                        <a:t> </a:t>
+                      </a:r>
+                      <a:r>
+                        <a:rPr lang="de-DE" dirty="0" err="1" smtClean="0">
+                          <a:latin typeface="Helvetica Neue"/>
+                          <a:cs typeface="Helvetica Neue"/>
+                        </a:rPr>
+                        <a:t>logged</a:t>
+                      </a:r>
+                      <a:r>
+                        <a:rPr lang="de-DE" dirty="0" smtClean="0">
+                          <a:latin typeface="Helvetica Neue"/>
+                          <a:cs typeface="Helvetica Neue"/>
+                        </a:rPr>
+                        <a:t> in, </a:t>
+                      </a:r>
+                      <a:r>
+                        <a:rPr lang="de-DE" dirty="0" err="1" smtClean="0">
+                          <a:latin typeface="Helvetica Neue"/>
+                          <a:cs typeface="Helvetica Neue"/>
+                        </a:rPr>
+                        <a:t>transaction</a:t>
+                      </a:r>
+                      <a:r>
+                        <a:rPr lang="de-DE" baseline="0" dirty="0" smtClean="0">
+                          <a:latin typeface="Helvetica Neue"/>
+                          <a:cs typeface="Helvetica Neue"/>
+                        </a:rPr>
+                        <a:t> </a:t>
+                      </a:r>
+                      <a:r>
+                        <a:rPr lang="de-DE" baseline="0" dirty="0" err="1" smtClean="0">
+                          <a:latin typeface="Helvetica Neue"/>
+                          <a:cs typeface="Helvetica Neue"/>
+                        </a:rPr>
+                        <a:t>code</a:t>
+                      </a:r>
+                      <a:r>
+                        <a:rPr lang="de-DE" baseline="0" dirty="0" smtClean="0">
+                          <a:latin typeface="Helvetica Neue"/>
+                          <a:cs typeface="Helvetica Neue"/>
+                        </a:rPr>
+                        <a:t> </a:t>
+                      </a:r>
+                      <a:r>
+                        <a:rPr lang="de-DE" baseline="0" dirty="0" err="1" smtClean="0">
+                          <a:latin typeface="Helvetica Neue"/>
+                          <a:cs typeface="Helvetica Neue"/>
+                        </a:rPr>
+                        <a:t>is</a:t>
+                      </a:r>
+                      <a:r>
+                        <a:rPr lang="de-DE" baseline="0" dirty="0" smtClean="0">
+                          <a:latin typeface="Helvetica Neue"/>
+                          <a:cs typeface="Helvetica Neue"/>
+                        </a:rPr>
+                        <a:t> valid </a:t>
+                      </a:r>
+                      <a:r>
+                        <a:rPr lang="de-DE" baseline="0" dirty="0" err="1" smtClean="0">
+                          <a:latin typeface="Helvetica Neue"/>
+                          <a:cs typeface="Helvetica Neue"/>
+                        </a:rPr>
+                        <a:t>and</a:t>
+                      </a:r>
+                      <a:r>
+                        <a:rPr lang="de-DE" baseline="0" dirty="0" smtClean="0">
+                          <a:latin typeface="Helvetica Neue"/>
+                          <a:cs typeface="Helvetica Neue"/>
+                        </a:rPr>
+                        <a:t> not </a:t>
+                      </a:r>
+                      <a:r>
+                        <a:rPr lang="de-DE" baseline="0" dirty="0" err="1" smtClean="0">
+                          <a:latin typeface="Helvetica Neue"/>
+                          <a:cs typeface="Helvetica Neue"/>
+                        </a:rPr>
+                        <a:t>used</a:t>
+                      </a:r>
+                      <a:endParaRPr lang="de-DE" dirty="0">
+                        <a:latin typeface="Helvetica Neue"/>
+                        <a:cs typeface="Helvetica Neue"/>
+                      </a:endParaRPr>
+                    </a:p>
+                  </a:txBody>
+                  <a:tcPr/>
+                </a:tc>
+              </a:tr>
+              <a:tr h="735429">
+                <a:tc>
+                  <a:txBody>
+                    <a:bodyPr/>
+                    <a:lstStyle/>
+                    <a:p>
+                      <a:r>
+                        <a:rPr lang="de-DE" dirty="0" smtClean="0">
+                          <a:latin typeface="Helvetica Neue"/>
+                          <a:cs typeface="Helvetica Neue"/>
+                        </a:rPr>
+                        <a:t>Main </a:t>
+                      </a:r>
+                      <a:r>
+                        <a:rPr lang="de-DE" dirty="0" err="1" smtClean="0">
+                          <a:latin typeface="Helvetica Neue"/>
+                          <a:cs typeface="Helvetica Neue"/>
+                        </a:rPr>
+                        <a:t>Course</a:t>
+                      </a:r>
+                      <a:r>
+                        <a:rPr lang="de-DE" dirty="0" smtClean="0">
+                          <a:latin typeface="Helvetica Neue"/>
+                          <a:cs typeface="Helvetica Neue"/>
+                        </a:rPr>
+                        <a:t> </a:t>
+                      </a:r>
+                      <a:r>
+                        <a:rPr lang="de-DE" dirty="0" err="1" smtClean="0">
+                          <a:latin typeface="Helvetica Neue"/>
+                          <a:cs typeface="Helvetica Neue"/>
+                        </a:rPr>
+                        <a:t>fo</a:t>
+                      </a:r>
+                      <a:r>
+                        <a:rPr lang="de-DE" dirty="0" smtClean="0">
+                          <a:latin typeface="Helvetica Neue"/>
+                          <a:cs typeface="Helvetica Neue"/>
+                        </a:rPr>
+                        <a:t> </a:t>
+                      </a:r>
+                      <a:r>
+                        <a:rPr lang="de-DE" dirty="0" err="1" smtClean="0">
+                          <a:latin typeface="Helvetica Neue"/>
+                          <a:cs typeface="Helvetica Neue"/>
+                        </a:rPr>
+                        <a:t>Execution</a:t>
+                      </a:r>
+                      <a:endParaRPr lang="de-DE" dirty="0">
+                        <a:latin typeface="Helvetica Neue"/>
+                        <a:cs typeface="Helvetica Neue"/>
+                      </a:endParaRPr>
+                    </a:p>
+                  </a:txBody>
+                  <a:tcPr/>
+                </a:tc>
+                <a:tc>
+                  <a:txBody>
+                    <a:bodyPr/>
+                    <a:lstStyle/>
+                    <a:p>
+                      <a:r>
+                        <a:rPr lang="de-DE" dirty="0" smtClean="0">
+                          <a:latin typeface="Helvetica Neue"/>
+                          <a:cs typeface="Helvetica Neue"/>
+                        </a:rPr>
+                        <a:t>User </a:t>
+                      </a:r>
+                      <a:r>
+                        <a:rPr lang="de-DE" dirty="0" err="1" smtClean="0">
+                          <a:latin typeface="Helvetica Neue"/>
+                          <a:cs typeface="Helvetica Neue"/>
+                        </a:rPr>
+                        <a:t>chooses</a:t>
+                      </a:r>
+                      <a:r>
+                        <a:rPr lang="de-DE" dirty="0" smtClean="0">
+                          <a:latin typeface="Helvetica Neue"/>
+                          <a:cs typeface="Helvetica Neue"/>
+                        </a:rPr>
+                        <a:t> </a:t>
+                      </a:r>
+                      <a:r>
+                        <a:rPr lang="de-DE" dirty="0" err="1" smtClean="0">
+                          <a:latin typeface="Helvetica Neue"/>
+                          <a:cs typeface="Helvetica Neue"/>
+                        </a:rPr>
+                        <a:t>Make</a:t>
+                      </a:r>
+                      <a:r>
+                        <a:rPr lang="de-DE" dirty="0" smtClean="0">
+                          <a:latin typeface="Helvetica Neue"/>
+                          <a:cs typeface="Helvetica Neue"/>
+                        </a:rPr>
+                        <a:t> Transfer </a:t>
+                      </a:r>
+                      <a:r>
+                        <a:rPr lang="de-DE" dirty="0" err="1" smtClean="0">
+                          <a:latin typeface="Helvetica Neue"/>
+                          <a:cs typeface="Helvetica Neue"/>
+                        </a:rPr>
+                        <a:t>from</a:t>
+                      </a:r>
+                      <a:r>
+                        <a:rPr lang="de-DE" dirty="0" smtClean="0">
+                          <a:latin typeface="Helvetica Neue"/>
+                          <a:cs typeface="Helvetica Neue"/>
+                        </a:rPr>
+                        <a:t> </a:t>
+                      </a:r>
+                      <a:r>
+                        <a:rPr lang="de-DE" dirty="0" err="1" smtClean="0">
+                          <a:latin typeface="Helvetica Neue"/>
+                          <a:cs typeface="Helvetica Neue"/>
+                        </a:rPr>
+                        <a:t>the</a:t>
+                      </a:r>
+                      <a:r>
+                        <a:rPr lang="de-DE" dirty="0" smtClean="0">
+                          <a:latin typeface="Helvetica Neue"/>
+                          <a:cs typeface="Helvetica Neue"/>
+                        </a:rPr>
+                        <a:t> </a:t>
+                      </a:r>
+                      <a:r>
+                        <a:rPr lang="de-DE" dirty="0" err="1" smtClean="0">
+                          <a:latin typeface="Helvetica Neue"/>
+                          <a:cs typeface="Helvetica Neue"/>
+                        </a:rPr>
+                        <a:t>side</a:t>
+                      </a:r>
+                      <a:r>
+                        <a:rPr lang="de-DE" dirty="0" smtClean="0">
+                          <a:latin typeface="Helvetica Neue"/>
+                          <a:cs typeface="Helvetica Neue"/>
+                        </a:rPr>
+                        <a:t> bar </a:t>
+                      </a:r>
+                      <a:r>
+                        <a:rPr lang="de-DE" dirty="0" err="1" smtClean="0">
+                          <a:latin typeface="Helvetica Neue"/>
+                          <a:cs typeface="Helvetica Neue"/>
+                        </a:rPr>
+                        <a:t>and</a:t>
+                      </a:r>
+                      <a:r>
+                        <a:rPr lang="de-DE" dirty="0" smtClean="0">
+                          <a:latin typeface="Helvetica Neue"/>
+                          <a:cs typeface="Helvetica Neue"/>
+                        </a:rPr>
+                        <a:t> </a:t>
+                      </a:r>
+                      <a:r>
+                        <a:rPr lang="de-DE" dirty="0" err="1" smtClean="0">
+                          <a:latin typeface="Helvetica Neue"/>
+                          <a:cs typeface="Helvetica Neue"/>
+                        </a:rPr>
+                        <a:t>fills</a:t>
+                      </a:r>
+                      <a:r>
+                        <a:rPr lang="de-DE" dirty="0" smtClean="0">
+                          <a:latin typeface="Helvetica Neue"/>
+                          <a:cs typeface="Helvetica Neue"/>
+                        </a:rPr>
+                        <a:t> out </a:t>
+                      </a:r>
+                      <a:r>
+                        <a:rPr lang="de-DE" dirty="0" err="1" smtClean="0">
+                          <a:latin typeface="Helvetica Neue"/>
+                          <a:cs typeface="Helvetica Neue"/>
+                        </a:rPr>
+                        <a:t>the</a:t>
+                      </a:r>
+                      <a:r>
+                        <a:rPr lang="de-DE" dirty="0" smtClean="0">
+                          <a:latin typeface="Helvetica Neue"/>
+                          <a:cs typeface="Helvetica Neue"/>
+                        </a:rPr>
+                        <a:t> form.</a:t>
+                      </a:r>
+                      <a:endParaRPr lang="de-DE" dirty="0">
+                        <a:latin typeface="Helvetica Neue"/>
+                        <a:cs typeface="Helvetica Neue"/>
+                      </a:endParaRPr>
+                    </a:p>
+                  </a:txBody>
+                  <a:tcPr/>
+                </a:tc>
+              </a:tr>
+              <a:tr h="383241">
+                <a:tc>
+                  <a:txBody>
+                    <a:bodyPr/>
+                    <a:lstStyle/>
+                    <a:p>
+                      <a:r>
+                        <a:rPr lang="de-DE" dirty="0" err="1" smtClean="0">
+                          <a:latin typeface="Helvetica Neue"/>
+                          <a:cs typeface="Helvetica Neue"/>
+                        </a:rPr>
+                        <a:t>Alternate</a:t>
+                      </a:r>
+                      <a:r>
+                        <a:rPr lang="de-DE" dirty="0" smtClean="0">
+                          <a:latin typeface="Helvetica Neue"/>
+                          <a:cs typeface="Helvetica Neue"/>
+                        </a:rPr>
+                        <a:t> </a:t>
+                      </a:r>
+                      <a:r>
+                        <a:rPr lang="de-DE" dirty="0" err="1" smtClean="0">
+                          <a:latin typeface="Helvetica Neue"/>
+                          <a:cs typeface="Helvetica Neue"/>
+                        </a:rPr>
+                        <a:t>Courses</a:t>
+                      </a:r>
+                      <a:endParaRPr lang="de-DE" dirty="0">
+                        <a:latin typeface="Helvetica Neue"/>
+                        <a:cs typeface="Helvetica Neue"/>
+                      </a:endParaRPr>
+                    </a:p>
+                  </a:txBody>
+                  <a:tcPr/>
+                </a:tc>
+                <a:tc>
+                  <a:txBody>
+                    <a:bodyPr/>
+                    <a:lstStyle/>
+                    <a:p>
+                      <a:r>
+                        <a:rPr lang="de-DE" dirty="0" smtClean="0">
+                          <a:latin typeface="Helvetica Neue"/>
+                          <a:cs typeface="Helvetica Neue"/>
+                        </a:rPr>
+                        <a:t>-</a:t>
+                      </a:r>
+                      <a:endParaRPr lang="de-DE" dirty="0">
+                        <a:latin typeface="Helvetica Neue"/>
+                        <a:cs typeface="Helvetica Neue"/>
+                      </a:endParaRPr>
+                    </a:p>
+                  </a:txBody>
+                  <a:tcPr/>
+                </a:tc>
+              </a:tr>
+              <a:tr h="383241">
+                <a:tc>
+                  <a:txBody>
+                    <a:bodyPr/>
+                    <a:lstStyle/>
+                    <a:p>
+                      <a:r>
+                        <a:rPr lang="de-DE" dirty="0" err="1" smtClean="0">
+                          <a:latin typeface="Helvetica Neue"/>
+                          <a:cs typeface="Helvetica Neue"/>
+                        </a:rPr>
+                        <a:t>Exceptions</a:t>
+                      </a:r>
+                      <a:endParaRPr lang="de-DE" dirty="0">
+                        <a:latin typeface="Helvetica Neue"/>
+                        <a:cs typeface="Helvetica Neue"/>
+                      </a:endParaRPr>
+                    </a:p>
+                  </a:txBody>
+                  <a:tcPr/>
+                </a:tc>
+                <a:tc>
+                  <a:txBody>
+                    <a:bodyPr/>
+                    <a:lstStyle/>
+                    <a:p>
+                      <a:r>
+                        <a:rPr lang="de-DE" dirty="0" err="1" smtClean="0">
+                          <a:latin typeface="Helvetica Neue"/>
+                          <a:cs typeface="Helvetica Neue"/>
+                        </a:rPr>
+                        <a:t>No</a:t>
+                      </a:r>
+                      <a:r>
+                        <a:rPr lang="de-DE" dirty="0" smtClean="0">
+                          <a:latin typeface="Helvetica Neue"/>
+                          <a:cs typeface="Helvetica Neue"/>
+                        </a:rPr>
+                        <a:t> real </a:t>
+                      </a:r>
+                      <a:r>
+                        <a:rPr lang="de-DE" dirty="0" err="1" smtClean="0">
+                          <a:latin typeface="Helvetica Neue"/>
+                          <a:cs typeface="Helvetica Neue"/>
+                        </a:rPr>
+                        <a:t>exceptions</a:t>
+                      </a:r>
+                      <a:r>
+                        <a:rPr lang="de-DE" dirty="0" smtClean="0">
+                          <a:latin typeface="Helvetica Neue"/>
+                          <a:cs typeface="Helvetica Neue"/>
+                        </a:rPr>
+                        <a:t>,</a:t>
+                      </a:r>
+                      <a:r>
+                        <a:rPr lang="de-DE" baseline="0" dirty="0" smtClean="0">
+                          <a:latin typeface="Helvetica Neue"/>
+                          <a:cs typeface="Helvetica Neue"/>
+                        </a:rPr>
+                        <a:t> </a:t>
+                      </a:r>
+                      <a:r>
+                        <a:rPr lang="de-DE" baseline="0" dirty="0" err="1" smtClean="0">
+                          <a:latin typeface="Helvetica Neue"/>
+                          <a:cs typeface="Helvetica Neue"/>
+                        </a:rPr>
+                        <a:t>only</a:t>
+                      </a:r>
+                      <a:r>
+                        <a:rPr lang="de-DE" baseline="0" dirty="0" smtClean="0">
+                          <a:latin typeface="Helvetica Neue"/>
+                          <a:cs typeface="Helvetica Neue"/>
+                        </a:rPr>
+                        <a:t> </a:t>
+                      </a:r>
+                      <a:r>
+                        <a:rPr lang="de-DE" baseline="0" dirty="0" err="1" smtClean="0">
+                          <a:latin typeface="Helvetica Neue"/>
+                          <a:cs typeface="Helvetica Neue"/>
+                        </a:rPr>
+                        <a:t>error</a:t>
+                      </a:r>
+                      <a:r>
+                        <a:rPr lang="de-DE" baseline="0" dirty="0" smtClean="0">
+                          <a:latin typeface="Helvetica Neue"/>
+                          <a:cs typeface="Helvetica Neue"/>
+                        </a:rPr>
+                        <a:t> </a:t>
+                      </a:r>
+                      <a:r>
+                        <a:rPr lang="de-DE" baseline="0" dirty="0" err="1" smtClean="0">
+                          <a:latin typeface="Helvetica Neue"/>
+                          <a:cs typeface="Helvetica Neue"/>
+                        </a:rPr>
+                        <a:t>messages</a:t>
+                      </a:r>
+                      <a:r>
+                        <a:rPr lang="de-DE" baseline="0" dirty="0" smtClean="0">
+                          <a:latin typeface="Helvetica Neue"/>
+                          <a:cs typeface="Helvetica Neue"/>
+                        </a:rPr>
+                        <a:t> </a:t>
+                      </a:r>
+                      <a:r>
+                        <a:rPr lang="de-DE" baseline="0" dirty="0" err="1" smtClean="0">
+                          <a:latin typeface="Helvetica Neue"/>
+                          <a:cs typeface="Helvetica Neue"/>
+                        </a:rPr>
+                        <a:t>for</a:t>
+                      </a:r>
+                      <a:r>
+                        <a:rPr lang="de-DE" baseline="0" dirty="0" smtClean="0">
+                          <a:latin typeface="Helvetica Neue"/>
+                          <a:cs typeface="Helvetica Neue"/>
+                        </a:rPr>
+                        <a:t> </a:t>
+                      </a:r>
+                      <a:r>
+                        <a:rPr lang="de-DE" baseline="0" dirty="0" err="1" smtClean="0">
+                          <a:latin typeface="Helvetica Neue"/>
+                          <a:cs typeface="Helvetica Neue"/>
+                        </a:rPr>
+                        <a:t>the</a:t>
+                      </a:r>
+                      <a:r>
+                        <a:rPr lang="de-DE" baseline="0" dirty="0" smtClean="0">
+                          <a:latin typeface="Helvetica Neue"/>
+                          <a:cs typeface="Helvetica Neue"/>
+                        </a:rPr>
+                        <a:t> Customer</a:t>
+                      </a:r>
+                      <a:endParaRPr lang="de-DE" dirty="0">
+                        <a:latin typeface="Helvetica Neue"/>
+                        <a:cs typeface="Helvetica Neue"/>
+                      </a:endParaRPr>
+                    </a:p>
+                  </a:txBody>
+                  <a:tcPr/>
+                </a:tc>
+              </a:tr>
+              <a:tr h="944978">
+                <a:tc>
+                  <a:txBody>
+                    <a:bodyPr/>
+                    <a:lstStyle/>
+                    <a:p>
+                      <a:r>
+                        <a:rPr lang="de-DE" dirty="0" smtClean="0">
+                          <a:latin typeface="Helvetica Neue"/>
+                          <a:cs typeface="Helvetica Neue"/>
+                        </a:rPr>
+                        <a:t>Post-</a:t>
+                      </a:r>
+                      <a:r>
+                        <a:rPr lang="de-DE" dirty="0" err="1" smtClean="0">
+                          <a:latin typeface="Helvetica Neue"/>
+                          <a:cs typeface="Helvetica Neue"/>
+                        </a:rPr>
+                        <a:t>conditions</a:t>
+                      </a:r>
+                      <a:endParaRPr lang="de-DE" dirty="0">
+                        <a:latin typeface="Helvetica Neue"/>
+                        <a:cs typeface="Helvetica Neue"/>
+                      </a:endParaRPr>
+                    </a:p>
+                  </a:txBody>
+                  <a:tcPr/>
+                </a:tc>
+                <a:tc>
+                  <a:txBody>
+                    <a:bodyPr/>
+                    <a:lstStyle/>
+                    <a:p>
+                      <a:r>
+                        <a:rPr lang="de-DE" dirty="0" smtClean="0">
+                          <a:latin typeface="Helvetica Neue"/>
+                          <a:cs typeface="Helvetica Neue"/>
+                        </a:rPr>
+                        <a:t>User </a:t>
+                      </a:r>
+                      <a:r>
+                        <a:rPr lang="de-DE" dirty="0" err="1" smtClean="0">
+                          <a:latin typeface="Helvetica Neue"/>
+                          <a:cs typeface="Helvetica Neue"/>
+                        </a:rPr>
+                        <a:t>gets</a:t>
+                      </a:r>
+                      <a:r>
+                        <a:rPr lang="de-DE" dirty="0" smtClean="0">
+                          <a:latin typeface="Helvetica Neue"/>
+                          <a:cs typeface="Helvetica Neue"/>
+                        </a:rPr>
+                        <a:t> </a:t>
+                      </a:r>
+                      <a:r>
+                        <a:rPr lang="de-DE" dirty="0" err="1" smtClean="0">
+                          <a:latin typeface="Helvetica Neue"/>
+                          <a:cs typeface="Helvetica Neue"/>
+                        </a:rPr>
+                        <a:t>redirected</a:t>
+                      </a:r>
+                      <a:r>
+                        <a:rPr lang="de-DE" dirty="0" smtClean="0">
+                          <a:latin typeface="Helvetica Neue"/>
+                          <a:cs typeface="Helvetica Neue"/>
+                        </a:rPr>
+                        <a:t> </a:t>
+                      </a:r>
+                      <a:r>
+                        <a:rPr lang="de-DE" dirty="0" err="1" smtClean="0">
+                          <a:latin typeface="Helvetica Neue"/>
+                          <a:cs typeface="Helvetica Neue"/>
+                        </a:rPr>
+                        <a:t>to</a:t>
+                      </a:r>
+                      <a:r>
+                        <a:rPr lang="de-DE" dirty="0" smtClean="0">
+                          <a:latin typeface="Helvetica Neue"/>
+                          <a:cs typeface="Helvetica Neue"/>
+                        </a:rPr>
+                        <a:t> </a:t>
+                      </a:r>
+                      <a:r>
+                        <a:rPr lang="de-DE" dirty="0" err="1" smtClean="0">
+                          <a:latin typeface="Helvetica Neue"/>
+                          <a:cs typeface="Helvetica Neue"/>
+                        </a:rPr>
+                        <a:t>Make</a:t>
+                      </a:r>
+                      <a:r>
+                        <a:rPr lang="de-DE" dirty="0" smtClean="0">
+                          <a:latin typeface="Helvetica Neue"/>
+                          <a:cs typeface="Helvetica Neue"/>
+                        </a:rPr>
+                        <a:t> Transfer </a:t>
+                      </a:r>
+                      <a:r>
+                        <a:rPr lang="de-DE" dirty="0" err="1" smtClean="0">
+                          <a:latin typeface="Helvetica Neue"/>
+                          <a:cs typeface="Helvetica Neue"/>
+                        </a:rPr>
+                        <a:t>page</a:t>
+                      </a:r>
+                      <a:r>
+                        <a:rPr lang="de-DE" dirty="0" smtClean="0">
+                          <a:latin typeface="Helvetica Neue"/>
+                          <a:cs typeface="Helvetica Neue"/>
+                        </a:rPr>
+                        <a:t> </a:t>
+                      </a:r>
+                      <a:r>
+                        <a:rPr lang="de-DE" dirty="0" err="1" smtClean="0">
+                          <a:latin typeface="Helvetica Neue"/>
+                          <a:cs typeface="Helvetica Neue"/>
+                        </a:rPr>
+                        <a:t>with</a:t>
+                      </a:r>
+                      <a:r>
+                        <a:rPr lang="de-DE" dirty="0" smtClean="0">
+                          <a:latin typeface="Helvetica Neue"/>
+                          <a:cs typeface="Helvetica Neue"/>
+                        </a:rPr>
+                        <a:t> a </a:t>
+                      </a:r>
+                      <a:r>
+                        <a:rPr lang="de-DE" dirty="0" err="1" smtClean="0">
+                          <a:latin typeface="Helvetica Neue"/>
+                          <a:cs typeface="Helvetica Neue"/>
+                        </a:rPr>
+                        <a:t>success</a:t>
+                      </a:r>
+                      <a:r>
+                        <a:rPr lang="de-DE" dirty="0" smtClean="0">
+                          <a:latin typeface="Helvetica Neue"/>
+                          <a:cs typeface="Helvetica Neue"/>
+                        </a:rPr>
+                        <a:t> </a:t>
+                      </a:r>
+                      <a:r>
+                        <a:rPr lang="de-DE" dirty="0" err="1" smtClean="0">
+                          <a:latin typeface="Helvetica Neue"/>
+                          <a:cs typeface="Helvetica Neue"/>
+                        </a:rPr>
+                        <a:t>or</a:t>
+                      </a:r>
+                      <a:r>
+                        <a:rPr lang="de-DE" baseline="0" dirty="0" smtClean="0">
+                          <a:latin typeface="Helvetica Neue"/>
+                          <a:cs typeface="Helvetica Neue"/>
+                        </a:rPr>
+                        <a:t> </a:t>
+                      </a:r>
+                      <a:r>
+                        <a:rPr lang="de-DE" baseline="0" dirty="0" err="1" smtClean="0">
+                          <a:latin typeface="Helvetica Neue"/>
+                          <a:cs typeface="Helvetica Neue"/>
+                        </a:rPr>
+                        <a:t>error</a:t>
+                      </a:r>
+                      <a:r>
+                        <a:rPr lang="de-DE" dirty="0" smtClean="0">
+                          <a:latin typeface="Helvetica Neue"/>
+                          <a:cs typeface="Helvetica Neue"/>
+                        </a:rPr>
+                        <a:t> </a:t>
+                      </a:r>
+                      <a:r>
+                        <a:rPr lang="de-DE" dirty="0" err="1" smtClean="0">
+                          <a:latin typeface="Helvetica Neue"/>
+                          <a:cs typeface="Helvetica Neue"/>
+                        </a:rPr>
+                        <a:t>notification</a:t>
+                      </a:r>
+                      <a:endParaRPr lang="de-DE" dirty="0">
+                        <a:latin typeface="Helvetica Neue"/>
+                        <a:cs typeface="Helvetica Neue"/>
+                      </a:endParaRPr>
+                    </a:p>
+                  </a:txBody>
+                  <a:tcPr/>
+                </a:tc>
+              </a:tr>
+              <a:tr h="383241">
+                <a:tc>
+                  <a:txBody>
+                    <a:bodyPr/>
+                    <a:lstStyle/>
+                    <a:p>
+                      <a:r>
+                        <a:rPr lang="de-DE" dirty="0" smtClean="0">
+                          <a:latin typeface="Helvetica Neue"/>
+                          <a:cs typeface="Helvetica Neue"/>
+                        </a:rPr>
+                        <a:t>Data</a:t>
+                      </a:r>
+                      <a:r>
+                        <a:rPr lang="de-DE" baseline="0" dirty="0" smtClean="0">
+                          <a:latin typeface="Helvetica Neue"/>
+                          <a:cs typeface="Helvetica Neue"/>
+                        </a:rPr>
+                        <a:t> </a:t>
+                      </a:r>
+                      <a:r>
+                        <a:rPr lang="de-DE" baseline="0" dirty="0" err="1" smtClean="0">
+                          <a:latin typeface="Helvetica Neue"/>
+                          <a:cs typeface="Helvetica Neue"/>
+                        </a:rPr>
+                        <a:t>formats</a:t>
+                      </a:r>
+                      <a:r>
+                        <a:rPr lang="de-DE" baseline="0" dirty="0" smtClean="0">
+                          <a:latin typeface="Helvetica Neue"/>
+                          <a:cs typeface="Helvetica Neue"/>
+                        </a:rPr>
+                        <a:t> </a:t>
+                      </a:r>
+                      <a:r>
+                        <a:rPr lang="de-DE" baseline="0" dirty="0" err="1" smtClean="0">
+                          <a:latin typeface="Helvetica Neue"/>
+                          <a:cs typeface="Helvetica Neue"/>
+                        </a:rPr>
+                        <a:t>used</a:t>
+                      </a:r>
+                      <a:endParaRPr lang="de-DE" dirty="0">
+                        <a:latin typeface="Helvetica Neue"/>
+                        <a:cs typeface="Helvetica Neue"/>
+                      </a:endParaRPr>
+                    </a:p>
+                  </a:txBody>
+                  <a:tcPr/>
+                </a:tc>
+                <a:tc>
+                  <a:txBody>
+                    <a:bodyPr/>
+                    <a:lstStyle/>
+                    <a:p>
+                      <a:r>
+                        <a:rPr lang="de-DE" dirty="0" smtClean="0">
+                          <a:latin typeface="Helvetica Neue"/>
+                          <a:cs typeface="Helvetica Neue"/>
+                        </a:rPr>
+                        <a:t>HTML form</a:t>
+                      </a:r>
+                      <a:endParaRPr lang="de-DE" dirty="0">
+                        <a:latin typeface="Helvetica Neue"/>
+                        <a:cs typeface="Helvetica Neue"/>
+                      </a:endParaRPr>
+                    </a:p>
+                  </a:txBody>
+                  <a:tcPr/>
+                </a:tc>
+              </a:tr>
+            </a:tbl>
+          </a:graphicData>
+        </a:graphic>
+      </p:graphicFrame>
+    </p:spTree>
+    <p:extLst>
+      <p:ext uri="{BB962C8B-B14F-4D97-AF65-F5344CB8AC3E}">
+        <p14:creationId xmlns:p14="http://schemas.microsoft.com/office/powerpoint/2010/main" val="4275939271"/>
       </p:ext>
     </p:extLst>
   </p:cSld>
@@ -13922,14 +15098,14 @@
             <p:ph idx="1"/>
             <p:extLst>
               <p:ext uri="{D42A27DB-BD31-4B8C-83A1-F6EECF244321}">
-                <p14:modId xmlns:p14="http://schemas.microsoft.com/office/powerpoint/2010/main" val="4134538167"/>
+                <p14:modId xmlns:p14="http://schemas.microsoft.com/office/powerpoint/2010/main" val="691497992"/>
               </p:ext>
             </p:extLst>
           </p:nvPr>
         </p:nvGraphicFramePr>
         <p:xfrm>
-          <a:off x="457200" y="1659977"/>
-          <a:ext cx="8229600" cy="4688839"/>
+          <a:off x="457200" y="948255"/>
+          <a:ext cx="8229600" cy="5758151"/>
         </p:xfrm>
         <a:graphic>
           <a:graphicData uri="http://schemas.openxmlformats.org/drawingml/2006/table">
@@ -13941,7 +15117,7 @@
                 <a:gridCol w="4114800"/>
                 <a:gridCol w="4114800"/>
               </a:tblGrid>
-              <a:tr h="370840">
+              <a:tr h="407706">
                 <a:tc>
                   <a:txBody>
                     <a:bodyPr/>
@@ -13983,7 +15159,7 @@
                   <a:tcPr/>
                 </a:tc>
               </a:tr>
-              <a:tr h="370840">
+              <a:tr h="703712">
                 <a:tc>
                   <a:txBody>
                     <a:bodyPr/>
@@ -14095,7 +15271,7 @@
                   <a:tcPr/>
                 </a:tc>
               </a:tr>
-              <a:tr h="370840">
+              <a:tr h="407706">
                 <a:tc>
                   <a:txBody>
                     <a:bodyPr/>
@@ -14137,7 +15313,7 @@
                   <a:tcPr/>
                 </a:tc>
               </a:tr>
-              <a:tr h="370840">
+              <a:tr h="407706">
                 <a:tc>
                   <a:txBody>
                     <a:bodyPr/>
@@ -14214,7 +15390,7 @@
                   <a:tcPr/>
                 </a:tc>
               </a:tr>
-              <a:tr h="370840">
+              <a:tr h="703712">
                 <a:tc>
                   <a:txBody>
                     <a:bodyPr/>
@@ -14389,7 +15565,7 @@
                   <a:tcPr/>
                 </a:tc>
               </a:tr>
-              <a:tr h="370840">
+              <a:tr h="407706">
                 <a:tc>
                   <a:txBody>
                     <a:bodyPr/>
@@ -14445,7 +15621,7 @@
                   <a:tcPr/>
                 </a:tc>
               </a:tr>
-              <a:tr h="370840">
+              <a:tr h="703712">
                 <a:tc>
                   <a:txBody>
                     <a:bodyPr/>
@@ -14571,7 +15747,7 @@
                   <a:tcPr/>
                 </a:tc>
               </a:tr>
-              <a:tr h="370840">
+              <a:tr h="1608485">
                 <a:tc>
                   <a:txBody>
                     <a:bodyPr/>
@@ -14772,6 +15948,111 @@
                         </a:rPr>
                         <a:t>proceed</a:t>
                       </a:r>
+                      <a:r>
+                        <a:rPr lang="de-DE" dirty="0" smtClean="0">
+                          <a:latin typeface="Helvetica Neue"/>
+                          <a:cs typeface="Helvetica Neue"/>
+                        </a:rPr>
+                        <a:t>. </a:t>
+                      </a:r>
+                      <a:r>
+                        <a:rPr lang="de-DE" dirty="0" err="1" smtClean="0">
+                          <a:latin typeface="Helvetica Neue"/>
+                          <a:cs typeface="Helvetica Neue"/>
+                        </a:rPr>
+                        <a:t>If</a:t>
+                      </a:r>
+                      <a:r>
+                        <a:rPr lang="de-DE" dirty="0" smtClean="0">
+                          <a:latin typeface="Helvetica Neue"/>
+                          <a:cs typeface="Helvetica Neue"/>
+                        </a:rPr>
+                        <a:t> </a:t>
+                      </a:r>
+                      <a:r>
+                        <a:rPr lang="de-DE" dirty="0" err="1" smtClean="0">
+                          <a:latin typeface="Helvetica Neue"/>
+                          <a:cs typeface="Helvetica Neue"/>
+                        </a:rPr>
+                        <a:t>customer</a:t>
+                      </a:r>
+                      <a:r>
+                        <a:rPr lang="de-DE" baseline="0" dirty="0" smtClean="0">
+                          <a:latin typeface="Helvetica Neue"/>
+                          <a:cs typeface="Helvetica Neue"/>
+                        </a:rPr>
+                        <a:t> </a:t>
+                      </a:r>
+                      <a:r>
+                        <a:rPr lang="de-DE" baseline="0" dirty="0" err="1" smtClean="0">
+                          <a:latin typeface="Helvetica Neue"/>
+                          <a:cs typeface="Helvetica Neue"/>
+                        </a:rPr>
+                        <a:t>registration</a:t>
+                      </a:r>
+                      <a:r>
+                        <a:rPr lang="de-DE" baseline="0" dirty="0" smtClean="0">
+                          <a:latin typeface="Helvetica Neue"/>
+                          <a:cs typeface="Helvetica Neue"/>
+                        </a:rPr>
+                        <a:t>, he </a:t>
+                      </a:r>
+                      <a:r>
+                        <a:rPr lang="de-DE" baseline="0" dirty="0" err="1" smtClean="0">
+                          <a:latin typeface="Helvetica Neue"/>
+                          <a:cs typeface="Helvetica Neue"/>
+                        </a:rPr>
+                        <a:t>gets</a:t>
+                      </a:r>
+                      <a:r>
+                        <a:rPr lang="de-DE" baseline="0" dirty="0" smtClean="0">
+                          <a:latin typeface="Helvetica Neue"/>
+                          <a:cs typeface="Helvetica Neue"/>
+                        </a:rPr>
+                        <a:t> </a:t>
+                      </a:r>
+                      <a:r>
+                        <a:rPr lang="de-DE" baseline="0" dirty="0" err="1" smtClean="0">
+                          <a:latin typeface="Helvetica Neue"/>
+                          <a:cs typeface="Helvetica Neue"/>
+                        </a:rPr>
+                        <a:t>e-mail</a:t>
+                      </a:r>
+                      <a:r>
+                        <a:rPr lang="de-DE" baseline="0" dirty="0" smtClean="0">
+                          <a:latin typeface="Helvetica Neue"/>
+                          <a:cs typeface="Helvetica Neue"/>
+                        </a:rPr>
+                        <a:t> </a:t>
+                      </a:r>
+                      <a:r>
+                        <a:rPr lang="de-DE" baseline="0" dirty="0" err="1" smtClean="0">
+                          <a:latin typeface="Helvetica Neue"/>
+                          <a:cs typeface="Helvetica Neue"/>
+                        </a:rPr>
+                        <a:t>with</a:t>
+                      </a:r>
+                      <a:r>
+                        <a:rPr lang="de-DE" baseline="0" dirty="0" smtClean="0">
+                          <a:latin typeface="Helvetica Neue"/>
+                          <a:cs typeface="Helvetica Neue"/>
+                        </a:rPr>
+                        <a:t> TANs after </a:t>
+                      </a:r>
+                      <a:r>
+                        <a:rPr lang="de-DE" baseline="0" dirty="0" err="1" smtClean="0">
+                          <a:latin typeface="Helvetica Neue"/>
+                          <a:cs typeface="Helvetica Neue"/>
+                        </a:rPr>
+                        <a:t>approval</a:t>
+                      </a:r>
+                      <a:r>
+                        <a:rPr lang="de-DE" baseline="0" dirty="0" smtClean="0">
+                          <a:latin typeface="Helvetica Neue"/>
+                          <a:cs typeface="Helvetica Neue"/>
+                        </a:rPr>
+                        <a:t>.</a:t>
+                      </a:r>
                       <a:endParaRPr lang="de-DE" dirty="0">
                         <a:latin typeface="Helvetica Neue"/>
                         <a:cs typeface="Helvetica Neue"/>
@@ -14781,7 +16062,7 @@
                   <a:tcPr/>
                 </a:tc>
               </a:tr>
-              <a:tr h="370840">
+              <a:tr h="407706">
                 <a:tc>
                   <a:txBody>
                     <a:bodyPr/>

</xml_diff>

<commit_message>
last presentation phase 1
</commit_message>
<xml_diff>
--- a/presentation1.pptx
+++ b/presentation1.pptx
@@ -121,6 +121,22 @@
       </a:defRPr>
     </a:lvl9pPr>
   </p:defaultTextStyle>
+  <p:extLst>
+    <p:ext uri="{EFAFB233-063F-42B5-8137-9DF3F51BA10A}">
+      <p15:sldGuideLst xmlns:p15="http://schemas.microsoft.com/office/powerpoint/2012/main">
+        <p15:guide id="1" orient="horz" pos="2160">
+          <p15:clr>
+            <a:srgbClr val="A4A3A4"/>
+          </p15:clr>
+        </p15:guide>
+        <p15:guide id="2" pos="2880">
+          <p15:clr>
+            <a:srgbClr val="A4A3A4"/>
+          </p15:clr>
+        </p15:guide>
+      </p15:sldGuideLst>
+    </p:ext>
+  </p:extLst>
 </p:presentation>
 </file>
 
@@ -308,7 +324,7 @@
           <a:p>
             <a:fld id="{FB4AA097-F0D2-7B4A-A9A4-B22818B5789F}" type="datetimeFigureOut">
               <a:rPr lang="de-DE" smtClean="0"/>
-              <a:t>03/11/15</a:t>
+              <a:t>03.11.15</a:t>
             </a:fld>
             <a:endParaRPr lang="de-DE"/>
           </a:p>
@@ -486,7 +502,7 @@
           <a:p>
             <a:fld id="{FB4AA097-F0D2-7B4A-A9A4-B22818B5789F}" type="datetimeFigureOut">
               <a:rPr lang="de-DE" smtClean="0"/>
-              <a:t>03/11/15</a:t>
+              <a:t>03.11.15</a:t>
             </a:fld>
             <a:endParaRPr lang="de-DE"/>
           </a:p>
@@ -669,7 +685,7 @@
           <a:p>
             <a:fld id="{FB4AA097-F0D2-7B4A-A9A4-B22818B5789F}" type="datetimeFigureOut">
               <a:rPr lang="de-DE" smtClean="0"/>
-              <a:t>03/11/15</a:t>
+              <a:t>03.11.15</a:t>
             </a:fld>
             <a:endParaRPr lang="de-DE"/>
           </a:p>
@@ -914,7 +930,7 @@
           <a:p>
             <a:fld id="{63035A8D-2134-BF46-B1F0-4F90720B6831}" type="datetimeFigureOut">
               <a:rPr lang="de-DE" smtClean="0"/>
-              <a:t>03/11/15</a:t>
+              <a:t>03.11.15</a:t>
             </a:fld>
             <a:endParaRPr lang="de-DE"/>
           </a:p>
@@ -1110,7 +1126,7 @@
           <a:p>
             <a:fld id="{63035A8D-2134-BF46-B1F0-4F90720B6831}" type="datetimeFigureOut">
               <a:rPr lang="de-DE" smtClean="0"/>
-              <a:t>03/11/15</a:t>
+              <a:t>03.11.15</a:t>
             </a:fld>
             <a:endParaRPr lang="de-DE"/>
           </a:p>
@@ -1369,7 +1385,7 @@
           <a:p>
             <a:fld id="{63035A8D-2134-BF46-B1F0-4F90720B6831}" type="datetimeFigureOut">
               <a:rPr lang="de-DE" smtClean="0"/>
-              <a:t>03/11/15</a:t>
+              <a:t>03.11.15</a:t>
             </a:fld>
             <a:endParaRPr lang="de-DE"/>
           </a:p>
@@ -1665,7 +1681,7 @@
           <a:p>
             <a:fld id="{63035A8D-2134-BF46-B1F0-4F90720B6831}" type="datetimeFigureOut">
               <a:rPr lang="de-DE" smtClean="0"/>
-              <a:t>03/11/15</a:t>
+              <a:t>03.11.15</a:t>
             </a:fld>
             <a:endParaRPr lang="de-DE"/>
           </a:p>
@@ -2095,7 +2111,7 @@
           <a:p>
             <a:fld id="{63035A8D-2134-BF46-B1F0-4F90720B6831}" type="datetimeFigureOut">
               <a:rPr lang="de-DE" smtClean="0"/>
-              <a:t>03/11/15</a:t>
+              <a:t>03.11.15</a:t>
             </a:fld>
             <a:endParaRPr lang="de-DE"/>
           </a:p>
@@ -2221,7 +2237,7 @@
           <a:p>
             <a:fld id="{63035A8D-2134-BF46-B1F0-4F90720B6831}" type="datetimeFigureOut">
               <a:rPr lang="de-DE" smtClean="0"/>
-              <a:t>03/11/15</a:t>
+              <a:t>03.11.15</a:t>
             </a:fld>
             <a:endParaRPr lang="de-DE"/>
           </a:p>
@@ -2316,7 +2332,7 @@
           <a:p>
             <a:fld id="{63035A8D-2134-BF46-B1F0-4F90720B6831}" type="datetimeFigureOut">
               <a:rPr lang="de-DE" smtClean="0"/>
-              <a:t>03/11/15</a:t>
+              <a:t>03.11.15</a:t>
             </a:fld>
             <a:endParaRPr lang="de-DE"/>
           </a:p>
@@ -2596,7 +2612,7 @@
           <a:p>
             <a:fld id="{63035A8D-2134-BF46-B1F0-4F90720B6831}" type="datetimeFigureOut">
               <a:rPr lang="de-DE" smtClean="0"/>
-              <a:t>03/11/15</a:t>
+              <a:t>03.11.15</a:t>
             </a:fld>
             <a:endParaRPr lang="de-DE"/>
           </a:p>
@@ -2774,7 +2790,7 @@
           <a:p>
             <a:fld id="{FB4AA097-F0D2-7B4A-A9A4-B22818B5789F}" type="datetimeFigureOut">
               <a:rPr lang="de-DE" smtClean="0"/>
-              <a:t>03/11/15</a:t>
+              <a:t>03.11.15</a:t>
             </a:fld>
             <a:endParaRPr lang="de-DE"/>
           </a:p>
@@ -3030,7 +3046,7 @@
           <a:p>
             <a:fld id="{63035A8D-2134-BF46-B1F0-4F90720B6831}" type="datetimeFigureOut">
               <a:rPr lang="de-DE" smtClean="0"/>
-              <a:t>03/11/15</a:t>
+              <a:t>03.11.15</a:t>
             </a:fld>
             <a:endParaRPr lang="de-DE"/>
           </a:p>
@@ -3208,7 +3224,7 @@
           <a:p>
             <a:fld id="{63035A8D-2134-BF46-B1F0-4F90720B6831}" type="datetimeFigureOut">
               <a:rPr lang="de-DE" smtClean="0"/>
-              <a:t>03/11/15</a:t>
+              <a:t>03.11.15</a:t>
             </a:fld>
             <a:endParaRPr lang="de-DE"/>
           </a:p>
@@ -3391,7 +3407,7 @@
           <a:p>
             <a:fld id="{63035A8D-2134-BF46-B1F0-4F90720B6831}" type="datetimeFigureOut">
               <a:rPr lang="de-DE" smtClean="0"/>
-              <a:t>03/11/15</a:t>
+              <a:t>03.11.15</a:t>
             </a:fld>
             <a:endParaRPr lang="de-DE"/>
           </a:p>
@@ -3640,7 +3656,7 @@
           <a:p>
             <a:fld id="{FB4AA097-F0D2-7B4A-A9A4-B22818B5789F}" type="datetimeFigureOut">
               <a:rPr lang="de-DE" smtClean="0"/>
-              <a:t>03/11/15</a:t>
+              <a:t>03.11.15</a:t>
             </a:fld>
             <a:endParaRPr lang="de-DE"/>
           </a:p>
@@ -3936,7 +3952,7 @@
           <a:p>
             <a:fld id="{FB4AA097-F0D2-7B4A-A9A4-B22818B5789F}" type="datetimeFigureOut">
               <a:rPr lang="de-DE" smtClean="0"/>
-              <a:t>03/11/15</a:t>
+              <a:t>03.11.15</a:t>
             </a:fld>
             <a:endParaRPr lang="de-DE"/>
           </a:p>
@@ -4366,7 +4382,7 @@
           <a:p>
             <a:fld id="{FB4AA097-F0D2-7B4A-A9A4-B22818B5789F}" type="datetimeFigureOut">
               <a:rPr lang="de-DE" smtClean="0"/>
-              <a:t>03/11/15</a:t>
+              <a:t>03.11.15</a:t>
             </a:fld>
             <a:endParaRPr lang="de-DE"/>
           </a:p>
@@ -4492,7 +4508,7 @@
           <a:p>
             <a:fld id="{FB4AA097-F0D2-7B4A-A9A4-B22818B5789F}" type="datetimeFigureOut">
               <a:rPr lang="de-DE" smtClean="0"/>
-              <a:t>03/11/15</a:t>
+              <a:t>03.11.15</a:t>
             </a:fld>
             <a:endParaRPr lang="de-DE"/>
           </a:p>
@@ -4587,7 +4603,7 @@
           <a:p>
             <a:fld id="{FB4AA097-F0D2-7B4A-A9A4-B22818B5789F}" type="datetimeFigureOut">
               <a:rPr lang="de-DE" smtClean="0"/>
-              <a:t>03/11/15</a:t>
+              <a:t>03.11.15</a:t>
             </a:fld>
             <a:endParaRPr lang="de-DE"/>
           </a:p>
@@ -4867,7 +4883,7 @@
           <a:p>
             <a:fld id="{FB4AA097-F0D2-7B4A-A9A4-B22818B5789F}" type="datetimeFigureOut">
               <a:rPr lang="de-DE" smtClean="0"/>
-              <a:t>03/11/15</a:t>
+              <a:t>03.11.15</a:t>
             </a:fld>
             <a:endParaRPr lang="de-DE"/>
           </a:p>
@@ -5123,7 +5139,7 @@
           <a:p>
             <a:fld id="{FB4AA097-F0D2-7B4A-A9A4-B22818B5789F}" type="datetimeFigureOut">
               <a:rPr lang="de-DE" smtClean="0"/>
-              <a:t>03/11/15</a:t>
+              <a:t>03.11.15</a:t>
             </a:fld>
             <a:endParaRPr lang="de-DE"/>
           </a:p>
@@ -5309,7 +5325,7 @@
           <a:p>
             <a:fld id="{FB4AA097-F0D2-7B4A-A9A4-B22818B5789F}" type="datetimeFigureOut">
               <a:rPr lang="de-DE" smtClean="0"/>
-              <a:t>03/11/15</a:t>
+              <a:t>03.11.15</a:t>
             </a:fld>
             <a:endParaRPr lang="de-DE"/>
           </a:p>
@@ -5789,7 +5805,7 @@
           <a:p>
             <a:fld id="{63035A8D-2134-BF46-B1F0-4F90720B6831}" type="datetimeFigureOut">
               <a:rPr lang="de-DE" smtClean="0"/>
-              <a:t>03/11/15</a:t>
+              <a:t>03.11.15</a:t>
             </a:fld>
             <a:endParaRPr lang="de-DE"/>
           </a:p>
@@ -6383,6 +6399,26 @@
                 <a:latin typeface="Helvetica Neue"/>
                 <a:cs typeface="Helvetica Neue"/>
               </a:rPr>
+              <a:t>Shyam</a:t>
+            </a:r>
+            <a:r>
+              <a:rPr lang="de-DE" sz="2000" dirty="0" smtClean="0">
+                <a:solidFill>
+                  <a:srgbClr val="FFFFFF"/>
+                </a:solidFill>
+                <a:latin typeface="Helvetica Neue"/>
+                <a:cs typeface="Helvetica Neue"/>
+              </a:rPr>
+              <a:t> </a:t>
+            </a:r>
+            <a:r>
+              <a:rPr lang="de-DE" sz="2000" dirty="0" err="1" smtClean="0">
+                <a:solidFill>
+                  <a:srgbClr val="FFFFFF"/>
+                </a:solidFill>
+                <a:latin typeface="Helvetica Neue"/>
+                <a:cs typeface="Helvetica Neue"/>
+              </a:rPr>
               <a:t>Sunder</a:t>
             </a:r>
             <a:r>
@@ -6623,7 +6659,7 @@
   <p:timing>
     <p:tnLst>
       <p:par>
-        <p:cTn xmlns:p14="http://schemas.microsoft.com/office/powerpoint/2010/main" id="1" dur="indefinite" restart="never" nodeType="tmRoot"/>
+        <p:cTn id="1" dur="indefinite" restart="never" nodeType="tmRoot"/>
       </p:par>
     </p:tnLst>
   </p:timing>
@@ -9924,7 +9960,7 @@
         </p:nvGraphicFramePr>
         <p:xfrm>
           <a:off x="258073" y="910899"/>
-          <a:ext cx="8678162" cy="5764630"/>
+          <a:ext cx="8678162" cy="5764631"/>
         </p:xfrm>
         <a:graphic>
           <a:graphicData uri="http://schemas.openxmlformats.org/drawingml/2006/table">
@@ -11029,7 +11065,7 @@
   <p:timing>
     <p:tnLst>
       <p:par>
-        <p:cTn xmlns:p14="http://schemas.microsoft.com/office/powerpoint/2010/main" id="1" dur="indefinite" restart="never" nodeType="tmRoot"/>
+        <p:cTn id="1" dur="indefinite" restart="never" nodeType="tmRoot"/>
       </p:par>
     </p:tnLst>
   </p:timing>
@@ -11119,7 +11155,7 @@
   <p:timing>
     <p:tnLst>
       <p:par>
-        <p:cTn xmlns:p14="http://schemas.microsoft.com/office/powerpoint/2010/main" id="1" dur="indefinite" restart="never" nodeType="tmRoot"/>
+        <p:cTn id="1" dur="indefinite" restart="never" nodeType="tmRoot"/>
       </p:par>
     </p:tnLst>
   </p:timing>
@@ -12412,7 +12448,7 @@
   <p:timing>
     <p:tnLst>
       <p:par>
-        <p:cTn xmlns:p14="http://schemas.microsoft.com/office/powerpoint/2010/main" id="1" dur="indefinite" restart="never" nodeType="tmRoot"/>
+        <p:cTn id="1" dur="indefinite" restart="never" nodeType="tmRoot"/>
       </p:par>
     </p:tnLst>
   </p:timing>
@@ -13659,7 +13695,7 @@
   <p:timing>
     <p:tnLst>
       <p:par>
-        <p:cTn xmlns:p14="http://schemas.microsoft.com/office/powerpoint/2010/main" id="1" dur="indefinite" restart="never" nodeType="tmRoot"/>
+        <p:cTn id="1" dur="indefinite" restart="never" nodeType="tmRoot"/>
       </p:par>
     </p:tnLst>
   </p:timing>
@@ -13704,22 +13740,30 @@
           <a:lstStyle/>
           <a:p>
             <a:r>
-              <a:rPr lang="de-DE" dirty="0" smtClean="0"/>
+              <a:rPr lang="de-DE" sz="2400" dirty="0" smtClean="0"/>
               <a:t>Time Tracking – </a:t>
             </a:r>
             <a:r>
-              <a:rPr lang="de-DE" dirty="0" err="1" smtClean="0"/>
+              <a:rPr lang="de-DE" sz="2400" dirty="0" err="1" smtClean="0"/>
               <a:t>Swathi</a:t>
             </a:r>
             <a:r>
-              <a:rPr lang="de-DE" dirty="0" smtClean="0"/>
+              <a:rPr lang="de-DE" sz="2400" dirty="0" smtClean="0"/>
               <a:t> </a:t>
             </a:r>
             <a:r>
-              <a:rPr lang="de-DE" dirty="0" err="1" smtClean="0"/>
+              <a:rPr lang="de-DE" sz="2400" dirty="0" err="1" smtClean="0"/>
+              <a:t>Shyam</a:t>
+            </a:r>
+            <a:r>
+              <a:rPr lang="de-DE" sz="2400" dirty="0" smtClean="0"/>
+              <a:t> </a:t>
+            </a:r>
+            <a:r>
+              <a:rPr lang="de-DE" sz="2400" dirty="0" err="1" smtClean="0"/>
               <a:t>Sunder</a:t>
             </a:r>
-            <a:endParaRPr lang="de-DE" dirty="0"/>
+            <a:endParaRPr lang="de-DE" sz="2400" dirty="0"/>
           </a:p>
         </p:txBody>
       </p:sp>
@@ -13733,7 +13777,7 @@
             <p:ph idx="1"/>
             <p:extLst>
               <p:ext uri="{D42A27DB-BD31-4B8C-83A1-F6EECF244321}">
-                <p14:modId xmlns:p14="http://schemas.microsoft.com/office/powerpoint/2010/main" val="3987486532"/>
+                <p14:modId xmlns:p14="http://schemas.microsoft.com/office/powerpoint/2010/main" val="1358239881"/>
               </p:ext>
             </p:extLst>
           </p:nvPr>
@@ -14969,7 +15013,7 @@
   <p:timing>
     <p:tnLst>
       <p:par>
-        <p:cTn xmlns:p14="http://schemas.microsoft.com/office/powerpoint/2010/main" id="1" dur="indefinite" restart="never" nodeType="tmRoot"/>
+        <p:cTn id="1" dur="indefinite" restart="never" nodeType="tmRoot"/>
       </p:par>
     </p:tnLst>
   </p:timing>
@@ -16029,7 +16073,7 @@
   <p:timing>
     <p:tnLst>
       <p:par>
-        <p:cTn xmlns:p14="http://schemas.microsoft.com/office/powerpoint/2010/main" id="1" dur="indefinite" restart="never" nodeType="tmRoot"/>
+        <p:cTn id="1" dur="indefinite" restart="never" nodeType="tmRoot"/>
       </p:par>
     </p:tnLst>
   </p:timing>

</xml_diff>